<commit_message>
Updated with newly modified sequence diagrams
</commit_message>
<xml_diff>
--- a/Documents/DesignPresentation.pptx
+++ b/Documents/DesignPresentation.pptx
@@ -4,6 +4,9 @@
   <p:sldMasterIdLst>
     <p:sldMasterId id="2147483657" r:id="rId1"/>
   </p:sldMasterIdLst>
+  <p:notesMasterIdLst>
+    <p:notesMasterId r:id="rId41"/>
+  </p:notesMasterIdLst>
   <p:sldIdLst>
     <p:sldId id="256" r:id="rId2"/>
     <p:sldId id="260" r:id="rId3"/>
@@ -173,6 +176,3512 @@
     </a:lvl9pPr>
   </p:defaultTextStyle>
 </p:presentation>
+</file>
+
+<file path=ppt/notesMasters/notesMaster1.xml><?xml version="1.0" encoding="utf-8"?>
+<p:notesMaster xmlns:a="http://schemas.openxmlformats.org/drawingml/2006/main" xmlns:r="http://schemas.openxmlformats.org/officeDocument/2006/relationships" xmlns:p="http://schemas.openxmlformats.org/presentationml/2006/main">
+  <p:cSld>
+    <p:bg>
+      <p:bgRef idx="1001">
+        <a:schemeClr val="bg1"/>
+      </p:bgRef>
+    </p:bg>
+    <p:spTree>
+      <p:nvGrpSpPr>
+        <p:cNvPr id="1" name=""/>
+        <p:cNvGrpSpPr/>
+        <p:nvPr/>
+      </p:nvGrpSpPr>
+      <p:grpSpPr>
+        <a:xfrm>
+          <a:off x="0" y="0"/>
+          <a:ext cx="0" cy="0"/>
+          <a:chOff x="0" y="0"/>
+          <a:chExt cx="0" cy="0"/>
+        </a:xfrm>
+      </p:grpSpPr>
+      <p:sp>
+        <p:nvSpPr>
+          <p:cNvPr id="2" name="Header Placeholder 1"/>
+          <p:cNvSpPr>
+            <a:spLocks noGrp="1"/>
+          </p:cNvSpPr>
+          <p:nvPr>
+            <p:ph type="hdr" sz="quarter"/>
+          </p:nvPr>
+        </p:nvSpPr>
+        <p:spPr>
+          <a:xfrm>
+            <a:off x="0" y="0"/>
+            <a:ext cx="2971800" cy="457200"/>
+          </a:xfrm>
+          <a:prstGeom prst="rect">
+            <a:avLst/>
+          </a:prstGeom>
+        </p:spPr>
+        <p:txBody>
+          <a:bodyPr vert="horz" lIns="91440" tIns="45720" rIns="91440" bIns="45720" rtlCol="0"/>
+          <a:lstStyle>
+            <a:lvl1pPr algn="l">
+              <a:defRPr sz="1200"/>
+            </a:lvl1pPr>
+          </a:lstStyle>
+          <a:p>
+            <a:endParaRPr lang="en-US"/>
+          </a:p>
+        </p:txBody>
+      </p:sp>
+      <p:sp>
+        <p:nvSpPr>
+          <p:cNvPr id="3" name="Date Placeholder 2"/>
+          <p:cNvSpPr>
+            <a:spLocks noGrp="1"/>
+          </p:cNvSpPr>
+          <p:nvPr>
+            <p:ph type="dt" idx="1"/>
+          </p:nvPr>
+        </p:nvSpPr>
+        <p:spPr>
+          <a:xfrm>
+            <a:off x="3884613" y="0"/>
+            <a:ext cx="2971800" cy="457200"/>
+          </a:xfrm>
+          <a:prstGeom prst="rect">
+            <a:avLst/>
+          </a:prstGeom>
+        </p:spPr>
+        <p:txBody>
+          <a:bodyPr vert="horz" lIns="91440" tIns="45720" rIns="91440" bIns="45720" rtlCol="0"/>
+          <a:lstStyle>
+            <a:lvl1pPr algn="r">
+              <a:defRPr sz="1200"/>
+            </a:lvl1pPr>
+          </a:lstStyle>
+          <a:p>
+            <a:fld id="{19A89129-33F4-4CC6-BCAC-C63CA04B2663}" type="datetimeFigureOut">
+              <a:rPr lang="en-US" smtClean="0"/>
+              <a:t>4/6/2009</a:t>
+            </a:fld>
+            <a:endParaRPr lang="en-US"/>
+          </a:p>
+        </p:txBody>
+      </p:sp>
+      <p:sp>
+        <p:nvSpPr>
+          <p:cNvPr id="4" name="Slide Image Placeholder 3"/>
+          <p:cNvSpPr>
+            <a:spLocks noGrp="1" noRot="1" noChangeAspect="1"/>
+          </p:cNvSpPr>
+          <p:nvPr>
+            <p:ph type="sldImg" idx="2"/>
+          </p:nvPr>
+        </p:nvSpPr>
+        <p:spPr>
+          <a:xfrm>
+            <a:off x="1143000" y="685800"/>
+            <a:ext cx="4572000" cy="3429000"/>
+          </a:xfrm>
+          <a:prstGeom prst="rect">
+            <a:avLst/>
+          </a:prstGeom>
+          <a:noFill/>
+          <a:ln w="12700">
+            <a:solidFill>
+              <a:prstClr val="black"/>
+            </a:solidFill>
+          </a:ln>
+        </p:spPr>
+        <p:txBody>
+          <a:bodyPr vert="horz" lIns="91440" tIns="45720" rIns="91440" bIns="45720" rtlCol="0" anchor="ctr"/>
+          <a:lstStyle/>
+          <a:p>
+            <a:endParaRPr lang="en-US"/>
+          </a:p>
+        </p:txBody>
+      </p:sp>
+      <p:sp>
+        <p:nvSpPr>
+          <p:cNvPr id="5" name="Notes Placeholder 4"/>
+          <p:cNvSpPr>
+            <a:spLocks noGrp="1"/>
+          </p:cNvSpPr>
+          <p:nvPr>
+            <p:ph type="body" sz="quarter" idx="3"/>
+          </p:nvPr>
+        </p:nvSpPr>
+        <p:spPr>
+          <a:xfrm>
+            <a:off x="685800" y="4343400"/>
+            <a:ext cx="5486400" cy="4114800"/>
+          </a:xfrm>
+          <a:prstGeom prst="rect">
+            <a:avLst/>
+          </a:prstGeom>
+        </p:spPr>
+        <p:txBody>
+          <a:bodyPr vert="horz" lIns="91440" tIns="45720" rIns="91440" bIns="45720" rtlCol="0">
+            <a:normAutofit/>
+          </a:bodyPr>
+          <a:lstStyle/>
+          <a:p>
+            <a:pPr lvl="0"/>
+            <a:r>
+              <a:rPr lang="en-US" smtClean="0"/>
+              <a:t>Click to edit Master text styles</a:t>
+            </a:r>
+          </a:p>
+          <a:p>
+            <a:pPr lvl="1"/>
+            <a:r>
+              <a:rPr lang="en-US" smtClean="0"/>
+              <a:t>Second level</a:t>
+            </a:r>
+          </a:p>
+          <a:p>
+            <a:pPr lvl="2"/>
+            <a:r>
+              <a:rPr lang="en-US" smtClean="0"/>
+              <a:t>Third level</a:t>
+            </a:r>
+          </a:p>
+          <a:p>
+            <a:pPr lvl="3"/>
+            <a:r>
+              <a:rPr lang="en-US" smtClean="0"/>
+              <a:t>Fourth level</a:t>
+            </a:r>
+          </a:p>
+          <a:p>
+            <a:pPr lvl="4"/>
+            <a:r>
+              <a:rPr lang="en-US" smtClean="0"/>
+              <a:t>Fifth level</a:t>
+            </a:r>
+            <a:endParaRPr lang="en-US"/>
+          </a:p>
+        </p:txBody>
+      </p:sp>
+      <p:sp>
+        <p:nvSpPr>
+          <p:cNvPr id="6" name="Footer Placeholder 5"/>
+          <p:cNvSpPr>
+            <a:spLocks noGrp="1"/>
+          </p:cNvSpPr>
+          <p:nvPr>
+            <p:ph type="ftr" sz="quarter" idx="4"/>
+          </p:nvPr>
+        </p:nvSpPr>
+        <p:spPr>
+          <a:xfrm>
+            <a:off x="0" y="8685213"/>
+            <a:ext cx="2971800" cy="457200"/>
+          </a:xfrm>
+          <a:prstGeom prst="rect">
+            <a:avLst/>
+          </a:prstGeom>
+        </p:spPr>
+        <p:txBody>
+          <a:bodyPr vert="horz" lIns="91440" tIns="45720" rIns="91440" bIns="45720" rtlCol="0" anchor="b"/>
+          <a:lstStyle>
+            <a:lvl1pPr algn="l">
+              <a:defRPr sz="1200"/>
+            </a:lvl1pPr>
+          </a:lstStyle>
+          <a:p>
+            <a:endParaRPr lang="en-US"/>
+          </a:p>
+        </p:txBody>
+      </p:sp>
+      <p:sp>
+        <p:nvSpPr>
+          <p:cNvPr id="7" name="Slide Number Placeholder 6"/>
+          <p:cNvSpPr>
+            <a:spLocks noGrp="1"/>
+          </p:cNvSpPr>
+          <p:nvPr>
+            <p:ph type="sldNum" sz="quarter" idx="5"/>
+          </p:nvPr>
+        </p:nvSpPr>
+        <p:spPr>
+          <a:xfrm>
+            <a:off x="3884613" y="8685213"/>
+            <a:ext cx="2971800" cy="457200"/>
+          </a:xfrm>
+          <a:prstGeom prst="rect">
+            <a:avLst/>
+          </a:prstGeom>
+        </p:spPr>
+        <p:txBody>
+          <a:bodyPr vert="horz" lIns="91440" tIns="45720" rIns="91440" bIns="45720" rtlCol="0" anchor="b"/>
+          <a:lstStyle>
+            <a:lvl1pPr algn="r">
+              <a:defRPr sz="1200"/>
+            </a:lvl1pPr>
+          </a:lstStyle>
+          <a:p>
+            <a:fld id="{E1C48AFE-8526-4161-A329-94B75A3BCD37}" type="slidenum">
+              <a:rPr lang="en-US" smtClean="0"/>
+              <a:t>‹#›</a:t>
+            </a:fld>
+            <a:endParaRPr lang="en-US"/>
+          </a:p>
+        </p:txBody>
+      </p:sp>
+    </p:spTree>
+  </p:cSld>
+  <p:clrMap bg1="lt1" tx1="dk1" bg2="lt2" tx2="dk2" accent1="accent1" accent2="accent2" accent3="accent3" accent4="accent4" accent5="accent5" accent6="accent6" hlink="hlink" folHlink="folHlink"/>
+  <p:notesStyle>
+    <a:lvl1pPr marL="0" algn="l" defTabSz="914400" rtl="0" eaLnBrk="1" latinLnBrk="0" hangingPunct="1">
+      <a:defRPr sz="1200" kern="1200">
+        <a:solidFill>
+          <a:schemeClr val="tx1"/>
+        </a:solidFill>
+        <a:latin typeface="+mn-lt"/>
+        <a:ea typeface="+mn-ea"/>
+        <a:cs typeface="+mn-cs"/>
+      </a:defRPr>
+    </a:lvl1pPr>
+    <a:lvl2pPr marL="457200" algn="l" defTabSz="914400" rtl="0" eaLnBrk="1" latinLnBrk="0" hangingPunct="1">
+      <a:defRPr sz="1200" kern="1200">
+        <a:solidFill>
+          <a:schemeClr val="tx1"/>
+        </a:solidFill>
+        <a:latin typeface="+mn-lt"/>
+        <a:ea typeface="+mn-ea"/>
+        <a:cs typeface="+mn-cs"/>
+      </a:defRPr>
+    </a:lvl2pPr>
+    <a:lvl3pPr marL="914400" algn="l" defTabSz="914400" rtl="0" eaLnBrk="1" latinLnBrk="0" hangingPunct="1">
+      <a:defRPr sz="1200" kern="1200">
+        <a:solidFill>
+          <a:schemeClr val="tx1"/>
+        </a:solidFill>
+        <a:latin typeface="+mn-lt"/>
+        <a:ea typeface="+mn-ea"/>
+        <a:cs typeface="+mn-cs"/>
+      </a:defRPr>
+    </a:lvl3pPr>
+    <a:lvl4pPr marL="1371600" algn="l" defTabSz="914400" rtl="0" eaLnBrk="1" latinLnBrk="0" hangingPunct="1">
+      <a:defRPr sz="1200" kern="1200">
+        <a:solidFill>
+          <a:schemeClr val="tx1"/>
+        </a:solidFill>
+        <a:latin typeface="+mn-lt"/>
+        <a:ea typeface="+mn-ea"/>
+        <a:cs typeface="+mn-cs"/>
+      </a:defRPr>
+    </a:lvl4pPr>
+    <a:lvl5pPr marL="1828800" algn="l" defTabSz="914400" rtl="0" eaLnBrk="1" latinLnBrk="0" hangingPunct="1">
+      <a:defRPr sz="1200" kern="1200">
+        <a:solidFill>
+          <a:schemeClr val="tx1"/>
+        </a:solidFill>
+        <a:latin typeface="+mn-lt"/>
+        <a:ea typeface="+mn-ea"/>
+        <a:cs typeface="+mn-cs"/>
+      </a:defRPr>
+    </a:lvl5pPr>
+    <a:lvl6pPr marL="2286000" algn="l" defTabSz="914400" rtl="0" eaLnBrk="1" latinLnBrk="0" hangingPunct="1">
+      <a:defRPr sz="1200" kern="1200">
+        <a:solidFill>
+          <a:schemeClr val="tx1"/>
+        </a:solidFill>
+        <a:latin typeface="+mn-lt"/>
+        <a:ea typeface="+mn-ea"/>
+        <a:cs typeface="+mn-cs"/>
+      </a:defRPr>
+    </a:lvl6pPr>
+    <a:lvl7pPr marL="2743200" algn="l" defTabSz="914400" rtl="0" eaLnBrk="1" latinLnBrk="0" hangingPunct="1">
+      <a:defRPr sz="1200" kern="1200">
+        <a:solidFill>
+          <a:schemeClr val="tx1"/>
+        </a:solidFill>
+        <a:latin typeface="+mn-lt"/>
+        <a:ea typeface="+mn-ea"/>
+        <a:cs typeface="+mn-cs"/>
+      </a:defRPr>
+    </a:lvl7pPr>
+    <a:lvl8pPr marL="3200400" algn="l" defTabSz="914400" rtl="0" eaLnBrk="1" latinLnBrk="0" hangingPunct="1">
+      <a:defRPr sz="1200" kern="1200">
+        <a:solidFill>
+          <a:schemeClr val="tx1"/>
+        </a:solidFill>
+        <a:latin typeface="+mn-lt"/>
+        <a:ea typeface="+mn-ea"/>
+        <a:cs typeface="+mn-cs"/>
+      </a:defRPr>
+    </a:lvl8pPr>
+    <a:lvl9pPr marL="3657600" algn="l" defTabSz="914400" rtl="0" eaLnBrk="1" latinLnBrk="0" hangingPunct="1">
+      <a:defRPr sz="1200" kern="1200">
+        <a:solidFill>
+          <a:schemeClr val="tx1"/>
+        </a:solidFill>
+        <a:latin typeface="+mn-lt"/>
+        <a:ea typeface="+mn-ea"/>
+        <a:cs typeface="+mn-cs"/>
+      </a:defRPr>
+    </a:lvl9pPr>
+  </p:notesStyle>
+</p:notesMaster>
+</file>
+
+<file path=ppt/notesSlides/notesSlide1.xml><?xml version="1.0" encoding="utf-8"?>
+<p:notes xmlns:a="http://schemas.openxmlformats.org/drawingml/2006/main" xmlns:r="http://schemas.openxmlformats.org/officeDocument/2006/relationships" xmlns:p="http://schemas.openxmlformats.org/presentationml/2006/main">
+  <p:cSld>
+    <p:spTree>
+      <p:nvGrpSpPr>
+        <p:cNvPr id="1" name=""/>
+        <p:cNvGrpSpPr/>
+        <p:nvPr/>
+      </p:nvGrpSpPr>
+      <p:grpSpPr>
+        <a:xfrm>
+          <a:off x="0" y="0"/>
+          <a:ext cx="0" cy="0"/>
+          <a:chOff x="0" y="0"/>
+          <a:chExt cx="0" cy="0"/>
+        </a:xfrm>
+      </p:grpSpPr>
+      <p:sp>
+        <p:nvSpPr>
+          <p:cNvPr id="2" name="Slide Image Placeholder 1"/>
+          <p:cNvSpPr>
+            <a:spLocks noGrp="1" noRot="1" noChangeAspect="1"/>
+          </p:cNvSpPr>
+          <p:nvPr>
+            <p:ph type="sldImg"/>
+          </p:nvPr>
+        </p:nvSpPr>
+        <p:spPr/>
+      </p:sp>
+      <p:sp>
+        <p:nvSpPr>
+          <p:cNvPr id="3" name="Notes Placeholder 2"/>
+          <p:cNvSpPr>
+            <a:spLocks noGrp="1"/>
+          </p:cNvSpPr>
+          <p:nvPr>
+            <p:ph type="body" idx="1"/>
+          </p:nvPr>
+        </p:nvSpPr>
+        <p:spPr/>
+        <p:txBody>
+          <a:bodyPr>
+            <a:normAutofit/>
+          </a:bodyPr>
+          <a:lstStyle/>
+          <a:p>
+            <a:endParaRPr lang="en-US"/>
+          </a:p>
+        </p:txBody>
+      </p:sp>
+      <p:sp>
+        <p:nvSpPr>
+          <p:cNvPr id="4" name="Slide Number Placeholder 3"/>
+          <p:cNvSpPr>
+            <a:spLocks noGrp="1"/>
+          </p:cNvSpPr>
+          <p:nvPr>
+            <p:ph type="sldNum" sz="quarter" idx="10"/>
+          </p:nvPr>
+        </p:nvSpPr>
+        <p:spPr/>
+        <p:txBody>
+          <a:bodyPr/>
+          <a:lstStyle/>
+          <a:p>
+            <a:fld id="{E1C48AFE-8526-4161-A329-94B75A3BCD37}" type="slidenum">
+              <a:rPr lang="en-US" smtClean="0"/>
+              <a:t>1</a:t>
+            </a:fld>
+            <a:endParaRPr lang="en-US"/>
+          </a:p>
+        </p:txBody>
+      </p:sp>
+    </p:spTree>
+  </p:cSld>
+  <p:clrMapOvr>
+    <a:masterClrMapping/>
+  </p:clrMapOvr>
+</p:notes>
+</file>
+
+<file path=ppt/notesSlides/notesSlide10.xml><?xml version="1.0" encoding="utf-8"?>
+<p:notes xmlns:a="http://schemas.openxmlformats.org/drawingml/2006/main" xmlns:r="http://schemas.openxmlformats.org/officeDocument/2006/relationships" xmlns:p="http://schemas.openxmlformats.org/presentationml/2006/main">
+  <p:cSld>
+    <p:spTree>
+      <p:nvGrpSpPr>
+        <p:cNvPr id="1" name=""/>
+        <p:cNvGrpSpPr/>
+        <p:nvPr/>
+      </p:nvGrpSpPr>
+      <p:grpSpPr>
+        <a:xfrm>
+          <a:off x="0" y="0"/>
+          <a:ext cx="0" cy="0"/>
+          <a:chOff x="0" y="0"/>
+          <a:chExt cx="0" cy="0"/>
+        </a:xfrm>
+      </p:grpSpPr>
+      <p:sp>
+        <p:nvSpPr>
+          <p:cNvPr id="2" name="Slide Image Placeholder 1"/>
+          <p:cNvSpPr>
+            <a:spLocks noGrp="1" noRot="1" noChangeAspect="1"/>
+          </p:cNvSpPr>
+          <p:nvPr>
+            <p:ph type="sldImg"/>
+          </p:nvPr>
+        </p:nvSpPr>
+        <p:spPr/>
+      </p:sp>
+      <p:sp>
+        <p:nvSpPr>
+          <p:cNvPr id="3" name="Notes Placeholder 2"/>
+          <p:cNvSpPr>
+            <a:spLocks noGrp="1"/>
+          </p:cNvSpPr>
+          <p:nvPr>
+            <p:ph type="body" idx="1"/>
+          </p:nvPr>
+        </p:nvSpPr>
+        <p:spPr/>
+        <p:txBody>
+          <a:bodyPr>
+            <a:normAutofit/>
+          </a:bodyPr>
+          <a:lstStyle/>
+          <a:p>
+            <a:endParaRPr lang="en-US"/>
+          </a:p>
+        </p:txBody>
+      </p:sp>
+      <p:sp>
+        <p:nvSpPr>
+          <p:cNvPr id="4" name="Slide Number Placeholder 3"/>
+          <p:cNvSpPr>
+            <a:spLocks noGrp="1"/>
+          </p:cNvSpPr>
+          <p:nvPr>
+            <p:ph type="sldNum" sz="quarter" idx="10"/>
+          </p:nvPr>
+        </p:nvSpPr>
+        <p:spPr/>
+        <p:txBody>
+          <a:bodyPr/>
+          <a:lstStyle/>
+          <a:p>
+            <a:fld id="{E1C48AFE-8526-4161-A329-94B75A3BCD37}" type="slidenum">
+              <a:rPr lang="en-US" smtClean="0"/>
+              <a:t>10</a:t>
+            </a:fld>
+            <a:endParaRPr lang="en-US"/>
+          </a:p>
+        </p:txBody>
+      </p:sp>
+    </p:spTree>
+  </p:cSld>
+  <p:clrMapOvr>
+    <a:masterClrMapping/>
+  </p:clrMapOvr>
+</p:notes>
+</file>
+
+<file path=ppt/notesSlides/notesSlide11.xml><?xml version="1.0" encoding="utf-8"?>
+<p:notes xmlns:a="http://schemas.openxmlformats.org/drawingml/2006/main" xmlns:r="http://schemas.openxmlformats.org/officeDocument/2006/relationships" xmlns:p="http://schemas.openxmlformats.org/presentationml/2006/main">
+  <p:cSld>
+    <p:spTree>
+      <p:nvGrpSpPr>
+        <p:cNvPr id="1" name=""/>
+        <p:cNvGrpSpPr/>
+        <p:nvPr/>
+      </p:nvGrpSpPr>
+      <p:grpSpPr>
+        <a:xfrm>
+          <a:off x="0" y="0"/>
+          <a:ext cx="0" cy="0"/>
+          <a:chOff x="0" y="0"/>
+          <a:chExt cx="0" cy="0"/>
+        </a:xfrm>
+      </p:grpSpPr>
+      <p:sp>
+        <p:nvSpPr>
+          <p:cNvPr id="2" name="Slide Image Placeholder 1"/>
+          <p:cNvSpPr>
+            <a:spLocks noGrp="1" noRot="1" noChangeAspect="1"/>
+          </p:cNvSpPr>
+          <p:nvPr>
+            <p:ph type="sldImg"/>
+          </p:nvPr>
+        </p:nvSpPr>
+        <p:spPr/>
+      </p:sp>
+      <p:sp>
+        <p:nvSpPr>
+          <p:cNvPr id="3" name="Notes Placeholder 2"/>
+          <p:cNvSpPr>
+            <a:spLocks noGrp="1"/>
+          </p:cNvSpPr>
+          <p:nvPr>
+            <p:ph type="body" idx="1"/>
+          </p:nvPr>
+        </p:nvSpPr>
+        <p:spPr/>
+        <p:txBody>
+          <a:bodyPr>
+            <a:normAutofit/>
+          </a:bodyPr>
+          <a:lstStyle/>
+          <a:p>
+            <a:endParaRPr lang="en-US"/>
+          </a:p>
+        </p:txBody>
+      </p:sp>
+      <p:sp>
+        <p:nvSpPr>
+          <p:cNvPr id="4" name="Slide Number Placeholder 3"/>
+          <p:cNvSpPr>
+            <a:spLocks noGrp="1"/>
+          </p:cNvSpPr>
+          <p:nvPr>
+            <p:ph type="sldNum" sz="quarter" idx="10"/>
+          </p:nvPr>
+        </p:nvSpPr>
+        <p:spPr/>
+        <p:txBody>
+          <a:bodyPr/>
+          <a:lstStyle/>
+          <a:p>
+            <a:fld id="{E1C48AFE-8526-4161-A329-94B75A3BCD37}" type="slidenum">
+              <a:rPr lang="en-US" smtClean="0"/>
+              <a:t>11</a:t>
+            </a:fld>
+            <a:endParaRPr lang="en-US"/>
+          </a:p>
+        </p:txBody>
+      </p:sp>
+    </p:spTree>
+  </p:cSld>
+  <p:clrMapOvr>
+    <a:masterClrMapping/>
+  </p:clrMapOvr>
+</p:notes>
+</file>
+
+<file path=ppt/notesSlides/notesSlide12.xml><?xml version="1.0" encoding="utf-8"?>
+<p:notes xmlns:a="http://schemas.openxmlformats.org/drawingml/2006/main" xmlns:r="http://schemas.openxmlformats.org/officeDocument/2006/relationships" xmlns:p="http://schemas.openxmlformats.org/presentationml/2006/main">
+  <p:cSld>
+    <p:spTree>
+      <p:nvGrpSpPr>
+        <p:cNvPr id="1" name=""/>
+        <p:cNvGrpSpPr/>
+        <p:nvPr/>
+      </p:nvGrpSpPr>
+      <p:grpSpPr>
+        <a:xfrm>
+          <a:off x="0" y="0"/>
+          <a:ext cx="0" cy="0"/>
+          <a:chOff x="0" y="0"/>
+          <a:chExt cx="0" cy="0"/>
+        </a:xfrm>
+      </p:grpSpPr>
+      <p:sp>
+        <p:nvSpPr>
+          <p:cNvPr id="2" name="Slide Image Placeholder 1"/>
+          <p:cNvSpPr>
+            <a:spLocks noGrp="1" noRot="1" noChangeAspect="1"/>
+          </p:cNvSpPr>
+          <p:nvPr>
+            <p:ph type="sldImg"/>
+          </p:nvPr>
+        </p:nvSpPr>
+        <p:spPr/>
+      </p:sp>
+      <p:sp>
+        <p:nvSpPr>
+          <p:cNvPr id="3" name="Notes Placeholder 2"/>
+          <p:cNvSpPr>
+            <a:spLocks noGrp="1"/>
+          </p:cNvSpPr>
+          <p:nvPr>
+            <p:ph type="body" idx="1"/>
+          </p:nvPr>
+        </p:nvSpPr>
+        <p:spPr/>
+        <p:txBody>
+          <a:bodyPr>
+            <a:normAutofit/>
+          </a:bodyPr>
+          <a:lstStyle/>
+          <a:p>
+            <a:endParaRPr lang="en-US"/>
+          </a:p>
+        </p:txBody>
+      </p:sp>
+      <p:sp>
+        <p:nvSpPr>
+          <p:cNvPr id="4" name="Slide Number Placeholder 3"/>
+          <p:cNvSpPr>
+            <a:spLocks noGrp="1"/>
+          </p:cNvSpPr>
+          <p:nvPr>
+            <p:ph type="sldNum" sz="quarter" idx="10"/>
+          </p:nvPr>
+        </p:nvSpPr>
+        <p:spPr/>
+        <p:txBody>
+          <a:bodyPr/>
+          <a:lstStyle/>
+          <a:p>
+            <a:fld id="{E1C48AFE-8526-4161-A329-94B75A3BCD37}" type="slidenum">
+              <a:rPr lang="en-US" smtClean="0"/>
+              <a:t>12</a:t>
+            </a:fld>
+            <a:endParaRPr lang="en-US"/>
+          </a:p>
+        </p:txBody>
+      </p:sp>
+    </p:spTree>
+  </p:cSld>
+  <p:clrMapOvr>
+    <a:masterClrMapping/>
+  </p:clrMapOvr>
+</p:notes>
+</file>
+
+<file path=ppt/notesSlides/notesSlide13.xml><?xml version="1.0" encoding="utf-8"?>
+<p:notes xmlns:a="http://schemas.openxmlformats.org/drawingml/2006/main" xmlns:r="http://schemas.openxmlformats.org/officeDocument/2006/relationships" xmlns:p="http://schemas.openxmlformats.org/presentationml/2006/main">
+  <p:cSld>
+    <p:spTree>
+      <p:nvGrpSpPr>
+        <p:cNvPr id="1" name=""/>
+        <p:cNvGrpSpPr/>
+        <p:nvPr/>
+      </p:nvGrpSpPr>
+      <p:grpSpPr>
+        <a:xfrm>
+          <a:off x="0" y="0"/>
+          <a:ext cx="0" cy="0"/>
+          <a:chOff x="0" y="0"/>
+          <a:chExt cx="0" cy="0"/>
+        </a:xfrm>
+      </p:grpSpPr>
+      <p:sp>
+        <p:nvSpPr>
+          <p:cNvPr id="2" name="Slide Image Placeholder 1"/>
+          <p:cNvSpPr>
+            <a:spLocks noGrp="1" noRot="1" noChangeAspect="1"/>
+          </p:cNvSpPr>
+          <p:nvPr>
+            <p:ph type="sldImg"/>
+          </p:nvPr>
+        </p:nvSpPr>
+        <p:spPr/>
+      </p:sp>
+      <p:sp>
+        <p:nvSpPr>
+          <p:cNvPr id="3" name="Notes Placeholder 2"/>
+          <p:cNvSpPr>
+            <a:spLocks noGrp="1"/>
+          </p:cNvSpPr>
+          <p:nvPr>
+            <p:ph type="body" idx="1"/>
+          </p:nvPr>
+        </p:nvSpPr>
+        <p:spPr/>
+        <p:txBody>
+          <a:bodyPr>
+            <a:normAutofit/>
+          </a:bodyPr>
+          <a:lstStyle/>
+          <a:p>
+            <a:endParaRPr lang="en-US"/>
+          </a:p>
+        </p:txBody>
+      </p:sp>
+      <p:sp>
+        <p:nvSpPr>
+          <p:cNvPr id="4" name="Slide Number Placeholder 3"/>
+          <p:cNvSpPr>
+            <a:spLocks noGrp="1"/>
+          </p:cNvSpPr>
+          <p:nvPr>
+            <p:ph type="sldNum" sz="quarter" idx="10"/>
+          </p:nvPr>
+        </p:nvSpPr>
+        <p:spPr/>
+        <p:txBody>
+          <a:bodyPr/>
+          <a:lstStyle/>
+          <a:p>
+            <a:fld id="{E1C48AFE-8526-4161-A329-94B75A3BCD37}" type="slidenum">
+              <a:rPr lang="en-US" smtClean="0"/>
+              <a:t>13</a:t>
+            </a:fld>
+            <a:endParaRPr lang="en-US"/>
+          </a:p>
+        </p:txBody>
+      </p:sp>
+    </p:spTree>
+  </p:cSld>
+  <p:clrMapOvr>
+    <a:masterClrMapping/>
+  </p:clrMapOvr>
+</p:notes>
+</file>
+
+<file path=ppt/notesSlides/notesSlide14.xml><?xml version="1.0" encoding="utf-8"?>
+<p:notes xmlns:a="http://schemas.openxmlformats.org/drawingml/2006/main" xmlns:r="http://schemas.openxmlformats.org/officeDocument/2006/relationships" xmlns:p="http://schemas.openxmlformats.org/presentationml/2006/main">
+  <p:cSld>
+    <p:spTree>
+      <p:nvGrpSpPr>
+        <p:cNvPr id="1" name=""/>
+        <p:cNvGrpSpPr/>
+        <p:nvPr/>
+      </p:nvGrpSpPr>
+      <p:grpSpPr>
+        <a:xfrm>
+          <a:off x="0" y="0"/>
+          <a:ext cx="0" cy="0"/>
+          <a:chOff x="0" y="0"/>
+          <a:chExt cx="0" cy="0"/>
+        </a:xfrm>
+      </p:grpSpPr>
+      <p:sp>
+        <p:nvSpPr>
+          <p:cNvPr id="2" name="Slide Image Placeholder 1"/>
+          <p:cNvSpPr>
+            <a:spLocks noGrp="1" noRot="1" noChangeAspect="1"/>
+          </p:cNvSpPr>
+          <p:nvPr>
+            <p:ph type="sldImg"/>
+          </p:nvPr>
+        </p:nvSpPr>
+        <p:spPr/>
+      </p:sp>
+      <p:sp>
+        <p:nvSpPr>
+          <p:cNvPr id="3" name="Notes Placeholder 2"/>
+          <p:cNvSpPr>
+            <a:spLocks noGrp="1"/>
+          </p:cNvSpPr>
+          <p:nvPr>
+            <p:ph type="body" idx="1"/>
+          </p:nvPr>
+        </p:nvSpPr>
+        <p:spPr/>
+        <p:txBody>
+          <a:bodyPr>
+            <a:normAutofit/>
+          </a:bodyPr>
+          <a:lstStyle/>
+          <a:p>
+            <a:endParaRPr lang="en-US"/>
+          </a:p>
+        </p:txBody>
+      </p:sp>
+      <p:sp>
+        <p:nvSpPr>
+          <p:cNvPr id="4" name="Slide Number Placeholder 3"/>
+          <p:cNvSpPr>
+            <a:spLocks noGrp="1"/>
+          </p:cNvSpPr>
+          <p:nvPr>
+            <p:ph type="sldNum" sz="quarter" idx="10"/>
+          </p:nvPr>
+        </p:nvSpPr>
+        <p:spPr/>
+        <p:txBody>
+          <a:bodyPr/>
+          <a:lstStyle/>
+          <a:p>
+            <a:fld id="{E1C48AFE-8526-4161-A329-94B75A3BCD37}" type="slidenum">
+              <a:rPr lang="en-US" smtClean="0"/>
+              <a:t>14</a:t>
+            </a:fld>
+            <a:endParaRPr lang="en-US"/>
+          </a:p>
+        </p:txBody>
+      </p:sp>
+    </p:spTree>
+  </p:cSld>
+  <p:clrMapOvr>
+    <a:masterClrMapping/>
+  </p:clrMapOvr>
+</p:notes>
+</file>
+
+<file path=ppt/notesSlides/notesSlide15.xml><?xml version="1.0" encoding="utf-8"?>
+<p:notes xmlns:a="http://schemas.openxmlformats.org/drawingml/2006/main" xmlns:r="http://schemas.openxmlformats.org/officeDocument/2006/relationships" xmlns:p="http://schemas.openxmlformats.org/presentationml/2006/main">
+  <p:cSld>
+    <p:spTree>
+      <p:nvGrpSpPr>
+        <p:cNvPr id="1" name=""/>
+        <p:cNvGrpSpPr/>
+        <p:nvPr/>
+      </p:nvGrpSpPr>
+      <p:grpSpPr>
+        <a:xfrm>
+          <a:off x="0" y="0"/>
+          <a:ext cx="0" cy="0"/>
+          <a:chOff x="0" y="0"/>
+          <a:chExt cx="0" cy="0"/>
+        </a:xfrm>
+      </p:grpSpPr>
+      <p:sp>
+        <p:nvSpPr>
+          <p:cNvPr id="2" name="Slide Image Placeholder 1"/>
+          <p:cNvSpPr>
+            <a:spLocks noGrp="1" noRot="1" noChangeAspect="1"/>
+          </p:cNvSpPr>
+          <p:nvPr>
+            <p:ph type="sldImg"/>
+          </p:nvPr>
+        </p:nvSpPr>
+        <p:spPr/>
+      </p:sp>
+      <p:sp>
+        <p:nvSpPr>
+          <p:cNvPr id="3" name="Notes Placeholder 2"/>
+          <p:cNvSpPr>
+            <a:spLocks noGrp="1"/>
+          </p:cNvSpPr>
+          <p:nvPr>
+            <p:ph type="body" idx="1"/>
+          </p:nvPr>
+        </p:nvSpPr>
+        <p:spPr/>
+        <p:txBody>
+          <a:bodyPr>
+            <a:normAutofit/>
+          </a:bodyPr>
+          <a:lstStyle/>
+          <a:p>
+            <a:endParaRPr lang="en-US"/>
+          </a:p>
+        </p:txBody>
+      </p:sp>
+      <p:sp>
+        <p:nvSpPr>
+          <p:cNvPr id="4" name="Slide Number Placeholder 3"/>
+          <p:cNvSpPr>
+            <a:spLocks noGrp="1"/>
+          </p:cNvSpPr>
+          <p:nvPr>
+            <p:ph type="sldNum" sz="quarter" idx="10"/>
+          </p:nvPr>
+        </p:nvSpPr>
+        <p:spPr/>
+        <p:txBody>
+          <a:bodyPr/>
+          <a:lstStyle/>
+          <a:p>
+            <a:fld id="{E1C48AFE-8526-4161-A329-94B75A3BCD37}" type="slidenum">
+              <a:rPr lang="en-US" smtClean="0"/>
+              <a:t>15</a:t>
+            </a:fld>
+            <a:endParaRPr lang="en-US"/>
+          </a:p>
+        </p:txBody>
+      </p:sp>
+    </p:spTree>
+  </p:cSld>
+  <p:clrMapOvr>
+    <a:masterClrMapping/>
+  </p:clrMapOvr>
+</p:notes>
+</file>
+
+<file path=ppt/notesSlides/notesSlide16.xml><?xml version="1.0" encoding="utf-8"?>
+<p:notes xmlns:a="http://schemas.openxmlformats.org/drawingml/2006/main" xmlns:r="http://schemas.openxmlformats.org/officeDocument/2006/relationships" xmlns:p="http://schemas.openxmlformats.org/presentationml/2006/main">
+  <p:cSld>
+    <p:spTree>
+      <p:nvGrpSpPr>
+        <p:cNvPr id="1" name=""/>
+        <p:cNvGrpSpPr/>
+        <p:nvPr/>
+      </p:nvGrpSpPr>
+      <p:grpSpPr>
+        <a:xfrm>
+          <a:off x="0" y="0"/>
+          <a:ext cx="0" cy="0"/>
+          <a:chOff x="0" y="0"/>
+          <a:chExt cx="0" cy="0"/>
+        </a:xfrm>
+      </p:grpSpPr>
+      <p:sp>
+        <p:nvSpPr>
+          <p:cNvPr id="2" name="Slide Image Placeholder 1"/>
+          <p:cNvSpPr>
+            <a:spLocks noGrp="1" noRot="1" noChangeAspect="1"/>
+          </p:cNvSpPr>
+          <p:nvPr>
+            <p:ph type="sldImg"/>
+          </p:nvPr>
+        </p:nvSpPr>
+        <p:spPr/>
+      </p:sp>
+      <p:sp>
+        <p:nvSpPr>
+          <p:cNvPr id="3" name="Notes Placeholder 2"/>
+          <p:cNvSpPr>
+            <a:spLocks noGrp="1"/>
+          </p:cNvSpPr>
+          <p:nvPr>
+            <p:ph type="body" idx="1"/>
+          </p:nvPr>
+        </p:nvSpPr>
+        <p:spPr/>
+        <p:txBody>
+          <a:bodyPr>
+            <a:normAutofit/>
+          </a:bodyPr>
+          <a:lstStyle/>
+          <a:p>
+            <a:endParaRPr lang="en-US"/>
+          </a:p>
+        </p:txBody>
+      </p:sp>
+      <p:sp>
+        <p:nvSpPr>
+          <p:cNvPr id="4" name="Slide Number Placeholder 3"/>
+          <p:cNvSpPr>
+            <a:spLocks noGrp="1"/>
+          </p:cNvSpPr>
+          <p:nvPr>
+            <p:ph type="sldNum" sz="quarter" idx="10"/>
+          </p:nvPr>
+        </p:nvSpPr>
+        <p:spPr/>
+        <p:txBody>
+          <a:bodyPr/>
+          <a:lstStyle/>
+          <a:p>
+            <a:fld id="{E1C48AFE-8526-4161-A329-94B75A3BCD37}" type="slidenum">
+              <a:rPr lang="en-US" smtClean="0"/>
+              <a:t>16</a:t>
+            </a:fld>
+            <a:endParaRPr lang="en-US"/>
+          </a:p>
+        </p:txBody>
+      </p:sp>
+    </p:spTree>
+  </p:cSld>
+  <p:clrMapOvr>
+    <a:masterClrMapping/>
+  </p:clrMapOvr>
+</p:notes>
+</file>
+
+<file path=ppt/notesSlides/notesSlide17.xml><?xml version="1.0" encoding="utf-8"?>
+<p:notes xmlns:a="http://schemas.openxmlformats.org/drawingml/2006/main" xmlns:r="http://schemas.openxmlformats.org/officeDocument/2006/relationships" xmlns:p="http://schemas.openxmlformats.org/presentationml/2006/main">
+  <p:cSld>
+    <p:spTree>
+      <p:nvGrpSpPr>
+        <p:cNvPr id="1" name=""/>
+        <p:cNvGrpSpPr/>
+        <p:nvPr/>
+      </p:nvGrpSpPr>
+      <p:grpSpPr>
+        <a:xfrm>
+          <a:off x="0" y="0"/>
+          <a:ext cx="0" cy="0"/>
+          <a:chOff x="0" y="0"/>
+          <a:chExt cx="0" cy="0"/>
+        </a:xfrm>
+      </p:grpSpPr>
+      <p:sp>
+        <p:nvSpPr>
+          <p:cNvPr id="2" name="Slide Image Placeholder 1"/>
+          <p:cNvSpPr>
+            <a:spLocks noGrp="1" noRot="1" noChangeAspect="1"/>
+          </p:cNvSpPr>
+          <p:nvPr>
+            <p:ph type="sldImg"/>
+          </p:nvPr>
+        </p:nvSpPr>
+        <p:spPr/>
+      </p:sp>
+      <p:sp>
+        <p:nvSpPr>
+          <p:cNvPr id="3" name="Notes Placeholder 2"/>
+          <p:cNvSpPr>
+            <a:spLocks noGrp="1"/>
+          </p:cNvSpPr>
+          <p:nvPr>
+            <p:ph type="body" idx="1"/>
+          </p:nvPr>
+        </p:nvSpPr>
+        <p:spPr/>
+        <p:txBody>
+          <a:bodyPr>
+            <a:normAutofit/>
+          </a:bodyPr>
+          <a:lstStyle/>
+          <a:p>
+            <a:endParaRPr lang="en-US"/>
+          </a:p>
+        </p:txBody>
+      </p:sp>
+      <p:sp>
+        <p:nvSpPr>
+          <p:cNvPr id="4" name="Slide Number Placeholder 3"/>
+          <p:cNvSpPr>
+            <a:spLocks noGrp="1"/>
+          </p:cNvSpPr>
+          <p:nvPr>
+            <p:ph type="sldNum" sz="quarter" idx="10"/>
+          </p:nvPr>
+        </p:nvSpPr>
+        <p:spPr/>
+        <p:txBody>
+          <a:bodyPr/>
+          <a:lstStyle/>
+          <a:p>
+            <a:fld id="{E1C48AFE-8526-4161-A329-94B75A3BCD37}" type="slidenum">
+              <a:rPr lang="en-US" smtClean="0"/>
+              <a:t>17</a:t>
+            </a:fld>
+            <a:endParaRPr lang="en-US"/>
+          </a:p>
+        </p:txBody>
+      </p:sp>
+    </p:spTree>
+  </p:cSld>
+  <p:clrMapOvr>
+    <a:masterClrMapping/>
+  </p:clrMapOvr>
+</p:notes>
+</file>
+
+<file path=ppt/notesSlides/notesSlide18.xml><?xml version="1.0" encoding="utf-8"?>
+<p:notes xmlns:a="http://schemas.openxmlformats.org/drawingml/2006/main" xmlns:r="http://schemas.openxmlformats.org/officeDocument/2006/relationships" xmlns:p="http://schemas.openxmlformats.org/presentationml/2006/main">
+  <p:cSld>
+    <p:spTree>
+      <p:nvGrpSpPr>
+        <p:cNvPr id="1" name=""/>
+        <p:cNvGrpSpPr/>
+        <p:nvPr/>
+      </p:nvGrpSpPr>
+      <p:grpSpPr>
+        <a:xfrm>
+          <a:off x="0" y="0"/>
+          <a:ext cx="0" cy="0"/>
+          <a:chOff x="0" y="0"/>
+          <a:chExt cx="0" cy="0"/>
+        </a:xfrm>
+      </p:grpSpPr>
+      <p:sp>
+        <p:nvSpPr>
+          <p:cNvPr id="2" name="Slide Image Placeholder 1"/>
+          <p:cNvSpPr>
+            <a:spLocks noGrp="1" noRot="1" noChangeAspect="1"/>
+          </p:cNvSpPr>
+          <p:nvPr>
+            <p:ph type="sldImg"/>
+          </p:nvPr>
+        </p:nvSpPr>
+        <p:spPr/>
+      </p:sp>
+      <p:sp>
+        <p:nvSpPr>
+          <p:cNvPr id="3" name="Notes Placeholder 2"/>
+          <p:cNvSpPr>
+            <a:spLocks noGrp="1"/>
+          </p:cNvSpPr>
+          <p:nvPr>
+            <p:ph type="body" idx="1"/>
+          </p:nvPr>
+        </p:nvSpPr>
+        <p:spPr/>
+        <p:txBody>
+          <a:bodyPr>
+            <a:normAutofit/>
+          </a:bodyPr>
+          <a:lstStyle/>
+          <a:p>
+            <a:endParaRPr lang="en-US"/>
+          </a:p>
+        </p:txBody>
+      </p:sp>
+      <p:sp>
+        <p:nvSpPr>
+          <p:cNvPr id="4" name="Slide Number Placeholder 3"/>
+          <p:cNvSpPr>
+            <a:spLocks noGrp="1"/>
+          </p:cNvSpPr>
+          <p:nvPr>
+            <p:ph type="sldNum" sz="quarter" idx="10"/>
+          </p:nvPr>
+        </p:nvSpPr>
+        <p:spPr/>
+        <p:txBody>
+          <a:bodyPr/>
+          <a:lstStyle/>
+          <a:p>
+            <a:fld id="{E1C48AFE-8526-4161-A329-94B75A3BCD37}" type="slidenum">
+              <a:rPr lang="en-US" smtClean="0"/>
+              <a:t>18</a:t>
+            </a:fld>
+            <a:endParaRPr lang="en-US"/>
+          </a:p>
+        </p:txBody>
+      </p:sp>
+    </p:spTree>
+  </p:cSld>
+  <p:clrMapOvr>
+    <a:masterClrMapping/>
+  </p:clrMapOvr>
+</p:notes>
+</file>
+
+<file path=ppt/notesSlides/notesSlide19.xml><?xml version="1.0" encoding="utf-8"?>
+<p:notes xmlns:a="http://schemas.openxmlformats.org/drawingml/2006/main" xmlns:r="http://schemas.openxmlformats.org/officeDocument/2006/relationships" xmlns:p="http://schemas.openxmlformats.org/presentationml/2006/main">
+  <p:cSld>
+    <p:spTree>
+      <p:nvGrpSpPr>
+        <p:cNvPr id="1" name=""/>
+        <p:cNvGrpSpPr/>
+        <p:nvPr/>
+      </p:nvGrpSpPr>
+      <p:grpSpPr>
+        <a:xfrm>
+          <a:off x="0" y="0"/>
+          <a:ext cx="0" cy="0"/>
+          <a:chOff x="0" y="0"/>
+          <a:chExt cx="0" cy="0"/>
+        </a:xfrm>
+      </p:grpSpPr>
+      <p:sp>
+        <p:nvSpPr>
+          <p:cNvPr id="2" name="Slide Image Placeholder 1"/>
+          <p:cNvSpPr>
+            <a:spLocks noGrp="1" noRot="1" noChangeAspect="1"/>
+          </p:cNvSpPr>
+          <p:nvPr>
+            <p:ph type="sldImg"/>
+          </p:nvPr>
+        </p:nvSpPr>
+        <p:spPr/>
+      </p:sp>
+      <p:sp>
+        <p:nvSpPr>
+          <p:cNvPr id="3" name="Notes Placeholder 2"/>
+          <p:cNvSpPr>
+            <a:spLocks noGrp="1"/>
+          </p:cNvSpPr>
+          <p:nvPr>
+            <p:ph type="body" idx="1"/>
+          </p:nvPr>
+        </p:nvSpPr>
+        <p:spPr/>
+        <p:txBody>
+          <a:bodyPr>
+            <a:normAutofit/>
+          </a:bodyPr>
+          <a:lstStyle/>
+          <a:p>
+            <a:endParaRPr lang="en-US"/>
+          </a:p>
+        </p:txBody>
+      </p:sp>
+      <p:sp>
+        <p:nvSpPr>
+          <p:cNvPr id="4" name="Slide Number Placeholder 3"/>
+          <p:cNvSpPr>
+            <a:spLocks noGrp="1"/>
+          </p:cNvSpPr>
+          <p:nvPr>
+            <p:ph type="sldNum" sz="quarter" idx="10"/>
+          </p:nvPr>
+        </p:nvSpPr>
+        <p:spPr/>
+        <p:txBody>
+          <a:bodyPr/>
+          <a:lstStyle/>
+          <a:p>
+            <a:fld id="{E1C48AFE-8526-4161-A329-94B75A3BCD37}" type="slidenum">
+              <a:rPr lang="en-US" smtClean="0"/>
+              <a:t>19</a:t>
+            </a:fld>
+            <a:endParaRPr lang="en-US"/>
+          </a:p>
+        </p:txBody>
+      </p:sp>
+    </p:spTree>
+  </p:cSld>
+  <p:clrMapOvr>
+    <a:masterClrMapping/>
+  </p:clrMapOvr>
+</p:notes>
+</file>
+
+<file path=ppt/notesSlides/notesSlide2.xml><?xml version="1.0" encoding="utf-8"?>
+<p:notes xmlns:a="http://schemas.openxmlformats.org/drawingml/2006/main" xmlns:r="http://schemas.openxmlformats.org/officeDocument/2006/relationships" xmlns:p="http://schemas.openxmlformats.org/presentationml/2006/main">
+  <p:cSld>
+    <p:spTree>
+      <p:nvGrpSpPr>
+        <p:cNvPr id="1" name=""/>
+        <p:cNvGrpSpPr/>
+        <p:nvPr/>
+      </p:nvGrpSpPr>
+      <p:grpSpPr>
+        <a:xfrm>
+          <a:off x="0" y="0"/>
+          <a:ext cx="0" cy="0"/>
+          <a:chOff x="0" y="0"/>
+          <a:chExt cx="0" cy="0"/>
+        </a:xfrm>
+      </p:grpSpPr>
+      <p:sp>
+        <p:nvSpPr>
+          <p:cNvPr id="2" name="Slide Image Placeholder 1"/>
+          <p:cNvSpPr>
+            <a:spLocks noGrp="1" noRot="1" noChangeAspect="1"/>
+          </p:cNvSpPr>
+          <p:nvPr>
+            <p:ph type="sldImg"/>
+          </p:nvPr>
+        </p:nvSpPr>
+        <p:spPr/>
+      </p:sp>
+      <p:sp>
+        <p:nvSpPr>
+          <p:cNvPr id="3" name="Notes Placeholder 2"/>
+          <p:cNvSpPr>
+            <a:spLocks noGrp="1"/>
+          </p:cNvSpPr>
+          <p:nvPr>
+            <p:ph type="body" idx="1"/>
+          </p:nvPr>
+        </p:nvSpPr>
+        <p:spPr/>
+        <p:txBody>
+          <a:bodyPr>
+            <a:normAutofit/>
+          </a:bodyPr>
+          <a:lstStyle/>
+          <a:p>
+            <a:endParaRPr lang="en-US"/>
+          </a:p>
+        </p:txBody>
+      </p:sp>
+      <p:sp>
+        <p:nvSpPr>
+          <p:cNvPr id="4" name="Slide Number Placeholder 3"/>
+          <p:cNvSpPr>
+            <a:spLocks noGrp="1"/>
+          </p:cNvSpPr>
+          <p:nvPr>
+            <p:ph type="sldNum" sz="quarter" idx="10"/>
+          </p:nvPr>
+        </p:nvSpPr>
+        <p:spPr/>
+        <p:txBody>
+          <a:bodyPr/>
+          <a:lstStyle/>
+          <a:p>
+            <a:fld id="{E1C48AFE-8526-4161-A329-94B75A3BCD37}" type="slidenum">
+              <a:rPr lang="en-US" smtClean="0"/>
+              <a:t>2</a:t>
+            </a:fld>
+            <a:endParaRPr lang="en-US"/>
+          </a:p>
+        </p:txBody>
+      </p:sp>
+    </p:spTree>
+  </p:cSld>
+  <p:clrMapOvr>
+    <a:masterClrMapping/>
+  </p:clrMapOvr>
+</p:notes>
+</file>
+
+<file path=ppt/notesSlides/notesSlide20.xml><?xml version="1.0" encoding="utf-8"?>
+<p:notes xmlns:a="http://schemas.openxmlformats.org/drawingml/2006/main" xmlns:r="http://schemas.openxmlformats.org/officeDocument/2006/relationships" xmlns:p="http://schemas.openxmlformats.org/presentationml/2006/main">
+  <p:cSld>
+    <p:spTree>
+      <p:nvGrpSpPr>
+        <p:cNvPr id="1" name=""/>
+        <p:cNvGrpSpPr/>
+        <p:nvPr/>
+      </p:nvGrpSpPr>
+      <p:grpSpPr>
+        <a:xfrm>
+          <a:off x="0" y="0"/>
+          <a:ext cx="0" cy="0"/>
+          <a:chOff x="0" y="0"/>
+          <a:chExt cx="0" cy="0"/>
+        </a:xfrm>
+      </p:grpSpPr>
+      <p:sp>
+        <p:nvSpPr>
+          <p:cNvPr id="2" name="Slide Image Placeholder 1"/>
+          <p:cNvSpPr>
+            <a:spLocks noGrp="1" noRot="1" noChangeAspect="1"/>
+          </p:cNvSpPr>
+          <p:nvPr>
+            <p:ph type="sldImg"/>
+          </p:nvPr>
+        </p:nvSpPr>
+        <p:spPr/>
+      </p:sp>
+      <p:sp>
+        <p:nvSpPr>
+          <p:cNvPr id="3" name="Notes Placeholder 2"/>
+          <p:cNvSpPr>
+            <a:spLocks noGrp="1"/>
+          </p:cNvSpPr>
+          <p:nvPr>
+            <p:ph type="body" idx="1"/>
+          </p:nvPr>
+        </p:nvSpPr>
+        <p:spPr/>
+        <p:txBody>
+          <a:bodyPr>
+            <a:normAutofit/>
+          </a:bodyPr>
+          <a:lstStyle/>
+          <a:p>
+            <a:endParaRPr lang="en-US"/>
+          </a:p>
+        </p:txBody>
+      </p:sp>
+      <p:sp>
+        <p:nvSpPr>
+          <p:cNvPr id="4" name="Slide Number Placeholder 3"/>
+          <p:cNvSpPr>
+            <a:spLocks noGrp="1"/>
+          </p:cNvSpPr>
+          <p:nvPr>
+            <p:ph type="sldNum" sz="quarter" idx="10"/>
+          </p:nvPr>
+        </p:nvSpPr>
+        <p:spPr/>
+        <p:txBody>
+          <a:bodyPr/>
+          <a:lstStyle/>
+          <a:p>
+            <a:fld id="{E1C48AFE-8526-4161-A329-94B75A3BCD37}" type="slidenum">
+              <a:rPr lang="en-US" smtClean="0"/>
+              <a:t>20</a:t>
+            </a:fld>
+            <a:endParaRPr lang="en-US"/>
+          </a:p>
+        </p:txBody>
+      </p:sp>
+    </p:spTree>
+  </p:cSld>
+  <p:clrMapOvr>
+    <a:masterClrMapping/>
+  </p:clrMapOvr>
+</p:notes>
+</file>
+
+<file path=ppt/notesSlides/notesSlide21.xml><?xml version="1.0" encoding="utf-8"?>
+<p:notes xmlns:a="http://schemas.openxmlformats.org/drawingml/2006/main" xmlns:r="http://schemas.openxmlformats.org/officeDocument/2006/relationships" xmlns:p="http://schemas.openxmlformats.org/presentationml/2006/main">
+  <p:cSld>
+    <p:spTree>
+      <p:nvGrpSpPr>
+        <p:cNvPr id="1" name=""/>
+        <p:cNvGrpSpPr/>
+        <p:nvPr/>
+      </p:nvGrpSpPr>
+      <p:grpSpPr>
+        <a:xfrm>
+          <a:off x="0" y="0"/>
+          <a:ext cx="0" cy="0"/>
+          <a:chOff x="0" y="0"/>
+          <a:chExt cx="0" cy="0"/>
+        </a:xfrm>
+      </p:grpSpPr>
+      <p:sp>
+        <p:nvSpPr>
+          <p:cNvPr id="2" name="Slide Image Placeholder 1"/>
+          <p:cNvSpPr>
+            <a:spLocks noGrp="1" noRot="1" noChangeAspect="1"/>
+          </p:cNvSpPr>
+          <p:nvPr>
+            <p:ph type="sldImg"/>
+          </p:nvPr>
+        </p:nvSpPr>
+        <p:spPr/>
+      </p:sp>
+      <p:sp>
+        <p:nvSpPr>
+          <p:cNvPr id="3" name="Notes Placeholder 2"/>
+          <p:cNvSpPr>
+            <a:spLocks noGrp="1"/>
+          </p:cNvSpPr>
+          <p:nvPr>
+            <p:ph type="body" idx="1"/>
+          </p:nvPr>
+        </p:nvSpPr>
+        <p:spPr/>
+        <p:txBody>
+          <a:bodyPr>
+            <a:normAutofit/>
+          </a:bodyPr>
+          <a:lstStyle/>
+          <a:p>
+            <a:endParaRPr lang="en-US"/>
+          </a:p>
+        </p:txBody>
+      </p:sp>
+      <p:sp>
+        <p:nvSpPr>
+          <p:cNvPr id="4" name="Slide Number Placeholder 3"/>
+          <p:cNvSpPr>
+            <a:spLocks noGrp="1"/>
+          </p:cNvSpPr>
+          <p:nvPr>
+            <p:ph type="sldNum" sz="quarter" idx="10"/>
+          </p:nvPr>
+        </p:nvSpPr>
+        <p:spPr/>
+        <p:txBody>
+          <a:bodyPr/>
+          <a:lstStyle/>
+          <a:p>
+            <a:fld id="{E1C48AFE-8526-4161-A329-94B75A3BCD37}" type="slidenum">
+              <a:rPr lang="en-US" smtClean="0"/>
+              <a:t>21</a:t>
+            </a:fld>
+            <a:endParaRPr lang="en-US"/>
+          </a:p>
+        </p:txBody>
+      </p:sp>
+    </p:spTree>
+  </p:cSld>
+  <p:clrMapOvr>
+    <a:masterClrMapping/>
+  </p:clrMapOvr>
+</p:notes>
+</file>
+
+<file path=ppt/notesSlides/notesSlide22.xml><?xml version="1.0" encoding="utf-8"?>
+<p:notes xmlns:a="http://schemas.openxmlformats.org/drawingml/2006/main" xmlns:r="http://schemas.openxmlformats.org/officeDocument/2006/relationships" xmlns:p="http://schemas.openxmlformats.org/presentationml/2006/main">
+  <p:cSld>
+    <p:spTree>
+      <p:nvGrpSpPr>
+        <p:cNvPr id="1" name=""/>
+        <p:cNvGrpSpPr/>
+        <p:nvPr/>
+      </p:nvGrpSpPr>
+      <p:grpSpPr>
+        <a:xfrm>
+          <a:off x="0" y="0"/>
+          <a:ext cx="0" cy="0"/>
+          <a:chOff x="0" y="0"/>
+          <a:chExt cx="0" cy="0"/>
+        </a:xfrm>
+      </p:grpSpPr>
+      <p:sp>
+        <p:nvSpPr>
+          <p:cNvPr id="2" name="Slide Image Placeholder 1"/>
+          <p:cNvSpPr>
+            <a:spLocks noGrp="1" noRot="1" noChangeAspect="1"/>
+          </p:cNvSpPr>
+          <p:nvPr>
+            <p:ph type="sldImg"/>
+          </p:nvPr>
+        </p:nvSpPr>
+        <p:spPr/>
+      </p:sp>
+      <p:sp>
+        <p:nvSpPr>
+          <p:cNvPr id="3" name="Notes Placeholder 2"/>
+          <p:cNvSpPr>
+            <a:spLocks noGrp="1"/>
+          </p:cNvSpPr>
+          <p:nvPr>
+            <p:ph type="body" idx="1"/>
+          </p:nvPr>
+        </p:nvSpPr>
+        <p:spPr/>
+        <p:txBody>
+          <a:bodyPr>
+            <a:normAutofit/>
+          </a:bodyPr>
+          <a:lstStyle/>
+          <a:p>
+            <a:endParaRPr lang="en-US"/>
+          </a:p>
+        </p:txBody>
+      </p:sp>
+      <p:sp>
+        <p:nvSpPr>
+          <p:cNvPr id="4" name="Slide Number Placeholder 3"/>
+          <p:cNvSpPr>
+            <a:spLocks noGrp="1"/>
+          </p:cNvSpPr>
+          <p:nvPr>
+            <p:ph type="sldNum" sz="quarter" idx="10"/>
+          </p:nvPr>
+        </p:nvSpPr>
+        <p:spPr/>
+        <p:txBody>
+          <a:bodyPr/>
+          <a:lstStyle/>
+          <a:p>
+            <a:fld id="{E1C48AFE-8526-4161-A329-94B75A3BCD37}" type="slidenum">
+              <a:rPr lang="en-US" smtClean="0"/>
+              <a:t>22</a:t>
+            </a:fld>
+            <a:endParaRPr lang="en-US"/>
+          </a:p>
+        </p:txBody>
+      </p:sp>
+    </p:spTree>
+  </p:cSld>
+  <p:clrMapOvr>
+    <a:masterClrMapping/>
+  </p:clrMapOvr>
+</p:notes>
+</file>
+
+<file path=ppt/notesSlides/notesSlide23.xml><?xml version="1.0" encoding="utf-8"?>
+<p:notes xmlns:a="http://schemas.openxmlformats.org/drawingml/2006/main" xmlns:r="http://schemas.openxmlformats.org/officeDocument/2006/relationships" xmlns:p="http://schemas.openxmlformats.org/presentationml/2006/main">
+  <p:cSld>
+    <p:spTree>
+      <p:nvGrpSpPr>
+        <p:cNvPr id="1" name=""/>
+        <p:cNvGrpSpPr/>
+        <p:nvPr/>
+      </p:nvGrpSpPr>
+      <p:grpSpPr>
+        <a:xfrm>
+          <a:off x="0" y="0"/>
+          <a:ext cx="0" cy="0"/>
+          <a:chOff x="0" y="0"/>
+          <a:chExt cx="0" cy="0"/>
+        </a:xfrm>
+      </p:grpSpPr>
+      <p:sp>
+        <p:nvSpPr>
+          <p:cNvPr id="2" name="Slide Image Placeholder 1"/>
+          <p:cNvSpPr>
+            <a:spLocks noGrp="1" noRot="1" noChangeAspect="1"/>
+          </p:cNvSpPr>
+          <p:nvPr>
+            <p:ph type="sldImg"/>
+          </p:nvPr>
+        </p:nvSpPr>
+        <p:spPr/>
+      </p:sp>
+      <p:sp>
+        <p:nvSpPr>
+          <p:cNvPr id="3" name="Notes Placeholder 2"/>
+          <p:cNvSpPr>
+            <a:spLocks noGrp="1"/>
+          </p:cNvSpPr>
+          <p:nvPr>
+            <p:ph type="body" idx="1"/>
+          </p:nvPr>
+        </p:nvSpPr>
+        <p:spPr/>
+        <p:txBody>
+          <a:bodyPr>
+            <a:normAutofit/>
+          </a:bodyPr>
+          <a:lstStyle/>
+          <a:p>
+            <a:endParaRPr lang="en-US"/>
+          </a:p>
+        </p:txBody>
+      </p:sp>
+      <p:sp>
+        <p:nvSpPr>
+          <p:cNvPr id="4" name="Slide Number Placeholder 3"/>
+          <p:cNvSpPr>
+            <a:spLocks noGrp="1"/>
+          </p:cNvSpPr>
+          <p:nvPr>
+            <p:ph type="sldNum" sz="quarter" idx="10"/>
+          </p:nvPr>
+        </p:nvSpPr>
+        <p:spPr/>
+        <p:txBody>
+          <a:bodyPr/>
+          <a:lstStyle/>
+          <a:p>
+            <a:fld id="{E1C48AFE-8526-4161-A329-94B75A3BCD37}" type="slidenum">
+              <a:rPr lang="en-US" smtClean="0"/>
+              <a:t>23</a:t>
+            </a:fld>
+            <a:endParaRPr lang="en-US"/>
+          </a:p>
+        </p:txBody>
+      </p:sp>
+    </p:spTree>
+  </p:cSld>
+  <p:clrMapOvr>
+    <a:masterClrMapping/>
+  </p:clrMapOvr>
+</p:notes>
+</file>
+
+<file path=ppt/notesSlides/notesSlide24.xml><?xml version="1.0" encoding="utf-8"?>
+<p:notes xmlns:a="http://schemas.openxmlformats.org/drawingml/2006/main" xmlns:r="http://schemas.openxmlformats.org/officeDocument/2006/relationships" xmlns:p="http://schemas.openxmlformats.org/presentationml/2006/main">
+  <p:cSld>
+    <p:spTree>
+      <p:nvGrpSpPr>
+        <p:cNvPr id="1" name=""/>
+        <p:cNvGrpSpPr/>
+        <p:nvPr/>
+      </p:nvGrpSpPr>
+      <p:grpSpPr>
+        <a:xfrm>
+          <a:off x="0" y="0"/>
+          <a:ext cx="0" cy="0"/>
+          <a:chOff x="0" y="0"/>
+          <a:chExt cx="0" cy="0"/>
+        </a:xfrm>
+      </p:grpSpPr>
+      <p:sp>
+        <p:nvSpPr>
+          <p:cNvPr id="2" name="Slide Image Placeholder 1"/>
+          <p:cNvSpPr>
+            <a:spLocks noGrp="1" noRot="1" noChangeAspect="1"/>
+          </p:cNvSpPr>
+          <p:nvPr>
+            <p:ph type="sldImg"/>
+          </p:nvPr>
+        </p:nvSpPr>
+        <p:spPr/>
+      </p:sp>
+      <p:sp>
+        <p:nvSpPr>
+          <p:cNvPr id="3" name="Notes Placeholder 2"/>
+          <p:cNvSpPr>
+            <a:spLocks noGrp="1"/>
+          </p:cNvSpPr>
+          <p:nvPr>
+            <p:ph type="body" idx="1"/>
+          </p:nvPr>
+        </p:nvSpPr>
+        <p:spPr/>
+        <p:txBody>
+          <a:bodyPr>
+            <a:normAutofit/>
+          </a:bodyPr>
+          <a:lstStyle/>
+          <a:p>
+            <a:endParaRPr lang="en-US"/>
+          </a:p>
+        </p:txBody>
+      </p:sp>
+      <p:sp>
+        <p:nvSpPr>
+          <p:cNvPr id="4" name="Slide Number Placeholder 3"/>
+          <p:cNvSpPr>
+            <a:spLocks noGrp="1"/>
+          </p:cNvSpPr>
+          <p:nvPr>
+            <p:ph type="sldNum" sz="quarter" idx="10"/>
+          </p:nvPr>
+        </p:nvSpPr>
+        <p:spPr/>
+        <p:txBody>
+          <a:bodyPr/>
+          <a:lstStyle/>
+          <a:p>
+            <a:fld id="{E1C48AFE-8526-4161-A329-94B75A3BCD37}" type="slidenum">
+              <a:rPr lang="en-US" smtClean="0"/>
+              <a:t>24</a:t>
+            </a:fld>
+            <a:endParaRPr lang="en-US"/>
+          </a:p>
+        </p:txBody>
+      </p:sp>
+    </p:spTree>
+  </p:cSld>
+  <p:clrMapOvr>
+    <a:masterClrMapping/>
+  </p:clrMapOvr>
+</p:notes>
+</file>
+
+<file path=ppt/notesSlides/notesSlide25.xml><?xml version="1.0" encoding="utf-8"?>
+<p:notes xmlns:a="http://schemas.openxmlformats.org/drawingml/2006/main" xmlns:r="http://schemas.openxmlformats.org/officeDocument/2006/relationships" xmlns:p="http://schemas.openxmlformats.org/presentationml/2006/main">
+  <p:cSld>
+    <p:spTree>
+      <p:nvGrpSpPr>
+        <p:cNvPr id="1" name=""/>
+        <p:cNvGrpSpPr/>
+        <p:nvPr/>
+      </p:nvGrpSpPr>
+      <p:grpSpPr>
+        <a:xfrm>
+          <a:off x="0" y="0"/>
+          <a:ext cx="0" cy="0"/>
+          <a:chOff x="0" y="0"/>
+          <a:chExt cx="0" cy="0"/>
+        </a:xfrm>
+      </p:grpSpPr>
+      <p:sp>
+        <p:nvSpPr>
+          <p:cNvPr id="2" name="Slide Image Placeholder 1"/>
+          <p:cNvSpPr>
+            <a:spLocks noGrp="1" noRot="1" noChangeAspect="1"/>
+          </p:cNvSpPr>
+          <p:nvPr>
+            <p:ph type="sldImg"/>
+          </p:nvPr>
+        </p:nvSpPr>
+        <p:spPr/>
+      </p:sp>
+      <p:sp>
+        <p:nvSpPr>
+          <p:cNvPr id="3" name="Notes Placeholder 2"/>
+          <p:cNvSpPr>
+            <a:spLocks noGrp="1"/>
+          </p:cNvSpPr>
+          <p:nvPr>
+            <p:ph type="body" idx="1"/>
+          </p:nvPr>
+        </p:nvSpPr>
+        <p:spPr/>
+        <p:txBody>
+          <a:bodyPr>
+            <a:normAutofit/>
+          </a:bodyPr>
+          <a:lstStyle/>
+          <a:p>
+            <a:endParaRPr lang="en-US"/>
+          </a:p>
+        </p:txBody>
+      </p:sp>
+      <p:sp>
+        <p:nvSpPr>
+          <p:cNvPr id="4" name="Slide Number Placeholder 3"/>
+          <p:cNvSpPr>
+            <a:spLocks noGrp="1"/>
+          </p:cNvSpPr>
+          <p:nvPr>
+            <p:ph type="sldNum" sz="quarter" idx="10"/>
+          </p:nvPr>
+        </p:nvSpPr>
+        <p:spPr/>
+        <p:txBody>
+          <a:bodyPr/>
+          <a:lstStyle/>
+          <a:p>
+            <a:fld id="{E1C48AFE-8526-4161-A329-94B75A3BCD37}" type="slidenum">
+              <a:rPr lang="en-US" smtClean="0"/>
+              <a:t>25</a:t>
+            </a:fld>
+            <a:endParaRPr lang="en-US"/>
+          </a:p>
+        </p:txBody>
+      </p:sp>
+    </p:spTree>
+  </p:cSld>
+  <p:clrMapOvr>
+    <a:masterClrMapping/>
+  </p:clrMapOvr>
+</p:notes>
+</file>
+
+<file path=ppt/notesSlides/notesSlide26.xml><?xml version="1.0" encoding="utf-8"?>
+<p:notes xmlns:a="http://schemas.openxmlformats.org/drawingml/2006/main" xmlns:r="http://schemas.openxmlformats.org/officeDocument/2006/relationships" xmlns:p="http://schemas.openxmlformats.org/presentationml/2006/main">
+  <p:cSld>
+    <p:spTree>
+      <p:nvGrpSpPr>
+        <p:cNvPr id="1" name=""/>
+        <p:cNvGrpSpPr/>
+        <p:nvPr/>
+      </p:nvGrpSpPr>
+      <p:grpSpPr>
+        <a:xfrm>
+          <a:off x="0" y="0"/>
+          <a:ext cx="0" cy="0"/>
+          <a:chOff x="0" y="0"/>
+          <a:chExt cx="0" cy="0"/>
+        </a:xfrm>
+      </p:grpSpPr>
+      <p:sp>
+        <p:nvSpPr>
+          <p:cNvPr id="2" name="Slide Image Placeholder 1"/>
+          <p:cNvSpPr>
+            <a:spLocks noGrp="1" noRot="1" noChangeAspect="1"/>
+          </p:cNvSpPr>
+          <p:nvPr>
+            <p:ph type="sldImg"/>
+          </p:nvPr>
+        </p:nvSpPr>
+        <p:spPr/>
+      </p:sp>
+      <p:sp>
+        <p:nvSpPr>
+          <p:cNvPr id="3" name="Notes Placeholder 2"/>
+          <p:cNvSpPr>
+            <a:spLocks noGrp="1"/>
+          </p:cNvSpPr>
+          <p:nvPr>
+            <p:ph type="body" idx="1"/>
+          </p:nvPr>
+        </p:nvSpPr>
+        <p:spPr/>
+        <p:txBody>
+          <a:bodyPr>
+            <a:normAutofit/>
+          </a:bodyPr>
+          <a:lstStyle/>
+          <a:p>
+            <a:endParaRPr lang="en-US"/>
+          </a:p>
+        </p:txBody>
+      </p:sp>
+      <p:sp>
+        <p:nvSpPr>
+          <p:cNvPr id="4" name="Slide Number Placeholder 3"/>
+          <p:cNvSpPr>
+            <a:spLocks noGrp="1"/>
+          </p:cNvSpPr>
+          <p:nvPr>
+            <p:ph type="sldNum" sz="quarter" idx="10"/>
+          </p:nvPr>
+        </p:nvSpPr>
+        <p:spPr/>
+        <p:txBody>
+          <a:bodyPr/>
+          <a:lstStyle/>
+          <a:p>
+            <a:fld id="{E1C48AFE-8526-4161-A329-94B75A3BCD37}" type="slidenum">
+              <a:rPr lang="en-US" smtClean="0"/>
+              <a:t>26</a:t>
+            </a:fld>
+            <a:endParaRPr lang="en-US"/>
+          </a:p>
+        </p:txBody>
+      </p:sp>
+    </p:spTree>
+  </p:cSld>
+  <p:clrMapOvr>
+    <a:masterClrMapping/>
+  </p:clrMapOvr>
+</p:notes>
+</file>
+
+<file path=ppt/notesSlides/notesSlide27.xml><?xml version="1.0" encoding="utf-8"?>
+<p:notes xmlns:a="http://schemas.openxmlformats.org/drawingml/2006/main" xmlns:r="http://schemas.openxmlformats.org/officeDocument/2006/relationships" xmlns:p="http://schemas.openxmlformats.org/presentationml/2006/main">
+  <p:cSld>
+    <p:spTree>
+      <p:nvGrpSpPr>
+        <p:cNvPr id="1" name=""/>
+        <p:cNvGrpSpPr/>
+        <p:nvPr/>
+      </p:nvGrpSpPr>
+      <p:grpSpPr>
+        <a:xfrm>
+          <a:off x="0" y="0"/>
+          <a:ext cx="0" cy="0"/>
+          <a:chOff x="0" y="0"/>
+          <a:chExt cx="0" cy="0"/>
+        </a:xfrm>
+      </p:grpSpPr>
+      <p:sp>
+        <p:nvSpPr>
+          <p:cNvPr id="2" name="Slide Image Placeholder 1"/>
+          <p:cNvSpPr>
+            <a:spLocks noGrp="1" noRot="1" noChangeAspect="1"/>
+          </p:cNvSpPr>
+          <p:nvPr>
+            <p:ph type="sldImg"/>
+          </p:nvPr>
+        </p:nvSpPr>
+        <p:spPr/>
+      </p:sp>
+      <p:sp>
+        <p:nvSpPr>
+          <p:cNvPr id="3" name="Notes Placeholder 2"/>
+          <p:cNvSpPr>
+            <a:spLocks noGrp="1"/>
+          </p:cNvSpPr>
+          <p:nvPr>
+            <p:ph type="body" idx="1"/>
+          </p:nvPr>
+        </p:nvSpPr>
+        <p:spPr/>
+        <p:txBody>
+          <a:bodyPr>
+            <a:normAutofit/>
+          </a:bodyPr>
+          <a:lstStyle/>
+          <a:p>
+            <a:endParaRPr lang="en-US"/>
+          </a:p>
+        </p:txBody>
+      </p:sp>
+      <p:sp>
+        <p:nvSpPr>
+          <p:cNvPr id="4" name="Slide Number Placeholder 3"/>
+          <p:cNvSpPr>
+            <a:spLocks noGrp="1"/>
+          </p:cNvSpPr>
+          <p:nvPr>
+            <p:ph type="sldNum" sz="quarter" idx="10"/>
+          </p:nvPr>
+        </p:nvSpPr>
+        <p:spPr/>
+        <p:txBody>
+          <a:bodyPr/>
+          <a:lstStyle/>
+          <a:p>
+            <a:fld id="{E1C48AFE-8526-4161-A329-94B75A3BCD37}" type="slidenum">
+              <a:rPr lang="en-US" smtClean="0"/>
+              <a:t>27</a:t>
+            </a:fld>
+            <a:endParaRPr lang="en-US"/>
+          </a:p>
+        </p:txBody>
+      </p:sp>
+    </p:spTree>
+  </p:cSld>
+  <p:clrMapOvr>
+    <a:masterClrMapping/>
+  </p:clrMapOvr>
+</p:notes>
+</file>
+
+<file path=ppt/notesSlides/notesSlide28.xml><?xml version="1.0" encoding="utf-8"?>
+<p:notes xmlns:a="http://schemas.openxmlformats.org/drawingml/2006/main" xmlns:r="http://schemas.openxmlformats.org/officeDocument/2006/relationships" xmlns:p="http://schemas.openxmlformats.org/presentationml/2006/main">
+  <p:cSld>
+    <p:spTree>
+      <p:nvGrpSpPr>
+        <p:cNvPr id="1" name=""/>
+        <p:cNvGrpSpPr/>
+        <p:nvPr/>
+      </p:nvGrpSpPr>
+      <p:grpSpPr>
+        <a:xfrm>
+          <a:off x="0" y="0"/>
+          <a:ext cx="0" cy="0"/>
+          <a:chOff x="0" y="0"/>
+          <a:chExt cx="0" cy="0"/>
+        </a:xfrm>
+      </p:grpSpPr>
+      <p:sp>
+        <p:nvSpPr>
+          <p:cNvPr id="2" name="Slide Image Placeholder 1"/>
+          <p:cNvSpPr>
+            <a:spLocks noGrp="1" noRot="1" noChangeAspect="1"/>
+          </p:cNvSpPr>
+          <p:nvPr>
+            <p:ph type="sldImg"/>
+          </p:nvPr>
+        </p:nvSpPr>
+        <p:spPr/>
+      </p:sp>
+      <p:sp>
+        <p:nvSpPr>
+          <p:cNvPr id="3" name="Notes Placeholder 2"/>
+          <p:cNvSpPr>
+            <a:spLocks noGrp="1"/>
+          </p:cNvSpPr>
+          <p:nvPr>
+            <p:ph type="body" idx="1"/>
+          </p:nvPr>
+        </p:nvSpPr>
+        <p:spPr/>
+        <p:txBody>
+          <a:bodyPr>
+            <a:normAutofit/>
+          </a:bodyPr>
+          <a:lstStyle/>
+          <a:p>
+            <a:endParaRPr lang="en-US"/>
+          </a:p>
+        </p:txBody>
+      </p:sp>
+      <p:sp>
+        <p:nvSpPr>
+          <p:cNvPr id="4" name="Slide Number Placeholder 3"/>
+          <p:cNvSpPr>
+            <a:spLocks noGrp="1"/>
+          </p:cNvSpPr>
+          <p:nvPr>
+            <p:ph type="sldNum" sz="quarter" idx="10"/>
+          </p:nvPr>
+        </p:nvSpPr>
+        <p:spPr/>
+        <p:txBody>
+          <a:bodyPr/>
+          <a:lstStyle/>
+          <a:p>
+            <a:fld id="{E1C48AFE-8526-4161-A329-94B75A3BCD37}" type="slidenum">
+              <a:rPr lang="en-US" smtClean="0"/>
+              <a:t>28</a:t>
+            </a:fld>
+            <a:endParaRPr lang="en-US"/>
+          </a:p>
+        </p:txBody>
+      </p:sp>
+    </p:spTree>
+  </p:cSld>
+  <p:clrMapOvr>
+    <a:masterClrMapping/>
+  </p:clrMapOvr>
+</p:notes>
+</file>
+
+<file path=ppt/notesSlides/notesSlide29.xml><?xml version="1.0" encoding="utf-8"?>
+<p:notes xmlns:a="http://schemas.openxmlformats.org/drawingml/2006/main" xmlns:r="http://schemas.openxmlformats.org/officeDocument/2006/relationships" xmlns:p="http://schemas.openxmlformats.org/presentationml/2006/main">
+  <p:cSld>
+    <p:spTree>
+      <p:nvGrpSpPr>
+        <p:cNvPr id="1" name=""/>
+        <p:cNvGrpSpPr/>
+        <p:nvPr/>
+      </p:nvGrpSpPr>
+      <p:grpSpPr>
+        <a:xfrm>
+          <a:off x="0" y="0"/>
+          <a:ext cx="0" cy="0"/>
+          <a:chOff x="0" y="0"/>
+          <a:chExt cx="0" cy="0"/>
+        </a:xfrm>
+      </p:grpSpPr>
+      <p:sp>
+        <p:nvSpPr>
+          <p:cNvPr id="2" name="Slide Image Placeholder 1"/>
+          <p:cNvSpPr>
+            <a:spLocks noGrp="1" noRot="1" noChangeAspect="1"/>
+          </p:cNvSpPr>
+          <p:nvPr>
+            <p:ph type="sldImg"/>
+          </p:nvPr>
+        </p:nvSpPr>
+        <p:spPr/>
+      </p:sp>
+      <p:sp>
+        <p:nvSpPr>
+          <p:cNvPr id="3" name="Notes Placeholder 2"/>
+          <p:cNvSpPr>
+            <a:spLocks noGrp="1"/>
+          </p:cNvSpPr>
+          <p:nvPr>
+            <p:ph type="body" idx="1"/>
+          </p:nvPr>
+        </p:nvSpPr>
+        <p:spPr/>
+        <p:txBody>
+          <a:bodyPr>
+            <a:normAutofit/>
+          </a:bodyPr>
+          <a:lstStyle/>
+          <a:p>
+            <a:endParaRPr lang="en-US"/>
+          </a:p>
+        </p:txBody>
+      </p:sp>
+      <p:sp>
+        <p:nvSpPr>
+          <p:cNvPr id="4" name="Slide Number Placeholder 3"/>
+          <p:cNvSpPr>
+            <a:spLocks noGrp="1"/>
+          </p:cNvSpPr>
+          <p:nvPr>
+            <p:ph type="sldNum" sz="quarter" idx="10"/>
+          </p:nvPr>
+        </p:nvSpPr>
+        <p:spPr/>
+        <p:txBody>
+          <a:bodyPr/>
+          <a:lstStyle/>
+          <a:p>
+            <a:fld id="{E1C48AFE-8526-4161-A329-94B75A3BCD37}" type="slidenum">
+              <a:rPr lang="en-US" smtClean="0"/>
+              <a:t>29</a:t>
+            </a:fld>
+            <a:endParaRPr lang="en-US"/>
+          </a:p>
+        </p:txBody>
+      </p:sp>
+    </p:spTree>
+  </p:cSld>
+  <p:clrMapOvr>
+    <a:masterClrMapping/>
+  </p:clrMapOvr>
+</p:notes>
+</file>
+
+<file path=ppt/notesSlides/notesSlide3.xml><?xml version="1.0" encoding="utf-8"?>
+<p:notes xmlns:a="http://schemas.openxmlformats.org/drawingml/2006/main" xmlns:r="http://schemas.openxmlformats.org/officeDocument/2006/relationships" xmlns:p="http://schemas.openxmlformats.org/presentationml/2006/main">
+  <p:cSld>
+    <p:spTree>
+      <p:nvGrpSpPr>
+        <p:cNvPr id="1" name=""/>
+        <p:cNvGrpSpPr/>
+        <p:nvPr/>
+      </p:nvGrpSpPr>
+      <p:grpSpPr>
+        <a:xfrm>
+          <a:off x="0" y="0"/>
+          <a:ext cx="0" cy="0"/>
+          <a:chOff x="0" y="0"/>
+          <a:chExt cx="0" cy="0"/>
+        </a:xfrm>
+      </p:grpSpPr>
+      <p:sp>
+        <p:nvSpPr>
+          <p:cNvPr id="2" name="Slide Image Placeholder 1"/>
+          <p:cNvSpPr>
+            <a:spLocks noGrp="1" noRot="1" noChangeAspect="1"/>
+          </p:cNvSpPr>
+          <p:nvPr>
+            <p:ph type="sldImg"/>
+          </p:nvPr>
+        </p:nvSpPr>
+        <p:spPr/>
+      </p:sp>
+      <p:sp>
+        <p:nvSpPr>
+          <p:cNvPr id="3" name="Notes Placeholder 2"/>
+          <p:cNvSpPr>
+            <a:spLocks noGrp="1"/>
+          </p:cNvSpPr>
+          <p:nvPr>
+            <p:ph type="body" idx="1"/>
+          </p:nvPr>
+        </p:nvSpPr>
+        <p:spPr/>
+        <p:txBody>
+          <a:bodyPr>
+            <a:normAutofit/>
+          </a:bodyPr>
+          <a:lstStyle/>
+          <a:p>
+            <a:endParaRPr lang="en-US"/>
+          </a:p>
+        </p:txBody>
+      </p:sp>
+      <p:sp>
+        <p:nvSpPr>
+          <p:cNvPr id="4" name="Slide Number Placeholder 3"/>
+          <p:cNvSpPr>
+            <a:spLocks noGrp="1"/>
+          </p:cNvSpPr>
+          <p:nvPr>
+            <p:ph type="sldNum" sz="quarter" idx="10"/>
+          </p:nvPr>
+        </p:nvSpPr>
+        <p:spPr/>
+        <p:txBody>
+          <a:bodyPr/>
+          <a:lstStyle/>
+          <a:p>
+            <a:fld id="{E1C48AFE-8526-4161-A329-94B75A3BCD37}" type="slidenum">
+              <a:rPr lang="en-US" smtClean="0"/>
+              <a:t>3</a:t>
+            </a:fld>
+            <a:endParaRPr lang="en-US"/>
+          </a:p>
+        </p:txBody>
+      </p:sp>
+    </p:spTree>
+  </p:cSld>
+  <p:clrMapOvr>
+    <a:masterClrMapping/>
+  </p:clrMapOvr>
+</p:notes>
+</file>
+
+<file path=ppt/notesSlides/notesSlide30.xml><?xml version="1.0" encoding="utf-8"?>
+<p:notes xmlns:a="http://schemas.openxmlformats.org/drawingml/2006/main" xmlns:r="http://schemas.openxmlformats.org/officeDocument/2006/relationships" xmlns:p="http://schemas.openxmlformats.org/presentationml/2006/main">
+  <p:cSld>
+    <p:spTree>
+      <p:nvGrpSpPr>
+        <p:cNvPr id="1" name=""/>
+        <p:cNvGrpSpPr/>
+        <p:nvPr/>
+      </p:nvGrpSpPr>
+      <p:grpSpPr>
+        <a:xfrm>
+          <a:off x="0" y="0"/>
+          <a:ext cx="0" cy="0"/>
+          <a:chOff x="0" y="0"/>
+          <a:chExt cx="0" cy="0"/>
+        </a:xfrm>
+      </p:grpSpPr>
+      <p:sp>
+        <p:nvSpPr>
+          <p:cNvPr id="2" name="Slide Image Placeholder 1"/>
+          <p:cNvSpPr>
+            <a:spLocks noGrp="1" noRot="1" noChangeAspect="1"/>
+          </p:cNvSpPr>
+          <p:nvPr>
+            <p:ph type="sldImg"/>
+          </p:nvPr>
+        </p:nvSpPr>
+        <p:spPr/>
+      </p:sp>
+      <p:sp>
+        <p:nvSpPr>
+          <p:cNvPr id="3" name="Notes Placeholder 2"/>
+          <p:cNvSpPr>
+            <a:spLocks noGrp="1"/>
+          </p:cNvSpPr>
+          <p:nvPr>
+            <p:ph type="body" idx="1"/>
+          </p:nvPr>
+        </p:nvSpPr>
+        <p:spPr/>
+        <p:txBody>
+          <a:bodyPr>
+            <a:normAutofit/>
+          </a:bodyPr>
+          <a:lstStyle/>
+          <a:p>
+            <a:endParaRPr lang="en-US"/>
+          </a:p>
+        </p:txBody>
+      </p:sp>
+      <p:sp>
+        <p:nvSpPr>
+          <p:cNvPr id="4" name="Slide Number Placeholder 3"/>
+          <p:cNvSpPr>
+            <a:spLocks noGrp="1"/>
+          </p:cNvSpPr>
+          <p:nvPr>
+            <p:ph type="sldNum" sz="quarter" idx="10"/>
+          </p:nvPr>
+        </p:nvSpPr>
+        <p:spPr/>
+        <p:txBody>
+          <a:bodyPr/>
+          <a:lstStyle/>
+          <a:p>
+            <a:fld id="{E1C48AFE-8526-4161-A329-94B75A3BCD37}" type="slidenum">
+              <a:rPr lang="en-US" smtClean="0"/>
+              <a:t>30</a:t>
+            </a:fld>
+            <a:endParaRPr lang="en-US"/>
+          </a:p>
+        </p:txBody>
+      </p:sp>
+    </p:spTree>
+  </p:cSld>
+  <p:clrMapOvr>
+    <a:masterClrMapping/>
+  </p:clrMapOvr>
+</p:notes>
+</file>
+
+<file path=ppt/notesSlides/notesSlide31.xml><?xml version="1.0" encoding="utf-8"?>
+<p:notes xmlns:a="http://schemas.openxmlformats.org/drawingml/2006/main" xmlns:r="http://schemas.openxmlformats.org/officeDocument/2006/relationships" xmlns:p="http://schemas.openxmlformats.org/presentationml/2006/main">
+  <p:cSld>
+    <p:spTree>
+      <p:nvGrpSpPr>
+        <p:cNvPr id="1" name=""/>
+        <p:cNvGrpSpPr/>
+        <p:nvPr/>
+      </p:nvGrpSpPr>
+      <p:grpSpPr>
+        <a:xfrm>
+          <a:off x="0" y="0"/>
+          <a:ext cx="0" cy="0"/>
+          <a:chOff x="0" y="0"/>
+          <a:chExt cx="0" cy="0"/>
+        </a:xfrm>
+      </p:grpSpPr>
+      <p:sp>
+        <p:nvSpPr>
+          <p:cNvPr id="2" name="Slide Image Placeholder 1"/>
+          <p:cNvSpPr>
+            <a:spLocks noGrp="1" noRot="1" noChangeAspect="1"/>
+          </p:cNvSpPr>
+          <p:nvPr>
+            <p:ph type="sldImg"/>
+          </p:nvPr>
+        </p:nvSpPr>
+        <p:spPr/>
+      </p:sp>
+      <p:sp>
+        <p:nvSpPr>
+          <p:cNvPr id="3" name="Notes Placeholder 2"/>
+          <p:cNvSpPr>
+            <a:spLocks noGrp="1"/>
+          </p:cNvSpPr>
+          <p:nvPr>
+            <p:ph type="body" idx="1"/>
+          </p:nvPr>
+        </p:nvSpPr>
+        <p:spPr/>
+        <p:txBody>
+          <a:bodyPr>
+            <a:normAutofit/>
+          </a:bodyPr>
+          <a:lstStyle/>
+          <a:p>
+            <a:endParaRPr lang="en-US"/>
+          </a:p>
+        </p:txBody>
+      </p:sp>
+      <p:sp>
+        <p:nvSpPr>
+          <p:cNvPr id="4" name="Slide Number Placeholder 3"/>
+          <p:cNvSpPr>
+            <a:spLocks noGrp="1"/>
+          </p:cNvSpPr>
+          <p:nvPr>
+            <p:ph type="sldNum" sz="quarter" idx="10"/>
+          </p:nvPr>
+        </p:nvSpPr>
+        <p:spPr/>
+        <p:txBody>
+          <a:bodyPr/>
+          <a:lstStyle/>
+          <a:p>
+            <a:fld id="{E1C48AFE-8526-4161-A329-94B75A3BCD37}" type="slidenum">
+              <a:rPr lang="en-US" smtClean="0"/>
+              <a:t>31</a:t>
+            </a:fld>
+            <a:endParaRPr lang="en-US"/>
+          </a:p>
+        </p:txBody>
+      </p:sp>
+    </p:spTree>
+  </p:cSld>
+  <p:clrMapOvr>
+    <a:masterClrMapping/>
+  </p:clrMapOvr>
+</p:notes>
+</file>
+
+<file path=ppt/notesSlides/notesSlide32.xml><?xml version="1.0" encoding="utf-8"?>
+<p:notes xmlns:a="http://schemas.openxmlformats.org/drawingml/2006/main" xmlns:r="http://schemas.openxmlformats.org/officeDocument/2006/relationships" xmlns:p="http://schemas.openxmlformats.org/presentationml/2006/main">
+  <p:cSld>
+    <p:spTree>
+      <p:nvGrpSpPr>
+        <p:cNvPr id="1" name=""/>
+        <p:cNvGrpSpPr/>
+        <p:nvPr/>
+      </p:nvGrpSpPr>
+      <p:grpSpPr>
+        <a:xfrm>
+          <a:off x="0" y="0"/>
+          <a:ext cx="0" cy="0"/>
+          <a:chOff x="0" y="0"/>
+          <a:chExt cx="0" cy="0"/>
+        </a:xfrm>
+      </p:grpSpPr>
+      <p:sp>
+        <p:nvSpPr>
+          <p:cNvPr id="2" name="Slide Image Placeholder 1"/>
+          <p:cNvSpPr>
+            <a:spLocks noGrp="1" noRot="1" noChangeAspect="1"/>
+          </p:cNvSpPr>
+          <p:nvPr>
+            <p:ph type="sldImg"/>
+          </p:nvPr>
+        </p:nvSpPr>
+        <p:spPr/>
+      </p:sp>
+      <p:sp>
+        <p:nvSpPr>
+          <p:cNvPr id="3" name="Notes Placeholder 2"/>
+          <p:cNvSpPr>
+            <a:spLocks noGrp="1"/>
+          </p:cNvSpPr>
+          <p:nvPr>
+            <p:ph type="body" idx="1"/>
+          </p:nvPr>
+        </p:nvSpPr>
+        <p:spPr/>
+        <p:txBody>
+          <a:bodyPr>
+            <a:normAutofit/>
+          </a:bodyPr>
+          <a:lstStyle/>
+          <a:p>
+            <a:endParaRPr lang="en-US"/>
+          </a:p>
+        </p:txBody>
+      </p:sp>
+      <p:sp>
+        <p:nvSpPr>
+          <p:cNvPr id="4" name="Slide Number Placeholder 3"/>
+          <p:cNvSpPr>
+            <a:spLocks noGrp="1"/>
+          </p:cNvSpPr>
+          <p:nvPr>
+            <p:ph type="sldNum" sz="quarter" idx="10"/>
+          </p:nvPr>
+        </p:nvSpPr>
+        <p:spPr/>
+        <p:txBody>
+          <a:bodyPr/>
+          <a:lstStyle/>
+          <a:p>
+            <a:fld id="{E1C48AFE-8526-4161-A329-94B75A3BCD37}" type="slidenum">
+              <a:rPr lang="en-US" smtClean="0"/>
+              <a:t>32</a:t>
+            </a:fld>
+            <a:endParaRPr lang="en-US"/>
+          </a:p>
+        </p:txBody>
+      </p:sp>
+    </p:spTree>
+  </p:cSld>
+  <p:clrMapOvr>
+    <a:masterClrMapping/>
+  </p:clrMapOvr>
+</p:notes>
+</file>
+
+<file path=ppt/notesSlides/notesSlide33.xml><?xml version="1.0" encoding="utf-8"?>
+<p:notes xmlns:a="http://schemas.openxmlformats.org/drawingml/2006/main" xmlns:r="http://schemas.openxmlformats.org/officeDocument/2006/relationships" xmlns:p="http://schemas.openxmlformats.org/presentationml/2006/main">
+  <p:cSld>
+    <p:spTree>
+      <p:nvGrpSpPr>
+        <p:cNvPr id="1" name=""/>
+        <p:cNvGrpSpPr/>
+        <p:nvPr/>
+      </p:nvGrpSpPr>
+      <p:grpSpPr>
+        <a:xfrm>
+          <a:off x="0" y="0"/>
+          <a:ext cx="0" cy="0"/>
+          <a:chOff x="0" y="0"/>
+          <a:chExt cx="0" cy="0"/>
+        </a:xfrm>
+      </p:grpSpPr>
+      <p:sp>
+        <p:nvSpPr>
+          <p:cNvPr id="2" name="Slide Image Placeholder 1"/>
+          <p:cNvSpPr>
+            <a:spLocks noGrp="1" noRot="1" noChangeAspect="1"/>
+          </p:cNvSpPr>
+          <p:nvPr>
+            <p:ph type="sldImg"/>
+          </p:nvPr>
+        </p:nvSpPr>
+        <p:spPr/>
+      </p:sp>
+      <p:sp>
+        <p:nvSpPr>
+          <p:cNvPr id="3" name="Notes Placeholder 2"/>
+          <p:cNvSpPr>
+            <a:spLocks noGrp="1"/>
+          </p:cNvSpPr>
+          <p:nvPr>
+            <p:ph type="body" idx="1"/>
+          </p:nvPr>
+        </p:nvSpPr>
+        <p:spPr/>
+        <p:txBody>
+          <a:bodyPr>
+            <a:normAutofit/>
+          </a:bodyPr>
+          <a:lstStyle/>
+          <a:p>
+            <a:endParaRPr lang="en-US"/>
+          </a:p>
+        </p:txBody>
+      </p:sp>
+      <p:sp>
+        <p:nvSpPr>
+          <p:cNvPr id="4" name="Slide Number Placeholder 3"/>
+          <p:cNvSpPr>
+            <a:spLocks noGrp="1"/>
+          </p:cNvSpPr>
+          <p:nvPr>
+            <p:ph type="sldNum" sz="quarter" idx="10"/>
+          </p:nvPr>
+        </p:nvSpPr>
+        <p:spPr/>
+        <p:txBody>
+          <a:bodyPr/>
+          <a:lstStyle/>
+          <a:p>
+            <a:fld id="{E1C48AFE-8526-4161-A329-94B75A3BCD37}" type="slidenum">
+              <a:rPr lang="en-US" smtClean="0"/>
+              <a:t>33</a:t>
+            </a:fld>
+            <a:endParaRPr lang="en-US"/>
+          </a:p>
+        </p:txBody>
+      </p:sp>
+    </p:spTree>
+  </p:cSld>
+  <p:clrMapOvr>
+    <a:masterClrMapping/>
+  </p:clrMapOvr>
+</p:notes>
+</file>
+
+<file path=ppt/notesSlides/notesSlide34.xml><?xml version="1.0" encoding="utf-8"?>
+<p:notes xmlns:a="http://schemas.openxmlformats.org/drawingml/2006/main" xmlns:r="http://schemas.openxmlformats.org/officeDocument/2006/relationships" xmlns:p="http://schemas.openxmlformats.org/presentationml/2006/main">
+  <p:cSld>
+    <p:spTree>
+      <p:nvGrpSpPr>
+        <p:cNvPr id="1" name=""/>
+        <p:cNvGrpSpPr/>
+        <p:nvPr/>
+      </p:nvGrpSpPr>
+      <p:grpSpPr>
+        <a:xfrm>
+          <a:off x="0" y="0"/>
+          <a:ext cx="0" cy="0"/>
+          <a:chOff x="0" y="0"/>
+          <a:chExt cx="0" cy="0"/>
+        </a:xfrm>
+      </p:grpSpPr>
+      <p:sp>
+        <p:nvSpPr>
+          <p:cNvPr id="2" name="Slide Image Placeholder 1"/>
+          <p:cNvSpPr>
+            <a:spLocks noGrp="1" noRot="1" noChangeAspect="1"/>
+          </p:cNvSpPr>
+          <p:nvPr>
+            <p:ph type="sldImg"/>
+          </p:nvPr>
+        </p:nvSpPr>
+        <p:spPr/>
+      </p:sp>
+      <p:sp>
+        <p:nvSpPr>
+          <p:cNvPr id="3" name="Notes Placeholder 2"/>
+          <p:cNvSpPr>
+            <a:spLocks noGrp="1"/>
+          </p:cNvSpPr>
+          <p:nvPr>
+            <p:ph type="body" idx="1"/>
+          </p:nvPr>
+        </p:nvSpPr>
+        <p:spPr/>
+        <p:txBody>
+          <a:bodyPr>
+            <a:normAutofit/>
+          </a:bodyPr>
+          <a:lstStyle/>
+          <a:p>
+            <a:endParaRPr lang="en-US"/>
+          </a:p>
+        </p:txBody>
+      </p:sp>
+      <p:sp>
+        <p:nvSpPr>
+          <p:cNvPr id="4" name="Slide Number Placeholder 3"/>
+          <p:cNvSpPr>
+            <a:spLocks noGrp="1"/>
+          </p:cNvSpPr>
+          <p:nvPr>
+            <p:ph type="sldNum" sz="quarter" idx="10"/>
+          </p:nvPr>
+        </p:nvSpPr>
+        <p:spPr/>
+        <p:txBody>
+          <a:bodyPr/>
+          <a:lstStyle/>
+          <a:p>
+            <a:fld id="{E1C48AFE-8526-4161-A329-94B75A3BCD37}" type="slidenum">
+              <a:rPr lang="en-US" smtClean="0"/>
+              <a:t>34</a:t>
+            </a:fld>
+            <a:endParaRPr lang="en-US"/>
+          </a:p>
+        </p:txBody>
+      </p:sp>
+    </p:spTree>
+  </p:cSld>
+  <p:clrMapOvr>
+    <a:masterClrMapping/>
+  </p:clrMapOvr>
+</p:notes>
+</file>
+
+<file path=ppt/notesSlides/notesSlide35.xml><?xml version="1.0" encoding="utf-8"?>
+<p:notes xmlns:a="http://schemas.openxmlformats.org/drawingml/2006/main" xmlns:r="http://schemas.openxmlformats.org/officeDocument/2006/relationships" xmlns:p="http://schemas.openxmlformats.org/presentationml/2006/main">
+  <p:cSld>
+    <p:spTree>
+      <p:nvGrpSpPr>
+        <p:cNvPr id="1" name=""/>
+        <p:cNvGrpSpPr/>
+        <p:nvPr/>
+      </p:nvGrpSpPr>
+      <p:grpSpPr>
+        <a:xfrm>
+          <a:off x="0" y="0"/>
+          <a:ext cx="0" cy="0"/>
+          <a:chOff x="0" y="0"/>
+          <a:chExt cx="0" cy="0"/>
+        </a:xfrm>
+      </p:grpSpPr>
+      <p:sp>
+        <p:nvSpPr>
+          <p:cNvPr id="2" name="Slide Image Placeholder 1"/>
+          <p:cNvSpPr>
+            <a:spLocks noGrp="1" noRot="1" noChangeAspect="1"/>
+          </p:cNvSpPr>
+          <p:nvPr>
+            <p:ph type="sldImg"/>
+          </p:nvPr>
+        </p:nvSpPr>
+        <p:spPr/>
+      </p:sp>
+      <p:sp>
+        <p:nvSpPr>
+          <p:cNvPr id="3" name="Notes Placeholder 2"/>
+          <p:cNvSpPr>
+            <a:spLocks noGrp="1"/>
+          </p:cNvSpPr>
+          <p:nvPr>
+            <p:ph type="body" idx="1"/>
+          </p:nvPr>
+        </p:nvSpPr>
+        <p:spPr/>
+        <p:txBody>
+          <a:bodyPr>
+            <a:normAutofit/>
+          </a:bodyPr>
+          <a:lstStyle/>
+          <a:p>
+            <a:endParaRPr lang="en-US"/>
+          </a:p>
+        </p:txBody>
+      </p:sp>
+      <p:sp>
+        <p:nvSpPr>
+          <p:cNvPr id="4" name="Slide Number Placeholder 3"/>
+          <p:cNvSpPr>
+            <a:spLocks noGrp="1"/>
+          </p:cNvSpPr>
+          <p:nvPr>
+            <p:ph type="sldNum" sz="quarter" idx="10"/>
+          </p:nvPr>
+        </p:nvSpPr>
+        <p:spPr/>
+        <p:txBody>
+          <a:bodyPr/>
+          <a:lstStyle/>
+          <a:p>
+            <a:fld id="{E1C48AFE-8526-4161-A329-94B75A3BCD37}" type="slidenum">
+              <a:rPr lang="en-US" smtClean="0"/>
+              <a:t>35</a:t>
+            </a:fld>
+            <a:endParaRPr lang="en-US"/>
+          </a:p>
+        </p:txBody>
+      </p:sp>
+    </p:spTree>
+  </p:cSld>
+  <p:clrMapOvr>
+    <a:masterClrMapping/>
+  </p:clrMapOvr>
+</p:notes>
+</file>
+
+<file path=ppt/notesSlides/notesSlide36.xml><?xml version="1.0" encoding="utf-8"?>
+<p:notes xmlns:a="http://schemas.openxmlformats.org/drawingml/2006/main" xmlns:r="http://schemas.openxmlformats.org/officeDocument/2006/relationships" xmlns:p="http://schemas.openxmlformats.org/presentationml/2006/main">
+  <p:cSld>
+    <p:spTree>
+      <p:nvGrpSpPr>
+        <p:cNvPr id="1" name=""/>
+        <p:cNvGrpSpPr/>
+        <p:nvPr/>
+      </p:nvGrpSpPr>
+      <p:grpSpPr>
+        <a:xfrm>
+          <a:off x="0" y="0"/>
+          <a:ext cx="0" cy="0"/>
+          <a:chOff x="0" y="0"/>
+          <a:chExt cx="0" cy="0"/>
+        </a:xfrm>
+      </p:grpSpPr>
+      <p:sp>
+        <p:nvSpPr>
+          <p:cNvPr id="2" name="Slide Image Placeholder 1"/>
+          <p:cNvSpPr>
+            <a:spLocks noGrp="1" noRot="1" noChangeAspect="1"/>
+          </p:cNvSpPr>
+          <p:nvPr>
+            <p:ph type="sldImg"/>
+          </p:nvPr>
+        </p:nvSpPr>
+        <p:spPr/>
+      </p:sp>
+      <p:sp>
+        <p:nvSpPr>
+          <p:cNvPr id="3" name="Notes Placeholder 2"/>
+          <p:cNvSpPr>
+            <a:spLocks noGrp="1"/>
+          </p:cNvSpPr>
+          <p:nvPr>
+            <p:ph type="body" idx="1"/>
+          </p:nvPr>
+        </p:nvSpPr>
+        <p:spPr/>
+        <p:txBody>
+          <a:bodyPr>
+            <a:normAutofit/>
+          </a:bodyPr>
+          <a:lstStyle/>
+          <a:p>
+            <a:endParaRPr lang="en-US"/>
+          </a:p>
+        </p:txBody>
+      </p:sp>
+      <p:sp>
+        <p:nvSpPr>
+          <p:cNvPr id="4" name="Slide Number Placeholder 3"/>
+          <p:cNvSpPr>
+            <a:spLocks noGrp="1"/>
+          </p:cNvSpPr>
+          <p:nvPr>
+            <p:ph type="sldNum" sz="quarter" idx="10"/>
+          </p:nvPr>
+        </p:nvSpPr>
+        <p:spPr/>
+        <p:txBody>
+          <a:bodyPr/>
+          <a:lstStyle/>
+          <a:p>
+            <a:fld id="{E1C48AFE-8526-4161-A329-94B75A3BCD37}" type="slidenum">
+              <a:rPr lang="en-US" smtClean="0"/>
+              <a:t>36</a:t>
+            </a:fld>
+            <a:endParaRPr lang="en-US"/>
+          </a:p>
+        </p:txBody>
+      </p:sp>
+    </p:spTree>
+  </p:cSld>
+  <p:clrMapOvr>
+    <a:masterClrMapping/>
+  </p:clrMapOvr>
+</p:notes>
+</file>
+
+<file path=ppt/notesSlides/notesSlide37.xml><?xml version="1.0" encoding="utf-8"?>
+<p:notes xmlns:a="http://schemas.openxmlformats.org/drawingml/2006/main" xmlns:r="http://schemas.openxmlformats.org/officeDocument/2006/relationships" xmlns:p="http://schemas.openxmlformats.org/presentationml/2006/main">
+  <p:cSld>
+    <p:spTree>
+      <p:nvGrpSpPr>
+        <p:cNvPr id="1" name=""/>
+        <p:cNvGrpSpPr/>
+        <p:nvPr/>
+      </p:nvGrpSpPr>
+      <p:grpSpPr>
+        <a:xfrm>
+          <a:off x="0" y="0"/>
+          <a:ext cx="0" cy="0"/>
+          <a:chOff x="0" y="0"/>
+          <a:chExt cx="0" cy="0"/>
+        </a:xfrm>
+      </p:grpSpPr>
+      <p:sp>
+        <p:nvSpPr>
+          <p:cNvPr id="2" name="Slide Image Placeholder 1"/>
+          <p:cNvSpPr>
+            <a:spLocks noGrp="1" noRot="1" noChangeAspect="1"/>
+          </p:cNvSpPr>
+          <p:nvPr>
+            <p:ph type="sldImg"/>
+          </p:nvPr>
+        </p:nvSpPr>
+        <p:spPr/>
+      </p:sp>
+      <p:sp>
+        <p:nvSpPr>
+          <p:cNvPr id="3" name="Notes Placeholder 2"/>
+          <p:cNvSpPr>
+            <a:spLocks noGrp="1"/>
+          </p:cNvSpPr>
+          <p:nvPr>
+            <p:ph type="body" idx="1"/>
+          </p:nvPr>
+        </p:nvSpPr>
+        <p:spPr/>
+        <p:txBody>
+          <a:bodyPr>
+            <a:normAutofit/>
+          </a:bodyPr>
+          <a:lstStyle/>
+          <a:p>
+            <a:endParaRPr lang="en-US"/>
+          </a:p>
+        </p:txBody>
+      </p:sp>
+      <p:sp>
+        <p:nvSpPr>
+          <p:cNvPr id="4" name="Slide Number Placeholder 3"/>
+          <p:cNvSpPr>
+            <a:spLocks noGrp="1"/>
+          </p:cNvSpPr>
+          <p:nvPr>
+            <p:ph type="sldNum" sz="quarter" idx="10"/>
+          </p:nvPr>
+        </p:nvSpPr>
+        <p:spPr/>
+        <p:txBody>
+          <a:bodyPr/>
+          <a:lstStyle/>
+          <a:p>
+            <a:fld id="{E1C48AFE-8526-4161-A329-94B75A3BCD37}" type="slidenum">
+              <a:rPr lang="en-US" smtClean="0"/>
+              <a:t>37</a:t>
+            </a:fld>
+            <a:endParaRPr lang="en-US"/>
+          </a:p>
+        </p:txBody>
+      </p:sp>
+    </p:spTree>
+  </p:cSld>
+  <p:clrMapOvr>
+    <a:masterClrMapping/>
+  </p:clrMapOvr>
+</p:notes>
+</file>
+
+<file path=ppt/notesSlides/notesSlide38.xml><?xml version="1.0" encoding="utf-8"?>
+<p:notes xmlns:a="http://schemas.openxmlformats.org/drawingml/2006/main" xmlns:r="http://schemas.openxmlformats.org/officeDocument/2006/relationships" xmlns:p="http://schemas.openxmlformats.org/presentationml/2006/main">
+  <p:cSld>
+    <p:spTree>
+      <p:nvGrpSpPr>
+        <p:cNvPr id="1" name=""/>
+        <p:cNvGrpSpPr/>
+        <p:nvPr/>
+      </p:nvGrpSpPr>
+      <p:grpSpPr>
+        <a:xfrm>
+          <a:off x="0" y="0"/>
+          <a:ext cx="0" cy="0"/>
+          <a:chOff x="0" y="0"/>
+          <a:chExt cx="0" cy="0"/>
+        </a:xfrm>
+      </p:grpSpPr>
+      <p:sp>
+        <p:nvSpPr>
+          <p:cNvPr id="2" name="Slide Image Placeholder 1"/>
+          <p:cNvSpPr>
+            <a:spLocks noGrp="1" noRot="1" noChangeAspect="1"/>
+          </p:cNvSpPr>
+          <p:nvPr>
+            <p:ph type="sldImg"/>
+          </p:nvPr>
+        </p:nvSpPr>
+        <p:spPr/>
+      </p:sp>
+      <p:sp>
+        <p:nvSpPr>
+          <p:cNvPr id="3" name="Notes Placeholder 2"/>
+          <p:cNvSpPr>
+            <a:spLocks noGrp="1"/>
+          </p:cNvSpPr>
+          <p:nvPr>
+            <p:ph type="body" idx="1"/>
+          </p:nvPr>
+        </p:nvSpPr>
+        <p:spPr/>
+        <p:txBody>
+          <a:bodyPr>
+            <a:normAutofit/>
+          </a:bodyPr>
+          <a:lstStyle/>
+          <a:p>
+            <a:endParaRPr lang="en-US"/>
+          </a:p>
+        </p:txBody>
+      </p:sp>
+      <p:sp>
+        <p:nvSpPr>
+          <p:cNvPr id="4" name="Slide Number Placeholder 3"/>
+          <p:cNvSpPr>
+            <a:spLocks noGrp="1"/>
+          </p:cNvSpPr>
+          <p:nvPr>
+            <p:ph type="sldNum" sz="quarter" idx="10"/>
+          </p:nvPr>
+        </p:nvSpPr>
+        <p:spPr/>
+        <p:txBody>
+          <a:bodyPr/>
+          <a:lstStyle/>
+          <a:p>
+            <a:fld id="{E1C48AFE-8526-4161-A329-94B75A3BCD37}" type="slidenum">
+              <a:rPr lang="en-US" smtClean="0"/>
+              <a:t>38</a:t>
+            </a:fld>
+            <a:endParaRPr lang="en-US"/>
+          </a:p>
+        </p:txBody>
+      </p:sp>
+    </p:spTree>
+  </p:cSld>
+  <p:clrMapOvr>
+    <a:masterClrMapping/>
+  </p:clrMapOvr>
+</p:notes>
+</file>
+
+<file path=ppt/notesSlides/notesSlide39.xml><?xml version="1.0" encoding="utf-8"?>
+<p:notes xmlns:a="http://schemas.openxmlformats.org/drawingml/2006/main" xmlns:r="http://schemas.openxmlformats.org/officeDocument/2006/relationships" xmlns:p="http://schemas.openxmlformats.org/presentationml/2006/main">
+  <p:cSld>
+    <p:spTree>
+      <p:nvGrpSpPr>
+        <p:cNvPr id="1" name=""/>
+        <p:cNvGrpSpPr/>
+        <p:nvPr/>
+      </p:nvGrpSpPr>
+      <p:grpSpPr>
+        <a:xfrm>
+          <a:off x="0" y="0"/>
+          <a:ext cx="0" cy="0"/>
+          <a:chOff x="0" y="0"/>
+          <a:chExt cx="0" cy="0"/>
+        </a:xfrm>
+      </p:grpSpPr>
+      <p:sp>
+        <p:nvSpPr>
+          <p:cNvPr id="2" name="Slide Image Placeholder 1"/>
+          <p:cNvSpPr>
+            <a:spLocks noGrp="1" noRot="1" noChangeAspect="1"/>
+          </p:cNvSpPr>
+          <p:nvPr>
+            <p:ph type="sldImg"/>
+          </p:nvPr>
+        </p:nvSpPr>
+        <p:spPr/>
+      </p:sp>
+      <p:sp>
+        <p:nvSpPr>
+          <p:cNvPr id="3" name="Notes Placeholder 2"/>
+          <p:cNvSpPr>
+            <a:spLocks noGrp="1"/>
+          </p:cNvSpPr>
+          <p:nvPr>
+            <p:ph type="body" idx="1"/>
+          </p:nvPr>
+        </p:nvSpPr>
+        <p:spPr/>
+        <p:txBody>
+          <a:bodyPr>
+            <a:normAutofit/>
+          </a:bodyPr>
+          <a:lstStyle/>
+          <a:p>
+            <a:endParaRPr lang="en-US"/>
+          </a:p>
+        </p:txBody>
+      </p:sp>
+      <p:sp>
+        <p:nvSpPr>
+          <p:cNvPr id="4" name="Slide Number Placeholder 3"/>
+          <p:cNvSpPr>
+            <a:spLocks noGrp="1"/>
+          </p:cNvSpPr>
+          <p:nvPr>
+            <p:ph type="sldNum" sz="quarter" idx="10"/>
+          </p:nvPr>
+        </p:nvSpPr>
+        <p:spPr/>
+        <p:txBody>
+          <a:bodyPr/>
+          <a:lstStyle/>
+          <a:p>
+            <a:fld id="{E1C48AFE-8526-4161-A329-94B75A3BCD37}" type="slidenum">
+              <a:rPr lang="en-US" smtClean="0"/>
+              <a:t>39</a:t>
+            </a:fld>
+            <a:endParaRPr lang="en-US"/>
+          </a:p>
+        </p:txBody>
+      </p:sp>
+    </p:spTree>
+  </p:cSld>
+  <p:clrMapOvr>
+    <a:masterClrMapping/>
+  </p:clrMapOvr>
+</p:notes>
+</file>
+
+<file path=ppt/notesSlides/notesSlide4.xml><?xml version="1.0" encoding="utf-8"?>
+<p:notes xmlns:a="http://schemas.openxmlformats.org/drawingml/2006/main" xmlns:r="http://schemas.openxmlformats.org/officeDocument/2006/relationships" xmlns:p="http://schemas.openxmlformats.org/presentationml/2006/main">
+  <p:cSld>
+    <p:spTree>
+      <p:nvGrpSpPr>
+        <p:cNvPr id="1" name=""/>
+        <p:cNvGrpSpPr/>
+        <p:nvPr/>
+      </p:nvGrpSpPr>
+      <p:grpSpPr>
+        <a:xfrm>
+          <a:off x="0" y="0"/>
+          <a:ext cx="0" cy="0"/>
+          <a:chOff x="0" y="0"/>
+          <a:chExt cx="0" cy="0"/>
+        </a:xfrm>
+      </p:grpSpPr>
+      <p:sp>
+        <p:nvSpPr>
+          <p:cNvPr id="2" name="Slide Image Placeholder 1"/>
+          <p:cNvSpPr>
+            <a:spLocks noGrp="1" noRot="1" noChangeAspect="1"/>
+          </p:cNvSpPr>
+          <p:nvPr>
+            <p:ph type="sldImg"/>
+          </p:nvPr>
+        </p:nvSpPr>
+        <p:spPr/>
+      </p:sp>
+      <p:sp>
+        <p:nvSpPr>
+          <p:cNvPr id="3" name="Notes Placeholder 2"/>
+          <p:cNvSpPr>
+            <a:spLocks noGrp="1"/>
+          </p:cNvSpPr>
+          <p:nvPr>
+            <p:ph type="body" idx="1"/>
+          </p:nvPr>
+        </p:nvSpPr>
+        <p:spPr/>
+        <p:txBody>
+          <a:bodyPr>
+            <a:normAutofit/>
+          </a:bodyPr>
+          <a:lstStyle/>
+          <a:p>
+            <a:endParaRPr lang="en-US"/>
+          </a:p>
+        </p:txBody>
+      </p:sp>
+      <p:sp>
+        <p:nvSpPr>
+          <p:cNvPr id="4" name="Slide Number Placeholder 3"/>
+          <p:cNvSpPr>
+            <a:spLocks noGrp="1"/>
+          </p:cNvSpPr>
+          <p:nvPr>
+            <p:ph type="sldNum" sz="quarter" idx="10"/>
+          </p:nvPr>
+        </p:nvSpPr>
+        <p:spPr/>
+        <p:txBody>
+          <a:bodyPr/>
+          <a:lstStyle/>
+          <a:p>
+            <a:fld id="{E1C48AFE-8526-4161-A329-94B75A3BCD37}" type="slidenum">
+              <a:rPr lang="en-US" smtClean="0"/>
+              <a:t>4</a:t>
+            </a:fld>
+            <a:endParaRPr lang="en-US"/>
+          </a:p>
+        </p:txBody>
+      </p:sp>
+    </p:spTree>
+  </p:cSld>
+  <p:clrMapOvr>
+    <a:masterClrMapping/>
+  </p:clrMapOvr>
+</p:notes>
+</file>
+
+<file path=ppt/notesSlides/notesSlide5.xml><?xml version="1.0" encoding="utf-8"?>
+<p:notes xmlns:a="http://schemas.openxmlformats.org/drawingml/2006/main" xmlns:r="http://schemas.openxmlformats.org/officeDocument/2006/relationships" xmlns:p="http://schemas.openxmlformats.org/presentationml/2006/main">
+  <p:cSld>
+    <p:spTree>
+      <p:nvGrpSpPr>
+        <p:cNvPr id="1" name=""/>
+        <p:cNvGrpSpPr/>
+        <p:nvPr/>
+      </p:nvGrpSpPr>
+      <p:grpSpPr>
+        <a:xfrm>
+          <a:off x="0" y="0"/>
+          <a:ext cx="0" cy="0"/>
+          <a:chOff x="0" y="0"/>
+          <a:chExt cx="0" cy="0"/>
+        </a:xfrm>
+      </p:grpSpPr>
+      <p:sp>
+        <p:nvSpPr>
+          <p:cNvPr id="2" name="Slide Image Placeholder 1"/>
+          <p:cNvSpPr>
+            <a:spLocks noGrp="1" noRot="1" noChangeAspect="1"/>
+          </p:cNvSpPr>
+          <p:nvPr>
+            <p:ph type="sldImg"/>
+          </p:nvPr>
+        </p:nvSpPr>
+        <p:spPr/>
+      </p:sp>
+      <p:sp>
+        <p:nvSpPr>
+          <p:cNvPr id="3" name="Notes Placeholder 2"/>
+          <p:cNvSpPr>
+            <a:spLocks noGrp="1"/>
+          </p:cNvSpPr>
+          <p:nvPr>
+            <p:ph type="body" idx="1"/>
+          </p:nvPr>
+        </p:nvSpPr>
+        <p:spPr/>
+        <p:txBody>
+          <a:bodyPr>
+            <a:normAutofit/>
+          </a:bodyPr>
+          <a:lstStyle/>
+          <a:p>
+            <a:endParaRPr lang="en-US"/>
+          </a:p>
+        </p:txBody>
+      </p:sp>
+      <p:sp>
+        <p:nvSpPr>
+          <p:cNvPr id="4" name="Slide Number Placeholder 3"/>
+          <p:cNvSpPr>
+            <a:spLocks noGrp="1"/>
+          </p:cNvSpPr>
+          <p:nvPr>
+            <p:ph type="sldNum" sz="quarter" idx="10"/>
+          </p:nvPr>
+        </p:nvSpPr>
+        <p:spPr/>
+        <p:txBody>
+          <a:bodyPr/>
+          <a:lstStyle/>
+          <a:p>
+            <a:fld id="{E1C48AFE-8526-4161-A329-94B75A3BCD37}" type="slidenum">
+              <a:rPr lang="en-US" smtClean="0"/>
+              <a:t>5</a:t>
+            </a:fld>
+            <a:endParaRPr lang="en-US"/>
+          </a:p>
+        </p:txBody>
+      </p:sp>
+    </p:spTree>
+  </p:cSld>
+  <p:clrMapOvr>
+    <a:masterClrMapping/>
+  </p:clrMapOvr>
+</p:notes>
+</file>
+
+<file path=ppt/notesSlides/notesSlide6.xml><?xml version="1.0" encoding="utf-8"?>
+<p:notes xmlns:a="http://schemas.openxmlformats.org/drawingml/2006/main" xmlns:r="http://schemas.openxmlformats.org/officeDocument/2006/relationships" xmlns:p="http://schemas.openxmlformats.org/presentationml/2006/main">
+  <p:cSld>
+    <p:spTree>
+      <p:nvGrpSpPr>
+        <p:cNvPr id="1" name=""/>
+        <p:cNvGrpSpPr/>
+        <p:nvPr/>
+      </p:nvGrpSpPr>
+      <p:grpSpPr>
+        <a:xfrm>
+          <a:off x="0" y="0"/>
+          <a:ext cx="0" cy="0"/>
+          <a:chOff x="0" y="0"/>
+          <a:chExt cx="0" cy="0"/>
+        </a:xfrm>
+      </p:grpSpPr>
+      <p:sp>
+        <p:nvSpPr>
+          <p:cNvPr id="2" name="Slide Image Placeholder 1"/>
+          <p:cNvSpPr>
+            <a:spLocks noGrp="1" noRot="1" noChangeAspect="1"/>
+          </p:cNvSpPr>
+          <p:nvPr>
+            <p:ph type="sldImg"/>
+          </p:nvPr>
+        </p:nvSpPr>
+        <p:spPr/>
+      </p:sp>
+      <p:sp>
+        <p:nvSpPr>
+          <p:cNvPr id="3" name="Notes Placeholder 2"/>
+          <p:cNvSpPr>
+            <a:spLocks noGrp="1"/>
+          </p:cNvSpPr>
+          <p:nvPr>
+            <p:ph type="body" idx="1"/>
+          </p:nvPr>
+        </p:nvSpPr>
+        <p:spPr/>
+        <p:txBody>
+          <a:bodyPr>
+            <a:normAutofit/>
+          </a:bodyPr>
+          <a:lstStyle/>
+          <a:p>
+            <a:endParaRPr lang="en-US"/>
+          </a:p>
+        </p:txBody>
+      </p:sp>
+      <p:sp>
+        <p:nvSpPr>
+          <p:cNvPr id="4" name="Slide Number Placeholder 3"/>
+          <p:cNvSpPr>
+            <a:spLocks noGrp="1"/>
+          </p:cNvSpPr>
+          <p:nvPr>
+            <p:ph type="sldNum" sz="quarter" idx="10"/>
+          </p:nvPr>
+        </p:nvSpPr>
+        <p:spPr/>
+        <p:txBody>
+          <a:bodyPr/>
+          <a:lstStyle/>
+          <a:p>
+            <a:fld id="{E1C48AFE-8526-4161-A329-94B75A3BCD37}" type="slidenum">
+              <a:rPr lang="en-US" smtClean="0"/>
+              <a:t>6</a:t>
+            </a:fld>
+            <a:endParaRPr lang="en-US"/>
+          </a:p>
+        </p:txBody>
+      </p:sp>
+    </p:spTree>
+  </p:cSld>
+  <p:clrMapOvr>
+    <a:masterClrMapping/>
+  </p:clrMapOvr>
+</p:notes>
+</file>
+
+<file path=ppt/notesSlides/notesSlide7.xml><?xml version="1.0" encoding="utf-8"?>
+<p:notes xmlns:a="http://schemas.openxmlformats.org/drawingml/2006/main" xmlns:r="http://schemas.openxmlformats.org/officeDocument/2006/relationships" xmlns:p="http://schemas.openxmlformats.org/presentationml/2006/main">
+  <p:cSld>
+    <p:spTree>
+      <p:nvGrpSpPr>
+        <p:cNvPr id="1" name=""/>
+        <p:cNvGrpSpPr/>
+        <p:nvPr/>
+      </p:nvGrpSpPr>
+      <p:grpSpPr>
+        <a:xfrm>
+          <a:off x="0" y="0"/>
+          <a:ext cx="0" cy="0"/>
+          <a:chOff x="0" y="0"/>
+          <a:chExt cx="0" cy="0"/>
+        </a:xfrm>
+      </p:grpSpPr>
+      <p:sp>
+        <p:nvSpPr>
+          <p:cNvPr id="2" name="Slide Image Placeholder 1"/>
+          <p:cNvSpPr>
+            <a:spLocks noGrp="1" noRot="1" noChangeAspect="1"/>
+          </p:cNvSpPr>
+          <p:nvPr>
+            <p:ph type="sldImg"/>
+          </p:nvPr>
+        </p:nvSpPr>
+        <p:spPr/>
+      </p:sp>
+      <p:sp>
+        <p:nvSpPr>
+          <p:cNvPr id="3" name="Notes Placeholder 2"/>
+          <p:cNvSpPr>
+            <a:spLocks noGrp="1"/>
+          </p:cNvSpPr>
+          <p:nvPr>
+            <p:ph type="body" idx="1"/>
+          </p:nvPr>
+        </p:nvSpPr>
+        <p:spPr/>
+        <p:txBody>
+          <a:bodyPr>
+            <a:normAutofit/>
+          </a:bodyPr>
+          <a:lstStyle/>
+          <a:p>
+            <a:endParaRPr lang="en-US"/>
+          </a:p>
+        </p:txBody>
+      </p:sp>
+      <p:sp>
+        <p:nvSpPr>
+          <p:cNvPr id="4" name="Slide Number Placeholder 3"/>
+          <p:cNvSpPr>
+            <a:spLocks noGrp="1"/>
+          </p:cNvSpPr>
+          <p:nvPr>
+            <p:ph type="sldNum" sz="quarter" idx="10"/>
+          </p:nvPr>
+        </p:nvSpPr>
+        <p:spPr/>
+        <p:txBody>
+          <a:bodyPr/>
+          <a:lstStyle/>
+          <a:p>
+            <a:fld id="{E1C48AFE-8526-4161-A329-94B75A3BCD37}" type="slidenum">
+              <a:rPr lang="en-US" smtClean="0"/>
+              <a:t>7</a:t>
+            </a:fld>
+            <a:endParaRPr lang="en-US"/>
+          </a:p>
+        </p:txBody>
+      </p:sp>
+    </p:spTree>
+  </p:cSld>
+  <p:clrMapOvr>
+    <a:masterClrMapping/>
+  </p:clrMapOvr>
+</p:notes>
+</file>
+
+<file path=ppt/notesSlides/notesSlide8.xml><?xml version="1.0" encoding="utf-8"?>
+<p:notes xmlns:a="http://schemas.openxmlformats.org/drawingml/2006/main" xmlns:r="http://schemas.openxmlformats.org/officeDocument/2006/relationships" xmlns:p="http://schemas.openxmlformats.org/presentationml/2006/main">
+  <p:cSld>
+    <p:spTree>
+      <p:nvGrpSpPr>
+        <p:cNvPr id="1" name=""/>
+        <p:cNvGrpSpPr/>
+        <p:nvPr/>
+      </p:nvGrpSpPr>
+      <p:grpSpPr>
+        <a:xfrm>
+          <a:off x="0" y="0"/>
+          <a:ext cx="0" cy="0"/>
+          <a:chOff x="0" y="0"/>
+          <a:chExt cx="0" cy="0"/>
+        </a:xfrm>
+      </p:grpSpPr>
+      <p:sp>
+        <p:nvSpPr>
+          <p:cNvPr id="2" name="Slide Image Placeholder 1"/>
+          <p:cNvSpPr>
+            <a:spLocks noGrp="1" noRot="1" noChangeAspect="1"/>
+          </p:cNvSpPr>
+          <p:nvPr>
+            <p:ph type="sldImg"/>
+          </p:nvPr>
+        </p:nvSpPr>
+        <p:spPr/>
+      </p:sp>
+      <p:sp>
+        <p:nvSpPr>
+          <p:cNvPr id="3" name="Notes Placeholder 2"/>
+          <p:cNvSpPr>
+            <a:spLocks noGrp="1"/>
+          </p:cNvSpPr>
+          <p:nvPr>
+            <p:ph type="body" idx="1"/>
+          </p:nvPr>
+        </p:nvSpPr>
+        <p:spPr/>
+        <p:txBody>
+          <a:bodyPr>
+            <a:normAutofit/>
+          </a:bodyPr>
+          <a:lstStyle/>
+          <a:p>
+            <a:endParaRPr lang="en-US"/>
+          </a:p>
+        </p:txBody>
+      </p:sp>
+      <p:sp>
+        <p:nvSpPr>
+          <p:cNvPr id="4" name="Slide Number Placeholder 3"/>
+          <p:cNvSpPr>
+            <a:spLocks noGrp="1"/>
+          </p:cNvSpPr>
+          <p:nvPr>
+            <p:ph type="sldNum" sz="quarter" idx="10"/>
+          </p:nvPr>
+        </p:nvSpPr>
+        <p:spPr/>
+        <p:txBody>
+          <a:bodyPr/>
+          <a:lstStyle/>
+          <a:p>
+            <a:fld id="{E1C48AFE-8526-4161-A329-94B75A3BCD37}" type="slidenum">
+              <a:rPr lang="en-US" smtClean="0"/>
+              <a:t>8</a:t>
+            </a:fld>
+            <a:endParaRPr lang="en-US"/>
+          </a:p>
+        </p:txBody>
+      </p:sp>
+    </p:spTree>
+  </p:cSld>
+  <p:clrMapOvr>
+    <a:masterClrMapping/>
+  </p:clrMapOvr>
+</p:notes>
+</file>
+
+<file path=ppt/notesSlides/notesSlide9.xml><?xml version="1.0" encoding="utf-8"?>
+<p:notes xmlns:a="http://schemas.openxmlformats.org/drawingml/2006/main" xmlns:r="http://schemas.openxmlformats.org/officeDocument/2006/relationships" xmlns:p="http://schemas.openxmlformats.org/presentationml/2006/main">
+  <p:cSld>
+    <p:spTree>
+      <p:nvGrpSpPr>
+        <p:cNvPr id="1" name=""/>
+        <p:cNvGrpSpPr/>
+        <p:nvPr/>
+      </p:nvGrpSpPr>
+      <p:grpSpPr>
+        <a:xfrm>
+          <a:off x="0" y="0"/>
+          <a:ext cx="0" cy="0"/>
+          <a:chOff x="0" y="0"/>
+          <a:chExt cx="0" cy="0"/>
+        </a:xfrm>
+      </p:grpSpPr>
+      <p:sp>
+        <p:nvSpPr>
+          <p:cNvPr id="2" name="Slide Image Placeholder 1"/>
+          <p:cNvSpPr>
+            <a:spLocks noGrp="1" noRot="1" noChangeAspect="1"/>
+          </p:cNvSpPr>
+          <p:nvPr>
+            <p:ph type="sldImg"/>
+          </p:nvPr>
+        </p:nvSpPr>
+        <p:spPr/>
+      </p:sp>
+      <p:sp>
+        <p:nvSpPr>
+          <p:cNvPr id="3" name="Notes Placeholder 2"/>
+          <p:cNvSpPr>
+            <a:spLocks noGrp="1"/>
+          </p:cNvSpPr>
+          <p:nvPr>
+            <p:ph type="body" idx="1"/>
+          </p:nvPr>
+        </p:nvSpPr>
+        <p:spPr/>
+        <p:txBody>
+          <a:bodyPr>
+            <a:normAutofit/>
+          </a:bodyPr>
+          <a:lstStyle/>
+          <a:p>
+            <a:endParaRPr lang="en-US"/>
+          </a:p>
+        </p:txBody>
+      </p:sp>
+      <p:sp>
+        <p:nvSpPr>
+          <p:cNvPr id="4" name="Slide Number Placeholder 3"/>
+          <p:cNvSpPr>
+            <a:spLocks noGrp="1"/>
+          </p:cNvSpPr>
+          <p:nvPr>
+            <p:ph type="sldNum" sz="quarter" idx="10"/>
+          </p:nvPr>
+        </p:nvSpPr>
+        <p:spPr/>
+        <p:txBody>
+          <a:bodyPr/>
+          <a:lstStyle/>
+          <a:p>
+            <a:fld id="{E1C48AFE-8526-4161-A329-94B75A3BCD37}" type="slidenum">
+              <a:rPr lang="en-US" smtClean="0"/>
+              <a:t>9</a:t>
+            </a:fld>
+            <a:endParaRPr lang="en-US"/>
+          </a:p>
+        </p:txBody>
+      </p:sp>
+    </p:spTree>
+  </p:cSld>
+  <p:clrMapOvr>
+    <a:masterClrMapping/>
+  </p:clrMapOvr>
+</p:notes>
 </file>
 
 <file path=ppt/slideLayouts/slideLayout1.xml><?xml version="1.0" encoding="utf-8"?>
@@ -9508,26 +13017,28 @@
       </p:grpSpPr>
       <p:pic>
         <p:nvPicPr>
-          <p:cNvPr id="2" name="Picture 1" descr="userCaseDiagram.JPG"/>
+          <p:cNvPr id="1026" name="Picture 2" descr="C:\Users\David.GREENTREE2004\Desktop\sports-score-tracker\Documents\useCaseDiagram.JPG"/>
           <p:cNvPicPr>
-            <a:picLocks noChangeAspect="1"/>
+            <a:picLocks noChangeAspect="1" noChangeArrowheads="1"/>
           </p:cNvPicPr>
           <p:nvPr/>
         </p:nvPicPr>
         <p:blipFill>
-          <a:blip r:embed="rId2"/>
+          <a:blip r:embed="rId3"/>
+          <a:srcRect/>
           <a:stretch>
             <a:fillRect/>
           </a:stretch>
         </p:blipFill>
-        <p:spPr>
+        <p:spPr bwMode="auto">
           <a:xfrm>
-            <a:off x="2133600" y="0"/>
-            <a:ext cx="4724400" cy="6858000"/>
+            <a:off x="1524000" y="0"/>
+            <a:ext cx="5867400" cy="6858000"/>
           </a:xfrm>
           <a:prstGeom prst="rect">
             <a:avLst/>
           </a:prstGeom>
+          <a:noFill/>
         </p:spPr>
       </p:pic>
     </p:spTree>
@@ -9732,7 +13243,7 @@
                           <a:spcPts val="0"/>
                         </a:spcAft>
                       </a:pPr>
-                      <a:endParaRPr lang="en-US" sz="1100">
+                      <a:endParaRPr lang="en-US" sz="1100" dirty="0">
                         <a:latin typeface="Calibri"/>
                         <a:ea typeface="Calibri"/>
                         <a:cs typeface="Times New Roman"/>
@@ -16028,7 +19539,7 @@
                           <a:spcPts val="0"/>
                         </a:spcAft>
                       </a:pPr>
-                      <a:endParaRPr lang="en-US" sz="1100">
+                      <a:endParaRPr lang="en-US" sz="1100" dirty="0">
                         <a:latin typeface="Calibri"/>
                         <a:ea typeface="Calibri"/>
                         <a:cs typeface="Times New Roman"/>
@@ -16736,7 +20247,7 @@
                           <a:spcPts val="0"/>
                         </a:spcAft>
                       </a:pPr>
-                      <a:endParaRPr lang="en-US" sz="1100">
+                      <a:endParaRPr lang="en-US" sz="1100" dirty="0">
                         <a:latin typeface="Calibri"/>
                         <a:ea typeface="Calibri"/>
                         <a:cs typeface="Times New Roman"/>
@@ -17437,14 +20948,14 @@
                         </a:spcAft>
                       </a:pPr>
                       <a:r>
-                        <a:rPr lang="en-US" sz="1100" b="1">
+                        <a:rPr lang="en-US" sz="1100" b="1" dirty="0">
                           <a:latin typeface="Calibri"/>
                           <a:ea typeface="Calibri"/>
                           <a:cs typeface="Times New Roman"/>
                         </a:rPr>
                         <a:t>X</a:t>
                       </a:r>
-                      <a:endParaRPr lang="en-US" sz="1100">
+                      <a:endParaRPr lang="en-US" sz="1100" dirty="0">
                         <a:latin typeface="Calibri"/>
                         <a:ea typeface="Calibri"/>
                         <a:cs typeface="Times New Roman"/>
@@ -18144,7 +21655,7 @@
                           <a:spcPts val="0"/>
                         </a:spcAft>
                       </a:pPr>
-                      <a:endParaRPr lang="en-US" sz="1100">
+                      <a:endParaRPr lang="en-US" sz="1100" dirty="0">
                         <a:latin typeface="Calibri"/>
                         <a:ea typeface="Calibri"/>
                         <a:cs typeface="Times New Roman"/>
@@ -18860,7 +22371,7 @@
                           <a:spcPts val="0"/>
                         </a:spcAft>
                       </a:pPr>
-                      <a:endParaRPr lang="en-US" sz="1100">
+                      <a:endParaRPr lang="en-US" sz="1100" dirty="0">
                         <a:latin typeface="Calibri"/>
                         <a:ea typeface="Calibri"/>
                         <a:cs typeface="Times New Roman"/>
@@ -26369,7 +29880,7 @@
           <p:nvPr/>
         </p:nvPicPr>
         <p:blipFill>
-          <a:blip r:embed="rId2"/>
+          <a:blip r:embed="rId3"/>
           <a:stretch>
             <a:fillRect/>
           </a:stretch>
@@ -26425,7 +29936,7 @@
           <p:nvPr/>
         </p:nvPicPr>
         <p:blipFill>
-          <a:blip r:embed="rId2"/>
+          <a:blip r:embed="rId3"/>
           <a:stretch>
             <a:fillRect/>
           </a:stretch>
@@ -26474,7 +29985,7 @@
           <p:nvPr/>
         </p:nvPicPr>
         <p:blipFill>
-          <a:blip r:embed="rId2"/>
+          <a:blip r:embed="rId3"/>
           <a:stretch>
             <a:fillRect/>
           </a:stretch>
@@ -26523,7 +30034,7 @@
           <p:nvPr/>
         </p:nvPicPr>
         <p:blipFill>
-          <a:blip r:embed="rId2"/>
+          <a:blip r:embed="rId3"/>
           <a:stretch>
             <a:fillRect/>
           </a:stretch>
@@ -26649,7 +30160,7 @@
           <p:nvPr/>
         </p:nvPicPr>
         <p:blipFill>
-          <a:blip r:embed="rId2"/>
+          <a:blip r:embed="rId3"/>
           <a:stretch>
             <a:fillRect/>
           </a:stretch>
@@ -26698,7 +30209,7 @@
           <p:nvPr/>
         </p:nvPicPr>
         <p:blipFill>
-          <a:blip r:embed="rId2"/>
+          <a:blip r:embed="rId3"/>
           <a:stretch>
             <a:fillRect/>
           </a:stretch>
@@ -26747,7 +30258,7 @@
           <p:nvPr/>
         </p:nvPicPr>
         <p:blipFill>
-          <a:blip r:embed="rId2"/>
+          <a:blip r:embed="rId3"/>
           <a:stretch>
             <a:fillRect/>
           </a:stretch>
@@ -26789,26 +30300,28 @@
       </p:grpSpPr>
       <p:pic>
         <p:nvPicPr>
-          <p:cNvPr id="2" name="Picture 1" descr="viewComment.JPG"/>
+          <p:cNvPr id="2051" name="Picture 3" descr="C:\Users\David.GREENTREE2004\Desktop\sports-score-tracker\Documents\Sequence Diagrams\viewComments.JPG"/>
           <p:cNvPicPr>
-            <a:picLocks noChangeAspect="1"/>
+            <a:picLocks noChangeAspect="1" noChangeArrowheads="1"/>
           </p:cNvPicPr>
           <p:nvPr/>
         </p:nvPicPr>
         <p:blipFill>
-          <a:blip r:embed="rId2"/>
+          <a:blip r:embed="rId3"/>
+          <a:srcRect/>
           <a:stretch>
             <a:fillRect/>
           </a:stretch>
         </p:blipFill>
-        <p:spPr>
+        <p:spPr bwMode="auto">
           <a:xfrm>
-            <a:off x="0" y="0"/>
-            <a:ext cx="9144000" cy="6858000"/>
+            <a:off x="0" y="-17692"/>
+            <a:ext cx="9144000" cy="6875692"/>
           </a:xfrm>
           <a:prstGeom prst="rect">
             <a:avLst/>
           </a:prstGeom>
+          <a:noFill/>
         </p:spPr>
       </p:pic>
     </p:spTree>
@@ -26852,7 +30365,7 @@
           <p:nvPr/>
         </p:nvPicPr>
         <p:blipFill>
-          <a:blip r:embed="rId2"/>
+          <a:blip r:embed="rId3"/>
           <a:stretch>
             <a:fillRect/>
           </a:stretch>
@@ -26901,7 +30414,7 @@
           <p:nvPr/>
         </p:nvPicPr>
         <p:blipFill>
-          <a:blip r:embed="rId2"/>
+          <a:blip r:embed="rId3"/>
           <a:stretch>
             <a:fillRect/>
           </a:stretch>
@@ -26943,26 +30456,28 @@
       </p:grpSpPr>
       <p:pic>
         <p:nvPicPr>
-          <p:cNvPr id="2" name="Picture 1" descr="publishVote.JPG"/>
+          <p:cNvPr id="3074" name="Picture 2" descr="C:\Users\David.GREENTREE2004\Desktop\sports-score-tracker\Documents\Sequence Diagrams\publishVote.JPG"/>
           <p:cNvPicPr>
-            <a:picLocks noChangeAspect="1"/>
+            <a:picLocks noChangeAspect="1" noChangeArrowheads="1"/>
           </p:cNvPicPr>
           <p:nvPr/>
         </p:nvPicPr>
         <p:blipFill>
-          <a:blip r:embed="rId2"/>
+          <a:blip r:embed="rId3"/>
+          <a:srcRect/>
           <a:stretch>
             <a:fillRect/>
           </a:stretch>
         </p:blipFill>
-        <p:spPr>
+        <p:spPr bwMode="auto">
           <a:xfrm>
             <a:off x="0" y="0"/>
-            <a:ext cx="9143999" cy="6858000"/>
+            <a:ext cx="9144000" cy="6858000"/>
           </a:xfrm>
           <a:prstGeom prst="rect">
             <a:avLst/>
           </a:prstGeom>
+          <a:noFill/>
         </p:spPr>
       </p:pic>
     </p:spTree>
@@ -26999,7 +30514,7 @@
           <p:nvPr/>
         </p:nvPicPr>
         <p:blipFill>
-          <a:blip r:embed="rId2"/>
+          <a:blip r:embed="rId3"/>
           <a:stretch>
             <a:fillRect/>
           </a:stretch>
@@ -27041,26 +30556,28 @@
       </p:grpSpPr>
       <p:pic>
         <p:nvPicPr>
-          <p:cNvPr id="2" name="Picture 1" descr="modifySport.JPG"/>
+          <p:cNvPr id="4099" name="Picture 3" descr="C:\Users\David.GREENTREE2004\Desktop\sports-score-tracker\Documents\Sequence Diagrams\modifySport.JPG"/>
           <p:cNvPicPr>
-            <a:picLocks noChangeAspect="1"/>
+            <a:picLocks noChangeAspect="1" noChangeArrowheads="1"/>
           </p:cNvPicPr>
           <p:nvPr/>
         </p:nvPicPr>
         <p:blipFill>
-          <a:blip r:embed="rId2"/>
+          <a:blip r:embed="rId3"/>
+          <a:srcRect/>
           <a:stretch>
             <a:fillRect/>
           </a:stretch>
         </p:blipFill>
-        <p:spPr>
+        <p:spPr bwMode="auto">
           <a:xfrm>
             <a:off x="0" y="0"/>
-            <a:ext cx="9143999" cy="6858000"/>
+            <a:ext cx="9144000" cy="6858000"/>
           </a:xfrm>
           <a:prstGeom prst="rect">
             <a:avLst/>
           </a:prstGeom>
+          <a:noFill/>
         </p:spPr>
       </p:pic>
     </p:spTree>
@@ -27097,7 +30614,7 @@
           <p:nvPr/>
         </p:nvPicPr>
         <p:blipFill>
-          <a:blip r:embed="rId2"/>
+          <a:blip r:embed="rId3"/>
           <a:stretch>
             <a:fillRect/>
           </a:stretch>
@@ -27216,7 +30733,7 @@
           <p:nvPr/>
         </p:nvPicPr>
         <p:blipFill>
-          <a:blip r:embed="rId2"/>
+          <a:blip r:embed="rId3"/>
           <a:stretch>
             <a:fillRect/>
           </a:stretch>
@@ -27265,7 +30782,7 @@
           <p:nvPr/>
         </p:nvPicPr>
         <p:blipFill>
-          <a:blip r:embed="rId2"/>
+          <a:blip r:embed="rId3"/>
           <a:stretch>
             <a:fillRect/>
           </a:stretch>
@@ -27314,7 +30831,7 @@
           <p:nvPr/>
         </p:nvPicPr>
         <p:blipFill>
-          <a:blip r:embed="rId2"/>
+          <a:blip r:embed="rId3"/>
           <a:stretch>
             <a:fillRect/>
           </a:stretch>
@@ -27363,7 +30880,7 @@
           <p:nvPr/>
         </p:nvPicPr>
         <p:blipFill>
-          <a:blip r:embed="rId2"/>
+          <a:blip r:embed="rId3"/>
           <a:stretch>
             <a:fillRect/>
           </a:stretch>
@@ -27412,7 +30929,7 @@
           <p:nvPr/>
         </p:nvPicPr>
         <p:blipFill>
-          <a:blip r:embed="rId2"/>
+          <a:blip r:embed="rId3"/>
           <a:stretch>
             <a:fillRect/>
           </a:stretch>
@@ -27454,26 +30971,28 @@
       </p:grpSpPr>
       <p:pic>
         <p:nvPicPr>
-          <p:cNvPr id="2" name="Picture 1" descr="modifyUser.JPG"/>
+          <p:cNvPr id="5122" name="Picture 2" descr="C:\Users\David.GREENTREE2004\Desktop\sports-score-tracker\Documents\Sequence Diagrams\modifyUser.JPG"/>
           <p:cNvPicPr>
-            <a:picLocks noChangeAspect="1"/>
+            <a:picLocks noChangeAspect="1" noChangeArrowheads="1"/>
           </p:cNvPicPr>
           <p:nvPr/>
         </p:nvPicPr>
         <p:blipFill>
-          <a:blip r:embed="rId2"/>
+          <a:blip r:embed="rId3"/>
+          <a:srcRect/>
           <a:stretch>
             <a:fillRect/>
           </a:stretch>
         </p:blipFill>
-        <p:spPr>
+        <p:spPr bwMode="auto">
           <a:xfrm>
-            <a:off x="0" y="0"/>
-            <a:ext cx="9144000" cy="6858000"/>
+            <a:off x="0" y="-1"/>
+            <a:ext cx="9144000" cy="6865881"/>
           </a:xfrm>
           <a:prstGeom prst="rect">
             <a:avLst/>
           </a:prstGeom>
+          <a:noFill/>
         </p:spPr>
       </p:pic>
     </p:spTree>
@@ -27510,7 +31029,7 @@
           <p:nvPr/>
         </p:nvPicPr>
         <p:blipFill>
-          <a:blip r:embed="rId2"/>
+          <a:blip r:embed="rId3"/>
           <a:stretch>
             <a:fillRect/>
           </a:stretch>
@@ -27559,7 +31078,7 @@
           <p:nvPr/>
         </p:nvPicPr>
         <p:blipFill>
-          <a:blip r:embed="rId2"/>
+          <a:blip r:embed="rId3"/>
           <a:stretch>
             <a:fillRect/>
           </a:stretch>
@@ -27615,7 +31134,7 @@
           <p:nvPr/>
         </p:nvPicPr>
         <p:blipFill>
-          <a:blip r:embed="rId2"/>
+          <a:blip r:embed="rId3"/>
           <a:stretch>
             <a:fillRect/>
           </a:stretch>
@@ -27671,7 +31190,7 @@
           <p:nvPr/>
         </p:nvPicPr>
         <p:blipFill>
-          <a:blip r:embed="rId2"/>
+          <a:blip r:embed="rId3"/>
           <a:stretch>
             <a:fillRect/>
           </a:stretch>
@@ -29381,4 +32900,287 @@
     </a:extraClrScheme>
   </a:extraClrSchemeLst>
 </a:theme>
+</file>
+
+<file path=ppt/theme/theme2.xml><?xml version="1.0" encoding="utf-8"?>
+<a:theme xmlns:a="http://schemas.openxmlformats.org/drawingml/2006/main" name="Office Theme">
+  <a:themeElements>
+    <a:clrScheme name="Office">
+      <a:dk1>
+        <a:sysClr val="windowText" lastClr="000000"/>
+      </a:dk1>
+      <a:lt1>
+        <a:sysClr val="window" lastClr="FFFFFF"/>
+      </a:lt1>
+      <a:dk2>
+        <a:srgbClr val="1F497D"/>
+      </a:dk2>
+      <a:lt2>
+        <a:srgbClr val="EEECE1"/>
+      </a:lt2>
+      <a:accent1>
+        <a:srgbClr val="4F81BD"/>
+      </a:accent1>
+      <a:accent2>
+        <a:srgbClr val="C0504D"/>
+      </a:accent2>
+      <a:accent3>
+        <a:srgbClr val="9BBB59"/>
+      </a:accent3>
+      <a:accent4>
+        <a:srgbClr val="8064A2"/>
+      </a:accent4>
+      <a:accent5>
+        <a:srgbClr val="4BACC6"/>
+      </a:accent5>
+      <a:accent6>
+        <a:srgbClr val="F79646"/>
+      </a:accent6>
+      <a:hlink>
+        <a:srgbClr val="0000FF"/>
+      </a:hlink>
+      <a:folHlink>
+        <a:srgbClr val="800080"/>
+      </a:folHlink>
+    </a:clrScheme>
+    <a:fontScheme name="Office">
+      <a:majorFont>
+        <a:latin typeface="Calibri"/>
+        <a:ea typeface=""/>
+        <a:cs typeface=""/>
+        <a:font script="Jpan" typeface="ＭＳ Ｐゴシック"/>
+        <a:font script="Hang" typeface="맑은 고딕"/>
+        <a:font script="Hans" typeface="宋体"/>
+        <a:font script="Hant" typeface="新細明體"/>
+        <a:font script="Arab" typeface="Times New Roman"/>
+        <a:font script="Hebr" typeface="Times New Roman"/>
+        <a:font script="Thai" typeface="Angsana New"/>
+        <a:font script="Ethi" typeface="Nyala"/>
+        <a:font script="Beng" typeface="Vrinda"/>
+        <a:font script="Gujr" typeface="Shruti"/>
+        <a:font script="Khmr" typeface="MoolBoran"/>
+        <a:font script="Knda" typeface="Tunga"/>
+        <a:font script="Guru" typeface="Raavi"/>
+        <a:font script="Cans" typeface="Euphemia"/>
+        <a:font script="Cher" typeface="Plantagenet Cherokee"/>
+        <a:font script="Yiii" typeface="Microsoft Yi Baiti"/>
+        <a:font script="Tibt" typeface="Microsoft Himalaya"/>
+        <a:font script="Thaa" typeface="MV Boli"/>
+        <a:font script="Deva" typeface="Mangal"/>
+        <a:font script="Telu" typeface="Gautami"/>
+        <a:font script="Taml" typeface="Latha"/>
+        <a:font script="Syrc" typeface="Estrangelo Edessa"/>
+        <a:font script="Orya" typeface="Kalinga"/>
+        <a:font script="Mlym" typeface="Kartika"/>
+        <a:font script="Laoo" typeface="DokChampa"/>
+        <a:font script="Sinh" typeface="Iskoola Pota"/>
+        <a:font script="Mong" typeface="Mongolian Baiti"/>
+        <a:font script="Viet" typeface="Times New Roman"/>
+        <a:font script="Uigh" typeface="Microsoft Uighur"/>
+      </a:majorFont>
+      <a:minorFont>
+        <a:latin typeface="Calibri"/>
+        <a:ea typeface=""/>
+        <a:cs typeface=""/>
+        <a:font script="Jpan" typeface="ＭＳ Ｐゴシック"/>
+        <a:font script="Hang" typeface="맑은 고딕"/>
+        <a:font script="Hans" typeface="宋体"/>
+        <a:font script="Hant" typeface="新細明體"/>
+        <a:font script="Arab" typeface="Arial"/>
+        <a:font script="Hebr" typeface="Arial"/>
+        <a:font script="Thai" typeface="Cordia New"/>
+        <a:font script="Ethi" typeface="Nyala"/>
+        <a:font script="Beng" typeface="Vrinda"/>
+        <a:font script="Gujr" typeface="Shruti"/>
+        <a:font script="Khmr" typeface="DaunPenh"/>
+        <a:font script="Knda" typeface="Tunga"/>
+        <a:font script="Guru" typeface="Raavi"/>
+        <a:font script="Cans" typeface="Euphemia"/>
+        <a:font script="Cher" typeface="Plantagenet Cherokee"/>
+        <a:font script="Yiii" typeface="Microsoft Yi Baiti"/>
+        <a:font script="Tibt" typeface="Microsoft Himalaya"/>
+        <a:font script="Thaa" typeface="MV Boli"/>
+        <a:font script="Deva" typeface="Mangal"/>
+        <a:font script="Telu" typeface="Gautami"/>
+        <a:font script="Taml" typeface="Latha"/>
+        <a:font script="Syrc" typeface="Estrangelo Edessa"/>
+        <a:font script="Orya" typeface="Kalinga"/>
+        <a:font script="Mlym" typeface="Kartika"/>
+        <a:font script="Laoo" typeface="DokChampa"/>
+        <a:font script="Sinh" typeface="Iskoola Pota"/>
+        <a:font script="Mong" typeface="Mongolian Baiti"/>
+        <a:font script="Viet" typeface="Arial"/>
+        <a:font script="Uigh" typeface="Microsoft Uighur"/>
+      </a:minorFont>
+    </a:fontScheme>
+    <a:fmtScheme name="Office">
+      <a:fillStyleLst>
+        <a:solidFill>
+          <a:schemeClr val="phClr"/>
+        </a:solidFill>
+        <a:gradFill rotWithShape="1">
+          <a:gsLst>
+            <a:gs pos="0">
+              <a:schemeClr val="phClr">
+                <a:tint val="50000"/>
+                <a:satMod val="300000"/>
+              </a:schemeClr>
+            </a:gs>
+            <a:gs pos="35000">
+              <a:schemeClr val="phClr">
+                <a:tint val="37000"/>
+                <a:satMod val="300000"/>
+              </a:schemeClr>
+            </a:gs>
+            <a:gs pos="100000">
+              <a:schemeClr val="phClr">
+                <a:tint val="15000"/>
+                <a:satMod val="350000"/>
+              </a:schemeClr>
+            </a:gs>
+          </a:gsLst>
+          <a:lin ang="16200000" scaled="1"/>
+        </a:gradFill>
+        <a:gradFill rotWithShape="1">
+          <a:gsLst>
+            <a:gs pos="0">
+              <a:schemeClr val="phClr">
+                <a:shade val="51000"/>
+                <a:satMod val="130000"/>
+              </a:schemeClr>
+            </a:gs>
+            <a:gs pos="80000">
+              <a:schemeClr val="phClr">
+                <a:shade val="93000"/>
+                <a:satMod val="130000"/>
+              </a:schemeClr>
+            </a:gs>
+            <a:gs pos="100000">
+              <a:schemeClr val="phClr">
+                <a:shade val="94000"/>
+                <a:satMod val="135000"/>
+              </a:schemeClr>
+            </a:gs>
+          </a:gsLst>
+          <a:lin ang="16200000" scaled="0"/>
+        </a:gradFill>
+      </a:fillStyleLst>
+      <a:lnStyleLst>
+        <a:ln w="9525" cap="flat" cmpd="sng" algn="ctr">
+          <a:solidFill>
+            <a:schemeClr val="phClr">
+              <a:shade val="95000"/>
+              <a:satMod val="105000"/>
+            </a:schemeClr>
+          </a:solidFill>
+          <a:prstDash val="solid"/>
+        </a:ln>
+        <a:ln w="25400" cap="flat" cmpd="sng" algn="ctr">
+          <a:solidFill>
+            <a:schemeClr val="phClr"/>
+          </a:solidFill>
+          <a:prstDash val="solid"/>
+        </a:ln>
+        <a:ln w="38100" cap="flat" cmpd="sng" algn="ctr">
+          <a:solidFill>
+            <a:schemeClr val="phClr"/>
+          </a:solidFill>
+          <a:prstDash val="solid"/>
+        </a:ln>
+      </a:lnStyleLst>
+      <a:effectStyleLst>
+        <a:effectStyle>
+          <a:effectLst>
+            <a:outerShdw blurRad="40000" dist="20000" dir="5400000" rotWithShape="0">
+              <a:srgbClr val="000000">
+                <a:alpha val="38000"/>
+              </a:srgbClr>
+            </a:outerShdw>
+          </a:effectLst>
+        </a:effectStyle>
+        <a:effectStyle>
+          <a:effectLst>
+            <a:outerShdw blurRad="40000" dist="23000" dir="5400000" rotWithShape="0">
+              <a:srgbClr val="000000">
+                <a:alpha val="35000"/>
+              </a:srgbClr>
+            </a:outerShdw>
+          </a:effectLst>
+        </a:effectStyle>
+        <a:effectStyle>
+          <a:effectLst>
+            <a:outerShdw blurRad="40000" dist="23000" dir="5400000" rotWithShape="0">
+              <a:srgbClr val="000000">
+                <a:alpha val="35000"/>
+              </a:srgbClr>
+            </a:outerShdw>
+          </a:effectLst>
+          <a:scene3d>
+            <a:camera prst="orthographicFront">
+              <a:rot lat="0" lon="0" rev="0"/>
+            </a:camera>
+            <a:lightRig rig="threePt" dir="t">
+              <a:rot lat="0" lon="0" rev="1200000"/>
+            </a:lightRig>
+          </a:scene3d>
+          <a:sp3d>
+            <a:bevelT w="63500" h="25400"/>
+          </a:sp3d>
+        </a:effectStyle>
+      </a:effectStyleLst>
+      <a:bgFillStyleLst>
+        <a:solidFill>
+          <a:schemeClr val="phClr"/>
+        </a:solidFill>
+        <a:gradFill rotWithShape="1">
+          <a:gsLst>
+            <a:gs pos="0">
+              <a:schemeClr val="phClr">
+                <a:tint val="40000"/>
+                <a:satMod val="350000"/>
+              </a:schemeClr>
+            </a:gs>
+            <a:gs pos="40000">
+              <a:schemeClr val="phClr">
+                <a:tint val="45000"/>
+                <a:shade val="99000"/>
+                <a:satMod val="350000"/>
+              </a:schemeClr>
+            </a:gs>
+            <a:gs pos="100000">
+              <a:schemeClr val="phClr">
+                <a:shade val="20000"/>
+                <a:satMod val="255000"/>
+              </a:schemeClr>
+            </a:gs>
+          </a:gsLst>
+          <a:path path="circle">
+            <a:fillToRect l="50000" t="-80000" r="50000" b="180000"/>
+          </a:path>
+        </a:gradFill>
+        <a:gradFill rotWithShape="1">
+          <a:gsLst>
+            <a:gs pos="0">
+              <a:schemeClr val="phClr">
+                <a:tint val="80000"/>
+                <a:satMod val="300000"/>
+              </a:schemeClr>
+            </a:gs>
+            <a:gs pos="100000">
+              <a:schemeClr val="phClr">
+                <a:shade val="30000"/>
+                <a:satMod val="200000"/>
+              </a:schemeClr>
+            </a:gs>
+          </a:gsLst>
+          <a:path path="circle">
+            <a:fillToRect l="50000" t="50000" r="50000" b="50000"/>
+          </a:path>
+        </a:gradFill>
+      </a:bgFillStyleLst>
+    </a:fmtScheme>
+  </a:themeElements>
+  <a:objectDefaults/>
+  <a:extraClrSchemeLst/>
+</a:theme>
 </file>
</xml_diff>

<commit_message>
DesignPresentation.pptx updated by ccox on 4/6/09
</commit_message>
<xml_diff>
--- a/Documents/DesignPresentation.pptx
+++ b/Documents/DesignPresentation.pptx
@@ -256,14 +256,14 @@
           <a:bodyPr vert="horz" lIns="91440" tIns="45720" rIns="91440" bIns="45720" rtlCol="0"/>
           <a:lstStyle>
             <a:lvl1pPr algn="r" eaLnBrk="0" hangingPunct="0">
-              <a:defRPr sz="1200" smtClean="0"/>
+              <a:defRPr sz="1200"/>
             </a:lvl1pPr>
           </a:lstStyle>
           <a:p>
             <a:pPr>
               <a:defRPr/>
             </a:pPr>
-            <a:fld id="{4AEE8A6F-B1B0-4ACE-85C4-900D7FBE14C6}" type="datetimeFigureOut">
+            <a:fld id="{8090E8CF-6977-4E20-922C-B7E053427F07}" type="datetimeFigureOut">
               <a:rPr lang="en-US"/>
               <a:pPr>
                 <a:defRPr/>
@@ -427,14 +427,14 @@
           <a:bodyPr vert="horz" lIns="91440" tIns="45720" rIns="91440" bIns="45720" rtlCol="0" anchor="b"/>
           <a:lstStyle>
             <a:lvl1pPr algn="r" eaLnBrk="0" hangingPunct="0">
-              <a:defRPr sz="1200" smtClean="0"/>
+              <a:defRPr sz="1200"/>
             </a:lvl1pPr>
           </a:lstStyle>
           <a:p>
             <a:pPr>
               <a:defRPr/>
             </a:pPr>
-            <a:fld id="{6F0D737F-34CD-44E3-8B38-441175BBB2F8}" type="slidenum">
+            <a:fld id="{9FB768D4-6607-45DC-BDBC-BFCD9ADD0DD6}" type="slidenum">
               <a:rPr lang="en-US"/>
               <a:pPr>
                 <a:defRPr/>
@@ -449,7 +449,7 @@
   </p:cSld>
   <p:clrMap bg1="lt1" tx1="dk1" bg2="lt2" tx2="dk2" accent1="accent1" accent2="accent2" accent3="accent3" accent4="accent4" accent5="accent5" accent6="accent6" hlink="hlink" folHlink="folHlink"/>
   <p:notesStyle>
-    <a:lvl1pPr algn="l" rtl="0" fontAlgn="base">
+    <a:lvl1pPr algn="l" rtl="0" eaLnBrk="0" fontAlgn="base" hangingPunct="0">
       <a:spcBef>
         <a:spcPct val="30000"/>
       </a:spcBef>
@@ -465,7 +465,7 @@
         <a:cs typeface="+mn-cs"/>
       </a:defRPr>
     </a:lvl1pPr>
-    <a:lvl2pPr marL="457200" algn="l" rtl="0" fontAlgn="base">
+    <a:lvl2pPr marL="457200" algn="l" rtl="0" eaLnBrk="0" fontAlgn="base" hangingPunct="0">
       <a:spcBef>
         <a:spcPct val="30000"/>
       </a:spcBef>
@@ -481,7 +481,7 @@
         <a:cs typeface="+mn-cs"/>
       </a:defRPr>
     </a:lvl2pPr>
-    <a:lvl3pPr marL="914400" algn="l" rtl="0" fontAlgn="base">
+    <a:lvl3pPr marL="914400" algn="l" rtl="0" eaLnBrk="0" fontAlgn="base" hangingPunct="0">
       <a:spcBef>
         <a:spcPct val="30000"/>
       </a:spcBef>
@@ -497,7 +497,7 @@
         <a:cs typeface="+mn-cs"/>
       </a:defRPr>
     </a:lvl3pPr>
-    <a:lvl4pPr marL="1371600" algn="l" rtl="0" fontAlgn="base">
+    <a:lvl4pPr marL="1371600" algn="l" rtl="0" eaLnBrk="0" fontAlgn="base" hangingPunct="0">
       <a:spcBef>
         <a:spcPct val="30000"/>
       </a:spcBef>
@@ -513,7 +513,7 @@
         <a:cs typeface="+mn-cs"/>
       </a:defRPr>
     </a:lvl4pPr>
-    <a:lvl5pPr marL="1828800" algn="l" rtl="0" fontAlgn="base">
+    <a:lvl5pPr marL="1828800" algn="l" rtl="0" eaLnBrk="0" fontAlgn="base" hangingPunct="0">
       <a:spcBef>
         <a:spcPct val="30000"/>
       </a:spcBef>
@@ -633,7 +633,7 @@
           </a:bodyPr>
           <a:lstStyle/>
           <a:p>
-            <a:pPr>
+            <a:pPr eaLnBrk="1" hangingPunct="1">
               <a:spcBef>
                 <a:spcPct val="0"/>
               </a:spcBef>
@@ -668,12 +668,12 @@
           </a:bodyPr>
           <a:lstStyle/>
           <a:p>
-            <a:fld id="{DBD4ACA8-FFE3-4404-AFC3-85C3D469A12C}" type="slidenum">
-              <a:rPr lang="en-US"/>
+            <a:fld id="{B104D60D-5193-445B-B91B-ACC731B6FE79}" type="slidenum">
+              <a:rPr lang="en-US" smtClean="0"/>
               <a:pPr/>
               <a:t>1</a:t>
             </a:fld>
-            <a:endParaRPr lang="en-US"/>
+            <a:endParaRPr lang="en-US" smtClean="0"/>
           </a:p>
         </p:txBody>
       </p:sp>
@@ -704,7 +704,7 @@
       </p:grpSpPr>
       <p:sp>
         <p:nvSpPr>
-          <p:cNvPr id="37889" name="Slide Image Placeholder 1"/>
+          <p:cNvPr id="34817" name="Slide Image Placeholder 1"/>
           <p:cNvSpPr>
             <a:spLocks noGrp="1" noRot="1" noChangeAspect="1"/>
           </p:cNvSpPr>
@@ -726,7 +726,7 @@
       </p:sp>
       <p:sp>
         <p:nvSpPr>
-          <p:cNvPr id="37890" name="Notes Placeholder 2"/>
+          <p:cNvPr id="34818" name="Notes Placeholder 2"/>
           <p:cNvSpPr>
             <a:spLocks noGrp="1"/>
           </p:cNvSpPr>
@@ -745,7 +745,7 @@
           </a:bodyPr>
           <a:lstStyle/>
           <a:p>
-            <a:pPr>
+            <a:pPr eaLnBrk="1" hangingPunct="1">
               <a:spcBef>
                 <a:spcPct val="0"/>
               </a:spcBef>
@@ -756,7 +756,7 @@
       </p:sp>
       <p:sp>
         <p:nvSpPr>
-          <p:cNvPr id="37891" name="Slide Number Placeholder 3"/>
+          <p:cNvPr id="34819" name="Slide Number Placeholder 3"/>
           <p:cNvSpPr>
             <a:spLocks noGrp="1"/>
           </p:cNvSpPr>
@@ -780,12 +780,12 @@
           </a:bodyPr>
           <a:lstStyle/>
           <a:p>
-            <a:fld id="{8A95FB9F-4679-4429-AC25-1B2F6560BDD1}" type="slidenum">
-              <a:rPr lang="en-US"/>
+            <a:fld id="{DEA797A0-F670-4FBA-AD03-8F9FA20AD180}" type="slidenum">
+              <a:rPr lang="en-US" smtClean="0"/>
               <a:pPr/>
               <a:t>11</a:t>
             </a:fld>
-            <a:endParaRPr lang="en-US"/>
+            <a:endParaRPr lang="en-US" smtClean="0"/>
           </a:p>
         </p:txBody>
       </p:sp>
@@ -816,7 +816,7 @@
       </p:grpSpPr>
       <p:sp>
         <p:nvSpPr>
-          <p:cNvPr id="39937" name="Slide Image Placeholder 1"/>
+          <p:cNvPr id="36865" name="Slide Image Placeholder 1"/>
           <p:cNvSpPr>
             <a:spLocks noGrp="1" noRot="1" noChangeAspect="1"/>
           </p:cNvSpPr>
@@ -838,7 +838,7 @@
       </p:sp>
       <p:sp>
         <p:nvSpPr>
-          <p:cNvPr id="39938" name="Notes Placeholder 2"/>
+          <p:cNvPr id="36866" name="Notes Placeholder 2"/>
           <p:cNvSpPr>
             <a:spLocks noGrp="1"/>
           </p:cNvSpPr>
@@ -857,7 +857,7 @@
           </a:bodyPr>
           <a:lstStyle/>
           <a:p>
-            <a:pPr>
+            <a:pPr eaLnBrk="1" hangingPunct="1">
               <a:spcBef>
                 <a:spcPct val="0"/>
               </a:spcBef>
@@ -868,7 +868,7 @@
       </p:sp>
       <p:sp>
         <p:nvSpPr>
-          <p:cNvPr id="39939" name="Slide Number Placeholder 3"/>
+          <p:cNvPr id="36867" name="Slide Number Placeholder 3"/>
           <p:cNvSpPr>
             <a:spLocks noGrp="1"/>
           </p:cNvSpPr>
@@ -892,12 +892,12 @@
           </a:bodyPr>
           <a:lstStyle/>
           <a:p>
-            <a:fld id="{6AA6F5C4-0AC5-4AA5-A29A-D57BB9432ABF}" type="slidenum">
-              <a:rPr lang="en-US"/>
+            <a:fld id="{25D5FE1A-8BD0-42B4-A10E-9EE1DEE0E9DD}" type="slidenum">
+              <a:rPr lang="en-US" smtClean="0"/>
               <a:pPr/>
               <a:t>12</a:t>
             </a:fld>
-            <a:endParaRPr lang="en-US"/>
+            <a:endParaRPr lang="en-US" smtClean="0"/>
           </a:p>
         </p:txBody>
       </p:sp>
@@ -928,7 +928,7 @@
       </p:grpSpPr>
       <p:sp>
         <p:nvSpPr>
-          <p:cNvPr id="41985" name="Slide Image Placeholder 1"/>
+          <p:cNvPr id="38913" name="Slide Image Placeholder 1"/>
           <p:cNvSpPr>
             <a:spLocks noGrp="1" noRot="1" noChangeAspect="1"/>
           </p:cNvSpPr>
@@ -950,7 +950,7 @@
       </p:sp>
       <p:sp>
         <p:nvSpPr>
-          <p:cNvPr id="41986" name="Notes Placeholder 2"/>
+          <p:cNvPr id="38914" name="Notes Placeholder 2"/>
           <p:cNvSpPr>
             <a:spLocks noGrp="1"/>
           </p:cNvSpPr>
@@ -969,7 +969,7 @@
           </a:bodyPr>
           <a:lstStyle/>
           <a:p>
-            <a:pPr>
+            <a:pPr eaLnBrk="1" hangingPunct="1">
               <a:spcBef>
                 <a:spcPct val="0"/>
               </a:spcBef>
@@ -980,7 +980,7 @@
       </p:sp>
       <p:sp>
         <p:nvSpPr>
-          <p:cNvPr id="41987" name="Slide Number Placeholder 3"/>
+          <p:cNvPr id="38915" name="Slide Number Placeholder 3"/>
           <p:cNvSpPr>
             <a:spLocks noGrp="1"/>
           </p:cNvSpPr>
@@ -1004,12 +1004,12 @@
           </a:bodyPr>
           <a:lstStyle/>
           <a:p>
-            <a:fld id="{F34448C6-5A99-4F23-8166-FE5B80E92E34}" type="slidenum">
-              <a:rPr lang="en-US"/>
+            <a:fld id="{D03B2C96-A0AA-45B0-B65E-89D0D492AA92}" type="slidenum">
+              <a:rPr lang="en-US" smtClean="0"/>
               <a:pPr/>
               <a:t>13</a:t>
             </a:fld>
-            <a:endParaRPr lang="en-US"/>
+            <a:endParaRPr lang="en-US" smtClean="0"/>
           </a:p>
         </p:txBody>
       </p:sp>
@@ -1040,7 +1040,7 @@
       </p:grpSpPr>
       <p:sp>
         <p:nvSpPr>
-          <p:cNvPr id="44033" name="Slide Image Placeholder 1"/>
+          <p:cNvPr id="40961" name="Slide Image Placeholder 1"/>
           <p:cNvSpPr>
             <a:spLocks noGrp="1" noRot="1" noChangeAspect="1"/>
           </p:cNvSpPr>
@@ -1062,7 +1062,7 @@
       </p:sp>
       <p:sp>
         <p:nvSpPr>
-          <p:cNvPr id="44034" name="Notes Placeholder 2"/>
+          <p:cNvPr id="40962" name="Notes Placeholder 2"/>
           <p:cNvSpPr>
             <a:spLocks noGrp="1"/>
           </p:cNvSpPr>
@@ -1081,7 +1081,7 @@
           </a:bodyPr>
           <a:lstStyle/>
           <a:p>
-            <a:pPr>
+            <a:pPr eaLnBrk="1" hangingPunct="1">
               <a:spcBef>
                 <a:spcPct val="0"/>
               </a:spcBef>
@@ -1092,7 +1092,7 @@
       </p:sp>
       <p:sp>
         <p:nvSpPr>
-          <p:cNvPr id="44035" name="Slide Number Placeholder 3"/>
+          <p:cNvPr id="40963" name="Slide Number Placeholder 3"/>
           <p:cNvSpPr>
             <a:spLocks noGrp="1"/>
           </p:cNvSpPr>
@@ -1116,12 +1116,12 @@
           </a:bodyPr>
           <a:lstStyle/>
           <a:p>
-            <a:fld id="{901B9013-28FB-48D1-92E3-36C8D42C6AA3}" type="slidenum">
-              <a:rPr lang="en-US"/>
+            <a:fld id="{66264702-01C6-4661-A928-9FEE81688ECA}" type="slidenum">
+              <a:rPr lang="en-US" smtClean="0"/>
               <a:pPr/>
               <a:t>14</a:t>
             </a:fld>
-            <a:endParaRPr lang="en-US"/>
+            <a:endParaRPr lang="en-US" smtClean="0"/>
           </a:p>
         </p:txBody>
       </p:sp>
@@ -1152,7 +1152,7 @@
       </p:grpSpPr>
       <p:sp>
         <p:nvSpPr>
-          <p:cNvPr id="46081" name="Slide Image Placeholder 1"/>
+          <p:cNvPr id="43009" name="Slide Image Placeholder 1"/>
           <p:cNvSpPr>
             <a:spLocks noGrp="1" noRot="1" noChangeAspect="1"/>
           </p:cNvSpPr>
@@ -1174,7 +1174,7 @@
       </p:sp>
       <p:sp>
         <p:nvSpPr>
-          <p:cNvPr id="46082" name="Notes Placeholder 2"/>
+          <p:cNvPr id="43010" name="Notes Placeholder 2"/>
           <p:cNvSpPr>
             <a:spLocks noGrp="1"/>
           </p:cNvSpPr>
@@ -1193,7 +1193,7 @@
           </a:bodyPr>
           <a:lstStyle/>
           <a:p>
-            <a:pPr>
+            <a:pPr eaLnBrk="1" hangingPunct="1">
               <a:spcBef>
                 <a:spcPct val="0"/>
               </a:spcBef>
@@ -1204,7 +1204,7 @@
       </p:sp>
       <p:sp>
         <p:nvSpPr>
-          <p:cNvPr id="46083" name="Slide Number Placeholder 3"/>
+          <p:cNvPr id="43011" name="Slide Number Placeholder 3"/>
           <p:cNvSpPr>
             <a:spLocks noGrp="1"/>
           </p:cNvSpPr>
@@ -1228,12 +1228,12 @@
           </a:bodyPr>
           <a:lstStyle/>
           <a:p>
-            <a:fld id="{27ADDE7A-E76E-436C-A3B7-A906DCA3A7A8}" type="slidenum">
-              <a:rPr lang="en-US"/>
+            <a:fld id="{7351F059-66D3-413C-B460-C9CDEDD29D88}" type="slidenum">
+              <a:rPr lang="en-US" smtClean="0"/>
               <a:pPr/>
               <a:t>15</a:t>
             </a:fld>
-            <a:endParaRPr lang="en-US"/>
+            <a:endParaRPr lang="en-US" smtClean="0"/>
           </a:p>
         </p:txBody>
       </p:sp>
@@ -1264,7 +1264,7 @@
       </p:grpSpPr>
       <p:sp>
         <p:nvSpPr>
-          <p:cNvPr id="48129" name="Slide Image Placeholder 1"/>
+          <p:cNvPr id="45057" name="Slide Image Placeholder 1"/>
           <p:cNvSpPr>
             <a:spLocks noGrp="1" noRot="1" noChangeAspect="1"/>
           </p:cNvSpPr>
@@ -1286,7 +1286,7 @@
       </p:sp>
       <p:sp>
         <p:nvSpPr>
-          <p:cNvPr id="48130" name="Notes Placeholder 2"/>
+          <p:cNvPr id="45058" name="Notes Placeholder 2"/>
           <p:cNvSpPr>
             <a:spLocks noGrp="1"/>
           </p:cNvSpPr>
@@ -1305,7 +1305,7 @@
           </a:bodyPr>
           <a:lstStyle/>
           <a:p>
-            <a:pPr>
+            <a:pPr eaLnBrk="1" hangingPunct="1">
               <a:spcBef>
                 <a:spcPct val="0"/>
               </a:spcBef>
@@ -1316,7 +1316,7 @@
       </p:sp>
       <p:sp>
         <p:nvSpPr>
-          <p:cNvPr id="48131" name="Slide Number Placeholder 3"/>
+          <p:cNvPr id="45059" name="Slide Number Placeholder 3"/>
           <p:cNvSpPr>
             <a:spLocks noGrp="1"/>
           </p:cNvSpPr>
@@ -1340,12 +1340,12 @@
           </a:bodyPr>
           <a:lstStyle/>
           <a:p>
-            <a:fld id="{73B23A0E-D003-4506-A7EA-FA92B1A1C9EC}" type="slidenum">
-              <a:rPr lang="en-US"/>
+            <a:fld id="{F66A9591-7329-4707-90ED-5E45890E8F79}" type="slidenum">
+              <a:rPr lang="en-US" smtClean="0"/>
               <a:pPr/>
               <a:t>16</a:t>
             </a:fld>
-            <a:endParaRPr lang="en-US"/>
+            <a:endParaRPr lang="en-US" smtClean="0"/>
           </a:p>
         </p:txBody>
       </p:sp>
@@ -1376,7 +1376,7 @@
       </p:grpSpPr>
       <p:sp>
         <p:nvSpPr>
-          <p:cNvPr id="50177" name="Slide Image Placeholder 1"/>
+          <p:cNvPr id="47105" name="Slide Image Placeholder 1"/>
           <p:cNvSpPr>
             <a:spLocks noGrp="1" noRot="1" noChangeAspect="1"/>
           </p:cNvSpPr>
@@ -1398,7 +1398,7 @@
       </p:sp>
       <p:sp>
         <p:nvSpPr>
-          <p:cNvPr id="50178" name="Notes Placeholder 2"/>
+          <p:cNvPr id="47106" name="Notes Placeholder 2"/>
           <p:cNvSpPr>
             <a:spLocks noGrp="1"/>
           </p:cNvSpPr>
@@ -1417,7 +1417,7 @@
           </a:bodyPr>
           <a:lstStyle/>
           <a:p>
-            <a:pPr>
+            <a:pPr eaLnBrk="1" hangingPunct="1">
               <a:spcBef>
                 <a:spcPct val="0"/>
               </a:spcBef>
@@ -1428,7 +1428,7 @@
       </p:sp>
       <p:sp>
         <p:nvSpPr>
-          <p:cNvPr id="50179" name="Slide Number Placeholder 3"/>
+          <p:cNvPr id="47107" name="Slide Number Placeholder 3"/>
           <p:cNvSpPr>
             <a:spLocks noGrp="1"/>
           </p:cNvSpPr>
@@ -1452,12 +1452,12 @@
           </a:bodyPr>
           <a:lstStyle/>
           <a:p>
-            <a:fld id="{641D0E0D-B057-4DDA-AE0C-202D8FA927B9}" type="slidenum">
-              <a:rPr lang="en-US"/>
+            <a:fld id="{D0E7ECF5-1F01-4BE1-B871-DAE6A7A2494B}" type="slidenum">
+              <a:rPr lang="en-US" smtClean="0"/>
               <a:pPr/>
               <a:t>17</a:t>
             </a:fld>
-            <a:endParaRPr lang="en-US"/>
+            <a:endParaRPr lang="en-US" smtClean="0"/>
           </a:p>
         </p:txBody>
       </p:sp>
@@ -1488,7 +1488,7 @@
       </p:grpSpPr>
       <p:sp>
         <p:nvSpPr>
-          <p:cNvPr id="52225" name="Slide Image Placeholder 1"/>
+          <p:cNvPr id="49153" name="Slide Image Placeholder 1"/>
           <p:cNvSpPr>
             <a:spLocks noGrp="1" noRot="1" noChangeAspect="1"/>
           </p:cNvSpPr>
@@ -1510,7 +1510,7 @@
       </p:sp>
       <p:sp>
         <p:nvSpPr>
-          <p:cNvPr id="52226" name="Notes Placeholder 2"/>
+          <p:cNvPr id="49154" name="Notes Placeholder 2"/>
           <p:cNvSpPr>
             <a:spLocks noGrp="1"/>
           </p:cNvSpPr>
@@ -1529,7 +1529,7 @@
           </a:bodyPr>
           <a:lstStyle/>
           <a:p>
-            <a:pPr>
+            <a:pPr eaLnBrk="1" hangingPunct="1">
               <a:spcBef>
                 <a:spcPct val="0"/>
               </a:spcBef>
@@ -1540,7 +1540,7 @@
       </p:sp>
       <p:sp>
         <p:nvSpPr>
-          <p:cNvPr id="52227" name="Slide Number Placeholder 3"/>
+          <p:cNvPr id="49155" name="Slide Number Placeholder 3"/>
           <p:cNvSpPr>
             <a:spLocks noGrp="1"/>
           </p:cNvSpPr>
@@ -1564,12 +1564,12 @@
           </a:bodyPr>
           <a:lstStyle/>
           <a:p>
-            <a:fld id="{C3EBB467-2D05-4036-AEFE-9C8CAC5E6DA7}" type="slidenum">
-              <a:rPr lang="en-US"/>
+            <a:fld id="{026B6B4C-69D2-4886-B572-251DEC09B605}" type="slidenum">
+              <a:rPr lang="en-US" smtClean="0"/>
               <a:pPr/>
               <a:t>18</a:t>
             </a:fld>
-            <a:endParaRPr lang="en-US"/>
+            <a:endParaRPr lang="en-US" smtClean="0"/>
           </a:p>
         </p:txBody>
       </p:sp>
@@ -1600,7 +1600,7 @@
       </p:grpSpPr>
       <p:sp>
         <p:nvSpPr>
-          <p:cNvPr id="54273" name="Slide Image Placeholder 1"/>
+          <p:cNvPr id="51201" name="Slide Image Placeholder 1"/>
           <p:cNvSpPr>
             <a:spLocks noGrp="1" noRot="1" noChangeAspect="1"/>
           </p:cNvSpPr>
@@ -1622,7 +1622,7 @@
       </p:sp>
       <p:sp>
         <p:nvSpPr>
-          <p:cNvPr id="54274" name="Notes Placeholder 2"/>
+          <p:cNvPr id="51202" name="Notes Placeholder 2"/>
           <p:cNvSpPr>
             <a:spLocks noGrp="1"/>
           </p:cNvSpPr>
@@ -1641,7 +1641,7 @@
           </a:bodyPr>
           <a:lstStyle/>
           <a:p>
-            <a:pPr>
+            <a:pPr eaLnBrk="1" hangingPunct="1">
               <a:spcBef>
                 <a:spcPct val="0"/>
               </a:spcBef>
@@ -1652,7 +1652,7 @@
       </p:sp>
       <p:sp>
         <p:nvSpPr>
-          <p:cNvPr id="54275" name="Slide Number Placeholder 3"/>
+          <p:cNvPr id="51203" name="Slide Number Placeholder 3"/>
           <p:cNvSpPr>
             <a:spLocks noGrp="1"/>
           </p:cNvSpPr>
@@ -1676,12 +1676,12 @@
           </a:bodyPr>
           <a:lstStyle/>
           <a:p>
-            <a:fld id="{169A9C9F-4515-432F-AAA1-1FB96EED1509}" type="slidenum">
-              <a:rPr lang="en-US"/>
+            <a:fld id="{A795776B-B28F-41C6-92EF-174BFA77A0B6}" type="slidenum">
+              <a:rPr lang="en-US" smtClean="0"/>
               <a:pPr/>
               <a:t>19</a:t>
             </a:fld>
-            <a:endParaRPr lang="en-US"/>
+            <a:endParaRPr lang="en-US" smtClean="0"/>
           </a:p>
         </p:txBody>
       </p:sp>
@@ -1712,7 +1712,7 @@
       </p:grpSpPr>
       <p:sp>
         <p:nvSpPr>
-          <p:cNvPr id="56321" name="Slide Image Placeholder 1"/>
+          <p:cNvPr id="53249" name="Slide Image Placeholder 1"/>
           <p:cNvSpPr>
             <a:spLocks noGrp="1" noRot="1" noChangeAspect="1"/>
           </p:cNvSpPr>
@@ -1734,7 +1734,7 @@
       </p:sp>
       <p:sp>
         <p:nvSpPr>
-          <p:cNvPr id="56322" name="Notes Placeholder 2"/>
+          <p:cNvPr id="53250" name="Notes Placeholder 2"/>
           <p:cNvSpPr>
             <a:spLocks noGrp="1"/>
           </p:cNvSpPr>
@@ -1753,7 +1753,7 @@
           </a:bodyPr>
           <a:lstStyle/>
           <a:p>
-            <a:pPr>
+            <a:pPr eaLnBrk="1" hangingPunct="1">
               <a:spcBef>
                 <a:spcPct val="0"/>
               </a:spcBef>
@@ -1764,7 +1764,7 @@
       </p:sp>
       <p:sp>
         <p:nvSpPr>
-          <p:cNvPr id="56323" name="Slide Number Placeholder 3"/>
+          <p:cNvPr id="53251" name="Slide Number Placeholder 3"/>
           <p:cNvSpPr>
             <a:spLocks noGrp="1"/>
           </p:cNvSpPr>
@@ -1788,12 +1788,12 @@
           </a:bodyPr>
           <a:lstStyle/>
           <a:p>
-            <a:fld id="{F4313629-775B-430F-9C63-A52F38758A46}" type="slidenum">
-              <a:rPr lang="en-US"/>
+            <a:fld id="{535A2B39-E1AB-4643-928E-AD8BCC820D28}" type="slidenum">
+              <a:rPr lang="en-US" smtClean="0"/>
               <a:pPr/>
               <a:t>20</a:t>
             </a:fld>
-            <a:endParaRPr lang="en-US"/>
+            <a:endParaRPr lang="en-US" smtClean="0"/>
           </a:p>
         </p:txBody>
       </p:sp>
@@ -1824,7 +1824,7 @@
       </p:grpSpPr>
       <p:sp>
         <p:nvSpPr>
-          <p:cNvPr id="21505" name="Slide Image Placeholder 1"/>
+          <p:cNvPr id="18433" name="Slide Image Placeholder 1"/>
           <p:cNvSpPr>
             <a:spLocks noGrp="1" noRot="1" noChangeAspect="1"/>
           </p:cNvSpPr>
@@ -1846,7 +1846,7 @@
       </p:sp>
       <p:sp>
         <p:nvSpPr>
-          <p:cNvPr id="21506" name="Notes Placeholder 2"/>
+          <p:cNvPr id="18434" name="Notes Placeholder 2"/>
           <p:cNvSpPr>
             <a:spLocks noGrp="1"/>
           </p:cNvSpPr>
@@ -1865,7 +1865,7 @@
           </a:bodyPr>
           <a:lstStyle/>
           <a:p>
-            <a:pPr>
+            <a:pPr eaLnBrk="1" hangingPunct="1">
               <a:spcBef>
                 <a:spcPct val="0"/>
               </a:spcBef>
@@ -1876,7 +1876,7 @@
       </p:sp>
       <p:sp>
         <p:nvSpPr>
-          <p:cNvPr id="21507" name="Slide Number Placeholder 3"/>
+          <p:cNvPr id="18435" name="Slide Number Placeholder 3"/>
           <p:cNvSpPr>
             <a:spLocks noGrp="1"/>
           </p:cNvSpPr>
@@ -1900,12 +1900,12 @@
           </a:bodyPr>
           <a:lstStyle/>
           <a:p>
-            <a:fld id="{8D5E521D-E71B-48F8-97FB-0C374706A008}" type="slidenum">
-              <a:rPr lang="en-US"/>
+            <a:fld id="{2190AF67-D4CF-44D6-B21C-77AB7EC455DF}" type="slidenum">
+              <a:rPr lang="en-US" smtClean="0"/>
               <a:pPr/>
               <a:t>3</a:t>
             </a:fld>
-            <a:endParaRPr lang="en-US"/>
+            <a:endParaRPr lang="en-US" smtClean="0"/>
           </a:p>
         </p:txBody>
       </p:sp>
@@ -1936,7 +1936,7 @@
       </p:grpSpPr>
       <p:sp>
         <p:nvSpPr>
-          <p:cNvPr id="58369" name="Slide Image Placeholder 1"/>
+          <p:cNvPr id="55297" name="Slide Image Placeholder 1"/>
           <p:cNvSpPr>
             <a:spLocks noGrp="1" noRot="1" noChangeAspect="1"/>
           </p:cNvSpPr>
@@ -1958,7 +1958,7 @@
       </p:sp>
       <p:sp>
         <p:nvSpPr>
-          <p:cNvPr id="58370" name="Notes Placeholder 2"/>
+          <p:cNvPr id="55298" name="Notes Placeholder 2"/>
           <p:cNvSpPr>
             <a:spLocks noGrp="1"/>
           </p:cNvSpPr>
@@ -1977,7 +1977,7 @@
           </a:bodyPr>
           <a:lstStyle/>
           <a:p>
-            <a:pPr>
+            <a:pPr eaLnBrk="1" hangingPunct="1">
               <a:spcBef>
                 <a:spcPct val="0"/>
               </a:spcBef>
@@ -1988,7 +1988,7 @@
       </p:sp>
       <p:sp>
         <p:nvSpPr>
-          <p:cNvPr id="58371" name="Slide Number Placeholder 3"/>
+          <p:cNvPr id="55299" name="Slide Number Placeholder 3"/>
           <p:cNvSpPr>
             <a:spLocks noGrp="1"/>
           </p:cNvSpPr>
@@ -2012,12 +2012,12 @@
           </a:bodyPr>
           <a:lstStyle/>
           <a:p>
-            <a:fld id="{7FBB254F-F864-4592-A850-4A20DB86E59A}" type="slidenum">
-              <a:rPr lang="en-US"/>
+            <a:fld id="{57252DBF-03A0-4499-932B-D9590D0E7C2F}" type="slidenum">
+              <a:rPr lang="en-US" smtClean="0"/>
               <a:pPr/>
               <a:t>21</a:t>
             </a:fld>
-            <a:endParaRPr lang="en-US"/>
+            <a:endParaRPr lang="en-US" smtClean="0"/>
           </a:p>
         </p:txBody>
       </p:sp>
@@ -2048,7 +2048,7 @@
       </p:grpSpPr>
       <p:sp>
         <p:nvSpPr>
-          <p:cNvPr id="60417" name="Slide Image Placeholder 1"/>
+          <p:cNvPr id="57345" name="Slide Image Placeholder 1"/>
           <p:cNvSpPr>
             <a:spLocks noGrp="1" noRot="1" noChangeAspect="1"/>
           </p:cNvSpPr>
@@ -2070,7 +2070,7 @@
       </p:sp>
       <p:sp>
         <p:nvSpPr>
-          <p:cNvPr id="60418" name="Notes Placeholder 2"/>
+          <p:cNvPr id="57346" name="Notes Placeholder 2"/>
           <p:cNvSpPr>
             <a:spLocks noGrp="1"/>
           </p:cNvSpPr>
@@ -2089,7 +2089,7 @@
           </a:bodyPr>
           <a:lstStyle/>
           <a:p>
-            <a:pPr>
+            <a:pPr eaLnBrk="1" hangingPunct="1">
               <a:spcBef>
                 <a:spcPct val="0"/>
               </a:spcBef>
@@ -2100,7 +2100,7 @@
       </p:sp>
       <p:sp>
         <p:nvSpPr>
-          <p:cNvPr id="60419" name="Slide Number Placeholder 3"/>
+          <p:cNvPr id="57347" name="Slide Number Placeholder 3"/>
           <p:cNvSpPr>
             <a:spLocks noGrp="1"/>
           </p:cNvSpPr>
@@ -2124,12 +2124,12 @@
           </a:bodyPr>
           <a:lstStyle/>
           <a:p>
-            <a:fld id="{50FCB534-9CEF-46BD-9084-C84AD2BDDAE2}" type="slidenum">
-              <a:rPr lang="en-US"/>
+            <a:fld id="{ED6CC6F7-B5EC-4276-955C-B99BD10367AE}" type="slidenum">
+              <a:rPr lang="en-US" smtClean="0"/>
               <a:pPr/>
               <a:t>22</a:t>
             </a:fld>
-            <a:endParaRPr lang="en-US"/>
+            <a:endParaRPr lang="en-US" smtClean="0"/>
           </a:p>
         </p:txBody>
       </p:sp>
@@ -2160,7 +2160,7 @@
       </p:grpSpPr>
       <p:sp>
         <p:nvSpPr>
-          <p:cNvPr id="62465" name="Slide Image Placeholder 1"/>
+          <p:cNvPr id="59393" name="Slide Image Placeholder 1"/>
           <p:cNvSpPr>
             <a:spLocks noGrp="1" noRot="1" noChangeAspect="1"/>
           </p:cNvSpPr>
@@ -2182,7 +2182,7 @@
       </p:sp>
       <p:sp>
         <p:nvSpPr>
-          <p:cNvPr id="62466" name="Notes Placeholder 2"/>
+          <p:cNvPr id="59394" name="Notes Placeholder 2"/>
           <p:cNvSpPr>
             <a:spLocks noGrp="1"/>
           </p:cNvSpPr>
@@ -2201,7 +2201,7 @@
           </a:bodyPr>
           <a:lstStyle/>
           <a:p>
-            <a:pPr>
+            <a:pPr eaLnBrk="1" hangingPunct="1">
               <a:spcBef>
                 <a:spcPct val="0"/>
               </a:spcBef>
@@ -2212,7 +2212,7 @@
       </p:sp>
       <p:sp>
         <p:nvSpPr>
-          <p:cNvPr id="62467" name="Slide Number Placeholder 3"/>
+          <p:cNvPr id="59395" name="Slide Number Placeholder 3"/>
           <p:cNvSpPr>
             <a:spLocks noGrp="1"/>
           </p:cNvSpPr>
@@ -2236,12 +2236,12 @@
           </a:bodyPr>
           <a:lstStyle/>
           <a:p>
-            <a:fld id="{9E91AEEE-AFDA-4863-AA8F-A9C3CE86B6DA}" type="slidenum">
-              <a:rPr lang="en-US"/>
+            <a:fld id="{5ED30CDB-F1B6-40CE-87B2-E30C6E3C2F12}" type="slidenum">
+              <a:rPr lang="en-US" smtClean="0"/>
               <a:pPr/>
               <a:t>23</a:t>
             </a:fld>
-            <a:endParaRPr lang="en-US"/>
+            <a:endParaRPr lang="en-US" smtClean="0"/>
           </a:p>
         </p:txBody>
       </p:sp>
@@ -2272,7 +2272,7 @@
       </p:grpSpPr>
       <p:sp>
         <p:nvSpPr>
-          <p:cNvPr id="64513" name="Slide Image Placeholder 1"/>
+          <p:cNvPr id="61441" name="Slide Image Placeholder 1"/>
           <p:cNvSpPr>
             <a:spLocks noGrp="1" noRot="1" noChangeAspect="1"/>
           </p:cNvSpPr>
@@ -2294,7 +2294,7 @@
       </p:sp>
       <p:sp>
         <p:nvSpPr>
-          <p:cNvPr id="64514" name="Notes Placeholder 2"/>
+          <p:cNvPr id="61442" name="Notes Placeholder 2"/>
           <p:cNvSpPr>
             <a:spLocks noGrp="1"/>
           </p:cNvSpPr>
@@ -2313,7 +2313,7 @@
           </a:bodyPr>
           <a:lstStyle/>
           <a:p>
-            <a:pPr>
+            <a:pPr eaLnBrk="1" hangingPunct="1">
               <a:spcBef>
                 <a:spcPct val="0"/>
               </a:spcBef>
@@ -2324,7 +2324,7 @@
       </p:sp>
       <p:sp>
         <p:nvSpPr>
-          <p:cNvPr id="64515" name="Slide Number Placeholder 3"/>
+          <p:cNvPr id="61443" name="Slide Number Placeholder 3"/>
           <p:cNvSpPr>
             <a:spLocks noGrp="1"/>
           </p:cNvSpPr>
@@ -2348,12 +2348,12 @@
           </a:bodyPr>
           <a:lstStyle/>
           <a:p>
-            <a:fld id="{B4ABBDB4-8409-4782-A7D2-E04901FA25AE}" type="slidenum">
-              <a:rPr lang="en-US"/>
+            <a:fld id="{7B6B133C-1B48-49B0-B1D9-A5E80FEB8493}" type="slidenum">
+              <a:rPr lang="en-US" smtClean="0"/>
               <a:pPr/>
               <a:t>24</a:t>
             </a:fld>
-            <a:endParaRPr lang="en-US"/>
+            <a:endParaRPr lang="en-US" smtClean="0"/>
           </a:p>
         </p:txBody>
       </p:sp>
@@ -2384,7 +2384,7 @@
       </p:grpSpPr>
       <p:sp>
         <p:nvSpPr>
-          <p:cNvPr id="66561" name="Slide Image Placeholder 1"/>
+          <p:cNvPr id="63489" name="Slide Image Placeholder 1"/>
           <p:cNvSpPr>
             <a:spLocks noGrp="1" noRot="1" noChangeAspect="1"/>
           </p:cNvSpPr>
@@ -2406,7 +2406,7 @@
       </p:sp>
       <p:sp>
         <p:nvSpPr>
-          <p:cNvPr id="66562" name="Notes Placeholder 2"/>
+          <p:cNvPr id="63490" name="Notes Placeholder 2"/>
           <p:cNvSpPr>
             <a:spLocks noGrp="1"/>
           </p:cNvSpPr>
@@ -2425,7 +2425,7 @@
           </a:bodyPr>
           <a:lstStyle/>
           <a:p>
-            <a:pPr>
+            <a:pPr eaLnBrk="1" hangingPunct="1">
               <a:spcBef>
                 <a:spcPct val="0"/>
               </a:spcBef>
@@ -2436,7 +2436,7 @@
       </p:sp>
       <p:sp>
         <p:nvSpPr>
-          <p:cNvPr id="66563" name="Slide Number Placeholder 3"/>
+          <p:cNvPr id="63491" name="Slide Number Placeholder 3"/>
           <p:cNvSpPr>
             <a:spLocks noGrp="1"/>
           </p:cNvSpPr>
@@ -2460,12 +2460,12 @@
           </a:bodyPr>
           <a:lstStyle/>
           <a:p>
-            <a:fld id="{7C06D2A0-1C3E-40B2-8F5F-7EEFCE3C7528}" type="slidenum">
-              <a:rPr lang="en-US"/>
+            <a:fld id="{8596FC4D-5024-4974-9E43-2B479C72D943}" type="slidenum">
+              <a:rPr lang="en-US" smtClean="0"/>
               <a:pPr/>
               <a:t>25</a:t>
             </a:fld>
-            <a:endParaRPr lang="en-US"/>
+            <a:endParaRPr lang="en-US" smtClean="0"/>
           </a:p>
         </p:txBody>
       </p:sp>
@@ -2496,7 +2496,7 @@
       </p:grpSpPr>
       <p:sp>
         <p:nvSpPr>
-          <p:cNvPr id="68609" name="Slide Image Placeholder 1"/>
+          <p:cNvPr id="65537" name="Slide Image Placeholder 1"/>
           <p:cNvSpPr>
             <a:spLocks noGrp="1" noRot="1" noChangeAspect="1"/>
           </p:cNvSpPr>
@@ -2518,7 +2518,7 @@
       </p:sp>
       <p:sp>
         <p:nvSpPr>
-          <p:cNvPr id="68610" name="Notes Placeholder 2"/>
+          <p:cNvPr id="65538" name="Notes Placeholder 2"/>
           <p:cNvSpPr>
             <a:spLocks noGrp="1"/>
           </p:cNvSpPr>
@@ -2537,7 +2537,7 @@
           </a:bodyPr>
           <a:lstStyle/>
           <a:p>
-            <a:pPr>
+            <a:pPr eaLnBrk="1" hangingPunct="1">
               <a:spcBef>
                 <a:spcPct val="0"/>
               </a:spcBef>
@@ -2548,7 +2548,7 @@
       </p:sp>
       <p:sp>
         <p:nvSpPr>
-          <p:cNvPr id="68611" name="Slide Number Placeholder 3"/>
+          <p:cNvPr id="65539" name="Slide Number Placeholder 3"/>
           <p:cNvSpPr>
             <a:spLocks noGrp="1"/>
           </p:cNvSpPr>
@@ -2572,12 +2572,12 @@
           </a:bodyPr>
           <a:lstStyle/>
           <a:p>
-            <a:fld id="{D2232F51-A19F-4DD6-A876-2FE44A0CA9F9}" type="slidenum">
-              <a:rPr lang="en-US"/>
+            <a:fld id="{F1283602-E634-42B8-A76F-734594FBFEC6}" type="slidenum">
+              <a:rPr lang="en-US" smtClean="0"/>
               <a:pPr/>
               <a:t>26</a:t>
             </a:fld>
-            <a:endParaRPr lang="en-US"/>
+            <a:endParaRPr lang="en-US" smtClean="0"/>
           </a:p>
         </p:txBody>
       </p:sp>
@@ -2608,7 +2608,7 @@
       </p:grpSpPr>
       <p:sp>
         <p:nvSpPr>
-          <p:cNvPr id="70657" name="Slide Image Placeholder 1"/>
+          <p:cNvPr id="67585" name="Slide Image Placeholder 1"/>
           <p:cNvSpPr>
             <a:spLocks noGrp="1" noRot="1" noChangeAspect="1"/>
           </p:cNvSpPr>
@@ -2630,7 +2630,7 @@
       </p:sp>
       <p:sp>
         <p:nvSpPr>
-          <p:cNvPr id="70658" name="Notes Placeholder 2"/>
+          <p:cNvPr id="67586" name="Notes Placeholder 2"/>
           <p:cNvSpPr>
             <a:spLocks noGrp="1"/>
           </p:cNvSpPr>
@@ -2649,7 +2649,7 @@
           </a:bodyPr>
           <a:lstStyle/>
           <a:p>
-            <a:pPr>
+            <a:pPr eaLnBrk="1" hangingPunct="1">
               <a:spcBef>
                 <a:spcPct val="0"/>
               </a:spcBef>
@@ -2660,7 +2660,7 @@
       </p:sp>
       <p:sp>
         <p:nvSpPr>
-          <p:cNvPr id="70659" name="Slide Number Placeholder 3"/>
+          <p:cNvPr id="67587" name="Slide Number Placeholder 3"/>
           <p:cNvSpPr>
             <a:spLocks noGrp="1"/>
           </p:cNvSpPr>
@@ -2684,12 +2684,12 @@
           </a:bodyPr>
           <a:lstStyle/>
           <a:p>
-            <a:fld id="{C2D168FE-B614-4316-B7CF-107EF125B0ED}" type="slidenum">
-              <a:rPr lang="en-US"/>
+            <a:fld id="{37DA28E2-3521-4C48-B5FF-D884D94EA016}" type="slidenum">
+              <a:rPr lang="en-US" smtClean="0"/>
               <a:pPr/>
               <a:t>27</a:t>
             </a:fld>
-            <a:endParaRPr lang="en-US"/>
+            <a:endParaRPr lang="en-US" smtClean="0"/>
           </a:p>
         </p:txBody>
       </p:sp>
@@ -2720,7 +2720,7 @@
       </p:grpSpPr>
       <p:sp>
         <p:nvSpPr>
-          <p:cNvPr id="72705" name="Slide Image Placeholder 1"/>
+          <p:cNvPr id="69633" name="Slide Image Placeholder 1"/>
           <p:cNvSpPr>
             <a:spLocks noGrp="1" noRot="1" noChangeAspect="1"/>
           </p:cNvSpPr>
@@ -2742,7 +2742,7 @@
       </p:sp>
       <p:sp>
         <p:nvSpPr>
-          <p:cNvPr id="72706" name="Notes Placeholder 2"/>
+          <p:cNvPr id="69634" name="Notes Placeholder 2"/>
           <p:cNvSpPr>
             <a:spLocks noGrp="1"/>
           </p:cNvSpPr>
@@ -2761,7 +2761,7 @@
           </a:bodyPr>
           <a:lstStyle/>
           <a:p>
-            <a:pPr>
+            <a:pPr eaLnBrk="1" hangingPunct="1">
               <a:spcBef>
                 <a:spcPct val="0"/>
               </a:spcBef>
@@ -2772,7 +2772,7 @@
       </p:sp>
       <p:sp>
         <p:nvSpPr>
-          <p:cNvPr id="72707" name="Slide Number Placeholder 3"/>
+          <p:cNvPr id="69635" name="Slide Number Placeholder 3"/>
           <p:cNvSpPr>
             <a:spLocks noGrp="1"/>
           </p:cNvSpPr>
@@ -2796,12 +2796,12 @@
           </a:bodyPr>
           <a:lstStyle/>
           <a:p>
-            <a:fld id="{958F12C3-447E-46CF-B114-13B8E9B40A97}" type="slidenum">
-              <a:rPr lang="en-US"/>
+            <a:fld id="{D6DF2F05-9B9D-47E5-952E-54162ACD675F}" type="slidenum">
+              <a:rPr lang="en-US" smtClean="0"/>
               <a:pPr/>
               <a:t>28</a:t>
             </a:fld>
-            <a:endParaRPr lang="en-US"/>
+            <a:endParaRPr lang="en-US" smtClean="0"/>
           </a:p>
         </p:txBody>
       </p:sp>
@@ -2832,7 +2832,7 @@
       </p:grpSpPr>
       <p:sp>
         <p:nvSpPr>
-          <p:cNvPr id="74753" name="Slide Image Placeholder 1"/>
+          <p:cNvPr id="71681" name="Slide Image Placeholder 1"/>
           <p:cNvSpPr>
             <a:spLocks noGrp="1" noRot="1" noChangeAspect="1"/>
           </p:cNvSpPr>
@@ -2854,7 +2854,7 @@
       </p:sp>
       <p:sp>
         <p:nvSpPr>
-          <p:cNvPr id="74754" name="Notes Placeholder 2"/>
+          <p:cNvPr id="71682" name="Notes Placeholder 2"/>
           <p:cNvSpPr>
             <a:spLocks noGrp="1"/>
           </p:cNvSpPr>
@@ -2873,7 +2873,7 @@
           </a:bodyPr>
           <a:lstStyle/>
           <a:p>
-            <a:pPr>
+            <a:pPr eaLnBrk="1" hangingPunct="1">
               <a:spcBef>
                 <a:spcPct val="0"/>
               </a:spcBef>
@@ -2884,7 +2884,7 @@
       </p:sp>
       <p:sp>
         <p:nvSpPr>
-          <p:cNvPr id="74755" name="Slide Number Placeholder 3"/>
+          <p:cNvPr id="71683" name="Slide Number Placeholder 3"/>
           <p:cNvSpPr>
             <a:spLocks noGrp="1"/>
           </p:cNvSpPr>
@@ -2908,12 +2908,12 @@
           </a:bodyPr>
           <a:lstStyle/>
           <a:p>
-            <a:fld id="{15987786-5056-4B71-BBC6-2D830BBC3012}" type="slidenum">
-              <a:rPr lang="en-US"/>
+            <a:fld id="{BDC3A53A-FE6B-47D2-B7C4-6DAA33CE3DBC}" type="slidenum">
+              <a:rPr lang="en-US" smtClean="0"/>
               <a:pPr/>
               <a:t>29</a:t>
             </a:fld>
-            <a:endParaRPr lang="en-US"/>
+            <a:endParaRPr lang="en-US" smtClean="0"/>
           </a:p>
         </p:txBody>
       </p:sp>
@@ -2944,7 +2944,7 @@
       </p:grpSpPr>
       <p:sp>
         <p:nvSpPr>
-          <p:cNvPr id="76801" name="Slide Image Placeholder 1"/>
+          <p:cNvPr id="73729" name="Slide Image Placeholder 1"/>
           <p:cNvSpPr>
             <a:spLocks noGrp="1" noRot="1" noChangeAspect="1"/>
           </p:cNvSpPr>
@@ -2966,7 +2966,7 @@
       </p:sp>
       <p:sp>
         <p:nvSpPr>
-          <p:cNvPr id="76802" name="Notes Placeholder 2"/>
+          <p:cNvPr id="73730" name="Notes Placeholder 2"/>
           <p:cNvSpPr>
             <a:spLocks noGrp="1"/>
           </p:cNvSpPr>
@@ -2985,7 +2985,7 @@
           </a:bodyPr>
           <a:lstStyle/>
           <a:p>
-            <a:pPr>
+            <a:pPr eaLnBrk="1" hangingPunct="1">
               <a:spcBef>
                 <a:spcPct val="0"/>
               </a:spcBef>
@@ -2996,7 +2996,7 @@
       </p:sp>
       <p:sp>
         <p:nvSpPr>
-          <p:cNvPr id="76803" name="Slide Number Placeholder 3"/>
+          <p:cNvPr id="73731" name="Slide Number Placeholder 3"/>
           <p:cNvSpPr>
             <a:spLocks noGrp="1"/>
           </p:cNvSpPr>
@@ -3020,12 +3020,12 @@
           </a:bodyPr>
           <a:lstStyle/>
           <a:p>
-            <a:fld id="{552484C7-DB2D-482F-B27B-1518BB73D450}" type="slidenum">
-              <a:rPr lang="en-US"/>
+            <a:fld id="{50015CFA-1F33-493D-9D53-9EF1F5E24A54}" type="slidenum">
+              <a:rPr lang="en-US" smtClean="0"/>
               <a:pPr/>
               <a:t>30</a:t>
             </a:fld>
-            <a:endParaRPr lang="en-US"/>
+            <a:endParaRPr lang="en-US" smtClean="0"/>
           </a:p>
         </p:txBody>
       </p:sp>
@@ -3056,7 +3056,7 @@
       </p:grpSpPr>
       <p:sp>
         <p:nvSpPr>
-          <p:cNvPr id="23553" name="Slide Image Placeholder 1"/>
+          <p:cNvPr id="20481" name="Slide Image Placeholder 1"/>
           <p:cNvSpPr>
             <a:spLocks noGrp="1" noRot="1" noChangeAspect="1"/>
           </p:cNvSpPr>
@@ -3078,7 +3078,7 @@
       </p:sp>
       <p:sp>
         <p:nvSpPr>
-          <p:cNvPr id="23554" name="Notes Placeholder 2"/>
+          <p:cNvPr id="20482" name="Notes Placeholder 2"/>
           <p:cNvSpPr>
             <a:spLocks noGrp="1"/>
           </p:cNvSpPr>
@@ -3097,7 +3097,7 @@
           </a:bodyPr>
           <a:lstStyle/>
           <a:p>
-            <a:pPr>
+            <a:pPr eaLnBrk="1" hangingPunct="1">
               <a:spcBef>
                 <a:spcPct val="0"/>
               </a:spcBef>
@@ -3108,7 +3108,7 @@
       </p:sp>
       <p:sp>
         <p:nvSpPr>
-          <p:cNvPr id="23555" name="Slide Number Placeholder 3"/>
+          <p:cNvPr id="20483" name="Slide Number Placeholder 3"/>
           <p:cNvSpPr>
             <a:spLocks noGrp="1"/>
           </p:cNvSpPr>
@@ -3132,12 +3132,12 @@
           </a:bodyPr>
           <a:lstStyle/>
           <a:p>
-            <a:fld id="{84C5E3DB-328E-445B-A738-00B7AC7F41D6}" type="slidenum">
-              <a:rPr lang="en-US"/>
+            <a:fld id="{0F604DFF-55B3-4F6F-BA29-690FC7B6410E}" type="slidenum">
+              <a:rPr lang="en-US" smtClean="0"/>
               <a:pPr/>
               <a:t>4</a:t>
             </a:fld>
-            <a:endParaRPr lang="en-US"/>
+            <a:endParaRPr lang="en-US" smtClean="0"/>
           </a:p>
         </p:txBody>
       </p:sp>
@@ -3168,7 +3168,7 @@
       </p:grpSpPr>
       <p:sp>
         <p:nvSpPr>
-          <p:cNvPr id="78849" name="Slide Image Placeholder 1"/>
+          <p:cNvPr id="75777" name="Slide Image Placeholder 1"/>
           <p:cNvSpPr>
             <a:spLocks noGrp="1" noRot="1" noChangeAspect="1"/>
           </p:cNvSpPr>
@@ -3190,7 +3190,7 @@
       </p:sp>
       <p:sp>
         <p:nvSpPr>
-          <p:cNvPr id="78850" name="Notes Placeholder 2"/>
+          <p:cNvPr id="75778" name="Notes Placeholder 2"/>
           <p:cNvSpPr>
             <a:spLocks noGrp="1"/>
           </p:cNvSpPr>
@@ -3209,7 +3209,7 @@
           </a:bodyPr>
           <a:lstStyle/>
           <a:p>
-            <a:pPr>
+            <a:pPr eaLnBrk="1" hangingPunct="1">
               <a:spcBef>
                 <a:spcPct val="0"/>
               </a:spcBef>
@@ -3220,7 +3220,7 @@
       </p:sp>
       <p:sp>
         <p:nvSpPr>
-          <p:cNvPr id="78851" name="Slide Number Placeholder 3"/>
+          <p:cNvPr id="75779" name="Slide Number Placeholder 3"/>
           <p:cNvSpPr>
             <a:spLocks noGrp="1"/>
           </p:cNvSpPr>
@@ -3244,12 +3244,12 @@
           </a:bodyPr>
           <a:lstStyle/>
           <a:p>
-            <a:fld id="{9E79D29B-D742-49CD-8488-72AA2B78581B}" type="slidenum">
-              <a:rPr lang="en-US"/>
+            <a:fld id="{AE7463F1-43DA-4D2C-ADCE-22D91C7DD49B}" type="slidenum">
+              <a:rPr lang="en-US" smtClean="0"/>
               <a:pPr/>
               <a:t>31</a:t>
             </a:fld>
-            <a:endParaRPr lang="en-US"/>
+            <a:endParaRPr lang="en-US" smtClean="0"/>
           </a:p>
         </p:txBody>
       </p:sp>
@@ -3280,7 +3280,7 @@
       </p:grpSpPr>
       <p:sp>
         <p:nvSpPr>
-          <p:cNvPr id="80897" name="Slide Image Placeholder 1"/>
+          <p:cNvPr id="77825" name="Slide Image Placeholder 1"/>
           <p:cNvSpPr>
             <a:spLocks noGrp="1" noRot="1" noChangeAspect="1"/>
           </p:cNvSpPr>
@@ -3302,7 +3302,7 @@
       </p:sp>
       <p:sp>
         <p:nvSpPr>
-          <p:cNvPr id="80898" name="Notes Placeholder 2"/>
+          <p:cNvPr id="77826" name="Notes Placeholder 2"/>
           <p:cNvSpPr>
             <a:spLocks noGrp="1"/>
           </p:cNvSpPr>
@@ -3321,7 +3321,7 @@
           </a:bodyPr>
           <a:lstStyle/>
           <a:p>
-            <a:pPr>
+            <a:pPr eaLnBrk="1" hangingPunct="1">
               <a:spcBef>
                 <a:spcPct val="0"/>
               </a:spcBef>
@@ -3332,7 +3332,7 @@
       </p:sp>
       <p:sp>
         <p:nvSpPr>
-          <p:cNvPr id="80899" name="Slide Number Placeholder 3"/>
+          <p:cNvPr id="77827" name="Slide Number Placeholder 3"/>
           <p:cNvSpPr>
             <a:spLocks noGrp="1"/>
           </p:cNvSpPr>
@@ -3356,12 +3356,12 @@
           </a:bodyPr>
           <a:lstStyle/>
           <a:p>
-            <a:fld id="{31A0080C-8DDA-484B-AD87-430716646AB0}" type="slidenum">
-              <a:rPr lang="en-US"/>
+            <a:fld id="{11D90BC8-8039-4BD6-9B3D-799D08C0DD5A}" type="slidenum">
+              <a:rPr lang="en-US" smtClean="0"/>
               <a:pPr/>
               <a:t>32</a:t>
             </a:fld>
-            <a:endParaRPr lang="en-US"/>
+            <a:endParaRPr lang="en-US" smtClean="0"/>
           </a:p>
         </p:txBody>
       </p:sp>
@@ -3392,7 +3392,7 @@
       </p:grpSpPr>
       <p:sp>
         <p:nvSpPr>
-          <p:cNvPr id="82945" name="Slide Image Placeholder 1"/>
+          <p:cNvPr id="79873" name="Slide Image Placeholder 1"/>
           <p:cNvSpPr>
             <a:spLocks noGrp="1" noRot="1" noChangeAspect="1"/>
           </p:cNvSpPr>
@@ -3414,7 +3414,7 @@
       </p:sp>
       <p:sp>
         <p:nvSpPr>
-          <p:cNvPr id="82946" name="Notes Placeholder 2"/>
+          <p:cNvPr id="79874" name="Notes Placeholder 2"/>
           <p:cNvSpPr>
             <a:spLocks noGrp="1"/>
           </p:cNvSpPr>
@@ -3433,7 +3433,7 @@
           </a:bodyPr>
           <a:lstStyle/>
           <a:p>
-            <a:pPr>
+            <a:pPr eaLnBrk="1" hangingPunct="1">
               <a:spcBef>
                 <a:spcPct val="0"/>
               </a:spcBef>
@@ -3444,7 +3444,7 @@
       </p:sp>
       <p:sp>
         <p:nvSpPr>
-          <p:cNvPr id="82947" name="Slide Number Placeholder 3"/>
+          <p:cNvPr id="79875" name="Slide Number Placeholder 3"/>
           <p:cNvSpPr>
             <a:spLocks noGrp="1"/>
           </p:cNvSpPr>
@@ -3468,12 +3468,12 @@
           </a:bodyPr>
           <a:lstStyle/>
           <a:p>
-            <a:fld id="{E0053A7B-E17B-4570-93AF-DFB9814D2D07}" type="slidenum">
-              <a:rPr lang="en-US"/>
+            <a:fld id="{F7B2F89E-8A5A-457F-9A01-065D871F17C0}" type="slidenum">
+              <a:rPr lang="en-US" smtClean="0"/>
               <a:pPr/>
               <a:t>33</a:t>
             </a:fld>
-            <a:endParaRPr lang="en-US"/>
+            <a:endParaRPr lang="en-US" smtClean="0"/>
           </a:p>
         </p:txBody>
       </p:sp>
@@ -3504,7 +3504,7 @@
       </p:grpSpPr>
       <p:sp>
         <p:nvSpPr>
-          <p:cNvPr id="84993" name="Slide Image Placeholder 1"/>
+          <p:cNvPr id="81921" name="Slide Image Placeholder 1"/>
           <p:cNvSpPr>
             <a:spLocks noGrp="1" noRot="1" noChangeAspect="1"/>
           </p:cNvSpPr>
@@ -3526,7 +3526,7 @@
       </p:sp>
       <p:sp>
         <p:nvSpPr>
-          <p:cNvPr id="84994" name="Notes Placeholder 2"/>
+          <p:cNvPr id="81922" name="Notes Placeholder 2"/>
           <p:cNvSpPr>
             <a:spLocks noGrp="1"/>
           </p:cNvSpPr>
@@ -3545,7 +3545,7 @@
           </a:bodyPr>
           <a:lstStyle/>
           <a:p>
-            <a:pPr>
+            <a:pPr eaLnBrk="1" hangingPunct="1">
               <a:spcBef>
                 <a:spcPct val="0"/>
               </a:spcBef>
@@ -3556,7 +3556,7 @@
       </p:sp>
       <p:sp>
         <p:nvSpPr>
-          <p:cNvPr id="84995" name="Slide Number Placeholder 3"/>
+          <p:cNvPr id="81923" name="Slide Number Placeholder 3"/>
           <p:cNvSpPr>
             <a:spLocks noGrp="1"/>
           </p:cNvSpPr>
@@ -3580,12 +3580,12 @@
           </a:bodyPr>
           <a:lstStyle/>
           <a:p>
-            <a:fld id="{3A9C7CFE-E211-42F0-8BA2-0B1461CC5F38}" type="slidenum">
-              <a:rPr lang="en-US"/>
+            <a:fld id="{4934653E-AFA1-4E1B-BAE1-9E619F872371}" type="slidenum">
+              <a:rPr lang="en-US" smtClean="0"/>
               <a:pPr/>
               <a:t>34</a:t>
             </a:fld>
-            <a:endParaRPr lang="en-US"/>
+            <a:endParaRPr lang="en-US" smtClean="0"/>
           </a:p>
         </p:txBody>
       </p:sp>
@@ -3616,7 +3616,7 @@
       </p:grpSpPr>
       <p:sp>
         <p:nvSpPr>
-          <p:cNvPr id="87041" name="Slide Image Placeholder 1"/>
+          <p:cNvPr id="83969" name="Slide Image Placeholder 1"/>
           <p:cNvSpPr>
             <a:spLocks noGrp="1" noRot="1" noChangeAspect="1"/>
           </p:cNvSpPr>
@@ -3638,7 +3638,7 @@
       </p:sp>
       <p:sp>
         <p:nvSpPr>
-          <p:cNvPr id="87042" name="Notes Placeholder 2"/>
+          <p:cNvPr id="83970" name="Notes Placeholder 2"/>
           <p:cNvSpPr>
             <a:spLocks noGrp="1"/>
           </p:cNvSpPr>
@@ -3657,7 +3657,7 @@
           </a:bodyPr>
           <a:lstStyle/>
           <a:p>
-            <a:pPr>
+            <a:pPr eaLnBrk="1" hangingPunct="1">
               <a:spcBef>
                 <a:spcPct val="0"/>
               </a:spcBef>
@@ -3668,7 +3668,7 @@
       </p:sp>
       <p:sp>
         <p:nvSpPr>
-          <p:cNvPr id="87043" name="Slide Number Placeholder 3"/>
+          <p:cNvPr id="83971" name="Slide Number Placeholder 3"/>
           <p:cNvSpPr>
             <a:spLocks noGrp="1"/>
           </p:cNvSpPr>
@@ -3692,12 +3692,12 @@
           </a:bodyPr>
           <a:lstStyle/>
           <a:p>
-            <a:fld id="{74BCC2F0-EAB4-4906-9924-29CE0C0FE4CB}" type="slidenum">
-              <a:rPr lang="en-US"/>
+            <a:fld id="{94E13460-4169-4F6E-AD59-63D099BE7EF0}" type="slidenum">
+              <a:rPr lang="en-US" smtClean="0"/>
               <a:pPr/>
               <a:t>35</a:t>
             </a:fld>
-            <a:endParaRPr lang="en-US"/>
+            <a:endParaRPr lang="en-US" smtClean="0"/>
           </a:p>
         </p:txBody>
       </p:sp>
@@ -3728,7 +3728,7 @@
       </p:grpSpPr>
       <p:sp>
         <p:nvSpPr>
-          <p:cNvPr id="89089" name="Slide Image Placeholder 1"/>
+          <p:cNvPr id="86017" name="Slide Image Placeholder 1"/>
           <p:cNvSpPr>
             <a:spLocks noGrp="1" noRot="1" noChangeAspect="1"/>
           </p:cNvSpPr>
@@ -3750,7 +3750,7 @@
       </p:sp>
       <p:sp>
         <p:nvSpPr>
-          <p:cNvPr id="89090" name="Notes Placeholder 2"/>
+          <p:cNvPr id="86018" name="Notes Placeholder 2"/>
           <p:cNvSpPr>
             <a:spLocks noGrp="1"/>
           </p:cNvSpPr>
@@ -3769,7 +3769,7 @@
           </a:bodyPr>
           <a:lstStyle/>
           <a:p>
-            <a:pPr>
+            <a:pPr eaLnBrk="1" hangingPunct="1">
               <a:spcBef>
                 <a:spcPct val="0"/>
               </a:spcBef>
@@ -3780,7 +3780,7 @@
       </p:sp>
       <p:sp>
         <p:nvSpPr>
-          <p:cNvPr id="89091" name="Slide Number Placeholder 3"/>
+          <p:cNvPr id="86019" name="Slide Number Placeholder 3"/>
           <p:cNvSpPr>
             <a:spLocks noGrp="1"/>
           </p:cNvSpPr>
@@ -3804,12 +3804,12 @@
           </a:bodyPr>
           <a:lstStyle/>
           <a:p>
-            <a:fld id="{9DC3C8FF-C641-4D5E-9703-B937775ADBA1}" type="slidenum">
-              <a:rPr lang="en-US"/>
+            <a:fld id="{757439CA-B138-4216-AAAD-66D3F5796A9C}" type="slidenum">
+              <a:rPr lang="en-US" smtClean="0"/>
               <a:pPr/>
               <a:t>36</a:t>
             </a:fld>
-            <a:endParaRPr lang="en-US"/>
+            <a:endParaRPr lang="en-US" smtClean="0"/>
           </a:p>
         </p:txBody>
       </p:sp>
@@ -3840,7 +3840,7 @@
       </p:grpSpPr>
       <p:sp>
         <p:nvSpPr>
-          <p:cNvPr id="91137" name="Slide Image Placeholder 1"/>
+          <p:cNvPr id="88065" name="Slide Image Placeholder 1"/>
           <p:cNvSpPr>
             <a:spLocks noGrp="1" noRot="1" noChangeAspect="1"/>
           </p:cNvSpPr>
@@ -3862,7 +3862,7 @@
       </p:sp>
       <p:sp>
         <p:nvSpPr>
-          <p:cNvPr id="91138" name="Notes Placeholder 2"/>
+          <p:cNvPr id="88066" name="Notes Placeholder 2"/>
           <p:cNvSpPr>
             <a:spLocks noGrp="1"/>
           </p:cNvSpPr>
@@ -3881,7 +3881,7 @@
           </a:bodyPr>
           <a:lstStyle/>
           <a:p>
-            <a:pPr>
+            <a:pPr eaLnBrk="1" hangingPunct="1">
               <a:spcBef>
                 <a:spcPct val="0"/>
               </a:spcBef>
@@ -3892,7 +3892,7 @@
       </p:sp>
       <p:sp>
         <p:nvSpPr>
-          <p:cNvPr id="91139" name="Slide Number Placeholder 3"/>
+          <p:cNvPr id="88067" name="Slide Number Placeholder 3"/>
           <p:cNvSpPr>
             <a:spLocks noGrp="1"/>
           </p:cNvSpPr>
@@ -3916,12 +3916,12 @@
           </a:bodyPr>
           <a:lstStyle/>
           <a:p>
-            <a:fld id="{285DE901-3360-4316-BB68-4A7418F40BFB}" type="slidenum">
-              <a:rPr lang="en-US"/>
+            <a:fld id="{04E8C2E7-B94E-4671-84CA-96D2E295E7AB}" type="slidenum">
+              <a:rPr lang="en-US" smtClean="0"/>
               <a:pPr/>
               <a:t>37</a:t>
             </a:fld>
-            <a:endParaRPr lang="en-US"/>
+            <a:endParaRPr lang="en-US" smtClean="0"/>
           </a:p>
         </p:txBody>
       </p:sp>
@@ -3952,7 +3952,7 @@
       </p:grpSpPr>
       <p:sp>
         <p:nvSpPr>
-          <p:cNvPr id="93185" name="Slide Image Placeholder 1"/>
+          <p:cNvPr id="90113" name="Slide Image Placeholder 1"/>
           <p:cNvSpPr>
             <a:spLocks noGrp="1" noRot="1" noChangeAspect="1"/>
           </p:cNvSpPr>
@@ -3974,7 +3974,7 @@
       </p:sp>
       <p:sp>
         <p:nvSpPr>
-          <p:cNvPr id="93186" name="Notes Placeholder 2"/>
+          <p:cNvPr id="90114" name="Notes Placeholder 2"/>
           <p:cNvSpPr>
             <a:spLocks noGrp="1"/>
           </p:cNvSpPr>
@@ -3993,7 +3993,7 @@
           </a:bodyPr>
           <a:lstStyle/>
           <a:p>
-            <a:pPr>
+            <a:pPr eaLnBrk="1" hangingPunct="1">
               <a:spcBef>
                 <a:spcPct val="0"/>
               </a:spcBef>
@@ -4004,7 +4004,7 @@
       </p:sp>
       <p:sp>
         <p:nvSpPr>
-          <p:cNvPr id="93187" name="Slide Number Placeholder 3"/>
+          <p:cNvPr id="90115" name="Slide Number Placeholder 3"/>
           <p:cNvSpPr>
             <a:spLocks noGrp="1"/>
           </p:cNvSpPr>
@@ -4028,12 +4028,12 @@
           </a:bodyPr>
           <a:lstStyle/>
           <a:p>
-            <a:fld id="{1C5011BC-8A34-446F-8B5E-DAFDA5AEC13E}" type="slidenum">
-              <a:rPr lang="en-US"/>
+            <a:fld id="{B2B56489-0340-41EA-8852-6908F1F32549}" type="slidenum">
+              <a:rPr lang="en-US" smtClean="0"/>
               <a:pPr/>
               <a:t>38</a:t>
             </a:fld>
-            <a:endParaRPr lang="en-US"/>
+            <a:endParaRPr lang="en-US" smtClean="0"/>
           </a:p>
         </p:txBody>
       </p:sp>
@@ -4064,7 +4064,7 @@
       </p:grpSpPr>
       <p:sp>
         <p:nvSpPr>
-          <p:cNvPr id="25601" name="Slide Image Placeholder 1"/>
+          <p:cNvPr id="22529" name="Slide Image Placeholder 1"/>
           <p:cNvSpPr>
             <a:spLocks noGrp="1" noRot="1" noChangeAspect="1"/>
           </p:cNvSpPr>
@@ -4086,7 +4086,7 @@
       </p:sp>
       <p:sp>
         <p:nvSpPr>
-          <p:cNvPr id="25602" name="Notes Placeholder 2"/>
+          <p:cNvPr id="22530" name="Notes Placeholder 2"/>
           <p:cNvSpPr>
             <a:spLocks noGrp="1"/>
           </p:cNvSpPr>
@@ -4105,7 +4105,7 @@
           </a:bodyPr>
           <a:lstStyle/>
           <a:p>
-            <a:pPr>
+            <a:pPr eaLnBrk="1" hangingPunct="1">
               <a:spcBef>
                 <a:spcPct val="0"/>
               </a:spcBef>
@@ -4116,7 +4116,7 @@
       </p:sp>
       <p:sp>
         <p:nvSpPr>
-          <p:cNvPr id="25603" name="Slide Number Placeholder 3"/>
+          <p:cNvPr id="22531" name="Slide Number Placeholder 3"/>
           <p:cNvSpPr>
             <a:spLocks noGrp="1"/>
           </p:cNvSpPr>
@@ -4140,12 +4140,12 @@
           </a:bodyPr>
           <a:lstStyle/>
           <a:p>
-            <a:fld id="{36F3D4DC-F84E-4C84-B3E7-10D32B2BB308}" type="slidenum">
-              <a:rPr lang="en-US"/>
+            <a:fld id="{EF797D32-0000-4825-884A-17BD9BFE3797}" type="slidenum">
+              <a:rPr lang="en-US" smtClean="0"/>
               <a:pPr/>
               <a:t>5</a:t>
             </a:fld>
-            <a:endParaRPr lang="en-US"/>
+            <a:endParaRPr lang="en-US" smtClean="0"/>
           </a:p>
         </p:txBody>
       </p:sp>
@@ -4176,7 +4176,7 @@
       </p:grpSpPr>
       <p:sp>
         <p:nvSpPr>
-          <p:cNvPr id="27649" name="Slide Image Placeholder 1"/>
+          <p:cNvPr id="24577" name="Slide Image Placeholder 1"/>
           <p:cNvSpPr>
             <a:spLocks noGrp="1" noRot="1" noChangeAspect="1"/>
           </p:cNvSpPr>
@@ -4198,7 +4198,7 @@
       </p:sp>
       <p:sp>
         <p:nvSpPr>
-          <p:cNvPr id="27650" name="Notes Placeholder 2"/>
+          <p:cNvPr id="24578" name="Notes Placeholder 2"/>
           <p:cNvSpPr>
             <a:spLocks noGrp="1"/>
           </p:cNvSpPr>
@@ -4217,7 +4217,7 @@
           </a:bodyPr>
           <a:lstStyle/>
           <a:p>
-            <a:pPr>
+            <a:pPr eaLnBrk="1" hangingPunct="1">
               <a:spcBef>
                 <a:spcPct val="0"/>
               </a:spcBef>
@@ -4228,7 +4228,7 @@
       </p:sp>
       <p:sp>
         <p:nvSpPr>
-          <p:cNvPr id="27651" name="Slide Number Placeholder 3"/>
+          <p:cNvPr id="24579" name="Slide Number Placeholder 3"/>
           <p:cNvSpPr>
             <a:spLocks noGrp="1"/>
           </p:cNvSpPr>
@@ -4252,12 +4252,12 @@
           </a:bodyPr>
           <a:lstStyle/>
           <a:p>
-            <a:fld id="{DB6E5446-9C8B-4943-AD7D-4AF9EAB4B282}" type="slidenum">
-              <a:rPr lang="en-US"/>
+            <a:fld id="{E2E25A15-C819-439E-A0D6-BA655D36D0A2}" type="slidenum">
+              <a:rPr lang="en-US" smtClean="0"/>
               <a:pPr/>
               <a:t>6</a:t>
             </a:fld>
-            <a:endParaRPr lang="en-US"/>
+            <a:endParaRPr lang="en-US" smtClean="0"/>
           </a:p>
         </p:txBody>
       </p:sp>
@@ -4288,7 +4288,7 @@
       </p:grpSpPr>
       <p:sp>
         <p:nvSpPr>
-          <p:cNvPr id="29697" name="Slide Image Placeholder 1"/>
+          <p:cNvPr id="26625" name="Slide Image Placeholder 1"/>
           <p:cNvSpPr>
             <a:spLocks noGrp="1" noRot="1" noChangeAspect="1"/>
           </p:cNvSpPr>
@@ -4310,7 +4310,7 @@
       </p:sp>
       <p:sp>
         <p:nvSpPr>
-          <p:cNvPr id="29698" name="Notes Placeholder 2"/>
+          <p:cNvPr id="26626" name="Notes Placeholder 2"/>
           <p:cNvSpPr>
             <a:spLocks noGrp="1"/>
           </p:cNvSpPr>
@@ -4329,7 +4329,7 @@
           </a:bodyPr>
           <a:lstStyle/>
           <a:p>
-            <a:pPr>
+            <a:pPr eaLnBrk="1" hangingPunct="1">
               <a:spcBef>
                 <a:spcPct val="0"/>
               </a:spcBef>
@@ -4340,7 +4340,7 @@
       </p:sp>
       <p:sp>
         <p:nvSpPr>
-          <p:cNvPr id="29699" name="Slide Number Placeholder 3"/>
+          <p:cNvPr id="26627" name="Slide Number Placeholder 3"/>
           <p:cNvSpPr>
             <a:spLocks noGrp="1"/>
           </p:cNvSpPr>
@@ -4364,12 +4364,12 @@
           </a:bodyPr>
           <a:lstStyle/>
           <a:p>
-            <a:fld id="{8EBBC9C4-A90E-4280-8DAE-F00338209571}" type="slidenum">
-              <a:rPr lang="en-US"/>
+            <a:fld id="{FF9FA2C1-3F9F-4DAA-9725-F2E1067963BB}" type="slidenum">
+              <a:rPr lang="en-US" smtClean="0"/>
               <a:pPr/>
               <a:t>7</a:t>
             </a:fld>
-            <a:endParaRPr lang="en-US"/>
+            <a:endParaRPr lang="en-US" smtClean="0"/>
           </a:p>
         </p:txBody>
       </p:sp>
@@ -4400,7 +4400,7 @@
       </p:grpSpPr>
       <p:sp>
         <p:nvSpPr>
-          <p:cNvPr id="31745" name="Slide Image Placeholder 1"/>
+          <p:cNvPr id="28673" name="Slide Image Placeholder 1"/>
           <p:cNvSpPr>
             <a:spLocks noGrp="1" noRot="1" noChangeAspect="1"/>
           </p:cNvSpPr>
@@ -4422,7 +4422,7 @@
       </p:sp>
       <p:sp>
         <p:nvSpPr>
-          <p:cNvPr id="31746" name="Notes Placeholder 2"/>
+          <p:cNvPr id="28674" name="Notes Placeholder 2"/>
           <p:cNvSpPr>
             <a:spLocks noGrp="1"/>
           </p:cNvSpPr>
@@ -4441,7 +4441,7 @@
           </a:bodyPr>
           <a:lstStyle/>
           <a:p>
-            <a:pPr>
+            <a:pPr eaLnBrk="1" hangingPunct="1">
               <a:spcBef>
                 <a:spcPct val="0"/>
               </a:spcBef>
@@ -4452,7 +4452,7 @@
       </p:sp>
       <p:sp>
         <p:nvSpPr>
-          <p:cNvPr id="31747" name="Slide Number Placeholder 3"/>
+          <p:cNvPr id="28675" name="Slide Number Placeholder 3"/>
           <p:cNvSpPr>
             <a:spLocks noGrp="1"/>
           </p:cNvSpPr>
@@ -4476,12 +4476,12 @@
           </a:bodyPr>
           <a:lstStyle/>
           <a:p>
-            <a:fld id="{809157B6-6230-4F9E-88CB-4E8A8005FF6C}" type="slidenum">
-              <a:rPr lang="en-US"/>
+            <a:fld id="{24CF0ECD-5EBA-4BD8-921C-06D42ED375EB}" type="slidenum">
+              <a:rPr lang="en-US" smtClean="0"/>
               <a:pPr/>
               <a:t>8</a:t>
             </a:fld>
-            <a:endParaRPr lang="en-US"/>
+            <a:endParaRPr lang="en-US" smtClean="0"/>
           </a:p>
         </p:txBody>
       </p:sp>
@@ -4512,7 +4512,7 @@
       </p:grpSpPr>
       <p:sp>
         <p:nvSpPr>
-          <p:cNvPr id="33793" name="Slide Image Placeholder 1"/>
+          <p:cNvPr id="30721" name="Slide Image Placeholder 1"/>
           <p:cNvSpPr>
             <a:spLocks noGrp="1" noRot="1" noChangeAspect="1"/>
           </p:cNvSpPr>
@@ -4534,7 +4534,7 @@
       </p:sp>
       <p:sp>
         <p:nvSpPr>
-          <p:cNvPr id="33794" name="Notes Placeholder 2"/>
+          <p:cNvPr id="30722" name="Notes Placeholder 2"/>
           <p:cNvSpPr>
             <a:spLocks noGrp="1"/>
           </p:cNvSpPr>
@@ -4553,7 +4553,7 @@
           </a:bodyPr>
           <a:lstStyle/>
           <a:p>
-            <a:pPr>
+            <a:pPr eaLnBrk="1" hangingPunct="1">
               <a:spcBef>
                 <a:spcPct val="0"/>
               </a:spcBef>
@@ -4564,7 +4564,7 @@
       </p:sp>
       <p:sp>
         <p:nvSpPr>
-          <p:cNvPr id="33795" name="Slide Number Placeholder 3"/>
+          <p:cNvPr id="30723" name="Slide Number Placeholder 3"/>
           <p:cNvSpPr>
             <a:spLocks noGrp="1"/>
           </p:cNvSpPr>
@@ -4588,12 +4588,12 @@
           </a:bodyPr>
           <a:lstStyle/>
           <a:p>
-            <a:fld id="{63F2B3DE-0E3B-4C4F-9CEA-08F8641BDCD4}" type="slidenum">
-              <a:rPr lang="en-US"/>
+            <a:fld id="{1656FC4D-D314-4E07-9B68-729E5EEEABF8}" type="slidenum">
+              <a:rPr lang="en-US" smtClean="0"/>
               <a:pPr/>
               <a:t>9</a:t>
             </a:fld>
-            <a:endParaRPr lang="en-US"/>
+            <a:endParaRPr lang="en-US" smtClean="0"/>
           </a:p>
         </p:txBody>
       </p:sp>
@@ -4624,7 +4624,7 @@
       </p:grpSpPr>
       <p:sp>
         <p:nvSpPr>
-          <p:cNvPr id="35841" name="Slide Image Placeholder 1"/>
+          <p:cNvPr id="32769" name="Slide Image Placeholder 1"/>
           <p:cNvSpPr>
             <a:spLocks noGrp="1" noRot="1" noChangeAspect="1"/>
           </p:cNvSpPr>
@@ -4646,7 +4646,7 @@
       </p:sp>
       <p:sp>
         <p:nvSpPr>
-          <p:cNvPr id="35842" name="Notes Placeholder 2"/>
+          <p:cNvPr id="32770" name="Notes Placeholder 2"/>
           <p:cNvSpPr>
             <a:spLocks noGrp="1"/>
           </p:cNvSpPr>
@@ -4665,7 +4665,7 @@
           </a:bodyPr>
           <a:lstStyle/>
           <a:p>
-            <a:pPr>
+            <a:pPr eaLnBrk="1" hangingPunct="1">
               <a:spcBef>
                 <a:spcPct val="0"/>
               </a:spcBef>
@@ -4676,7 +4676,7 @@
       </p:sp>
       <p:sp>
         <p:nvSpPr>
-          <p:cNvPr id="35843" name="Slide Number Placeholder 3"/>
+          <p:cNvPr id="32771" name="Slide Number Placeholder 3"/>
           <p:cNvSpPr>
             <a:spLocks noGrp="1"/>
           </p:cNvSpPr>
@@ -4700,12 +4700,12 @@
           </a:bodyPr>
           <a:lstStyle/>
           <a:p>
-            <a:fld id="{6C34A914-43FA-4076-ABF9-C38346E71B03}" type="slidenum">
-              <a:rPr lang="en-US"/>
+            <a:fld id="{873A8E9D-3B43-45D1-A2D0-ED166BB69183}" type="slidenum">
+              <a:rPr lang="en-US" smtClean="0"/>
               <a:pPr/>
               <a:t>10</a:t>
             </a:fld>
-            <a:endParaRPr lang="en-US"/>
+            <a:endParaRPr lang="en-US" smtClean="0"/>
           </a:p>
         </p:txBody>
       </p:sp>
@@ -7551,7 +7551,7 @@
             <a:pPr>
               <a:defRPr/>
             </a:pPr>
-            <a:fld id="{821D7C33-28DF-478B-95CC-3FBCC99FFEAE}" type="datetimeFigureOut">
+            <a:fld id="{49DB7A07-837F-4446-B316-2D2CFDD332C8}" type="datetimeFigureOut">
               <a:rPr lang="en-US"/>
               <a:pPr>
                 <a:defRPr/>
@@ -7620,7 +7620,7 @@
             <a:pPr>
               <a:defRPr/>
             </a:pPr>
-            <a:fld id="{DFA8561F-ADFB-469C-BA3A-51B6BCDB0753}" type="slidenum">
+            <a:fld id="{D721E0D5-F025-4B92-A0CE-F99BA94D95C0}" type="slidenum">
               <a:rPr lang="en-US"/>
               <a:pPr>
                 <a:defRPr/>
@@ -7753,7 +7753,7 @@
             <a:pPr>
               <a:defRPr/>
             </a:pPr>
-            <a:fld id="{A1B095EA-6007-4F02-A4CF-DA5BE4C14503}" type="datetimeFigureOut">
+            <a:fld id="{75121C4D-4C16-4FA4-9BF4-CBF3651C171B}" type="datetimeFigureOut">
               <a:rPr lang="en-US"/>
               <a:pPr>
                 <a:defRPr/>
@@ -7788,7 +7788,7 @@
             <a:pPr>
               <a:defRPr/>
             </a:pPr>
-            <a:fld id="{68279648-92B5-466A-8087-9EB4F2C27C55}" type="slidenum">
+            <a:fld id="{0503E8DE-8D61-495F-9690-14C4C872D564}" type="slidenum">
               <a:rPr lang="en-US"/>
               <a:pPr>
                 <a:defRPr/>
@@ -7959,7 +7959,7 @@
             <a:pPr>
               <a:defRPr/>
             </a:pPr>
-            <a:fld id="{6B6022DC-C18E-4CF5-9E92-E6CB0957F0F1}" type="datetimeFigureOut">
+            <a:fld id="{6F08C8C9-CF85-4F54-93E3-713D8BC586BE}" type="datetimeFigureOut">
               <a:rPr lang="en-US"/>
               <a:pPr>
                 <a:defRPr/>
@@ -7994,7 +7994,7 @@
             <a:pPr>
               <a:defRPr/>
             </a:pPr>
-            <a:fld id="{C4240BCE-C87A-47EA-BB17-1286A524981A}" type="slidenum">
+            <a:fld id="{A8D81D0B-C21A-4D1E-911C-5344897E00D0}" type="slidenum">
               <a:rPr lang="en-US"/>
               <a:pPr>
                 <a:defRPr/>
@@ -8155,7 +8155,7 @@
             <a:pPr>
               <a:defRPr/>
             </a:pPr>
-            <a:fld id="{2FDB86EF-59D0-4157-9C49-2BBA6301192F}" type="datetimeFigureOut">
+            <a:fld id="{7FBAC90D-836C-481A-A198-AC91A91312D2}" type="datetimeFigureOut">
               <a:rPr lang="en-US"/>
               <a:pPr>
                 <a:defRPr/>
@@ -8190,7 +8190,7 @@
             <a:pPr>
               <a:defRPr/>
             </a:pPr>
-            <a:fld id="{E308B60E-36EF-489D-A9F1-724540132F5A}" type="slidenum">
+            <a:fld id="{B56C7CAC-9730-487E-80EC-3CC4C576B051}" type="slidenum">
               <a:rPr lang="en-US"/>
               <a:pPr>
                 <a:defRPr/>
@@ -8374,7 +8374,7 @@
             <a:pPr>
               <a:defRPr/>
             </a:pPr>
-            <a:fld id="{74082C9C-421F-4098-B914-0114EE5E3934}" type="datetimeFigureOut">
+            <a:fld id="{E9654319-2C23-428D-8D7C-58623ECC57FE}" type="datetimeFigureOut">
               <a:rPr lang="en-US"/>
               <a:pPr>
                 <a:defRPr/>
@@ -8409,7 +8409,7 @@
             <a:pPr>
               <a:defRPr/>
             </a:pPr>
-            <a:fld id="{904BAB79-246C-4E9D-B801-4B695E080278}" type="slidenum">
+            <a:fld id="{CA705FCD-F4B7-4342-8C99-75F2D836746D}" type="slidenum">
               <a:rPr lang="en-US"/>
               <a:pPr>
                 <a:defRPr/>
@@ -8687,7 +8687,7 @@
             <a:pPr>
               <a:defRPr/>
             </a:pPr>
-            <a:fld id="{920A7D15-7AFE-4ED1-9EFB-5606D0DD89F5}" type="datetimeFigureOut">
+            <a:fld id="{F6BF2174-2D32-445E-9CAC-1698292B0C24}" type="datetimeFigureOut">
               <a:rPr lang="en-US"/>
               <a:pPr>
                 <a:defRPr/>
@@ -8722,7 +8722,7 @@
             <a:pPr>
               <a:defRPr/>
             </a:pPr>
-            <a:fld id="{9823978C-BE94-4543-802C-DC30A8D51AC5}" type="slidenum">
+            <a:fld id="{3B9C91C6-4BFE-43F1-81F5-BB0CAD102E2D}" type="slidenum">
               <a:rPr lang="en-US"/>
               <a:pPr>
                 <a:defRPr/>
@@ -9134,7 +9134,7 @@
             <a:pPr>
               <a:defRPr/>
             </a:pPr>
-            <a:fld id="{0AFABF14-0F71-4D0D-BE6E-4A1B2EE230C1}" type="datetimeFigureOut">
+            <a:fld id="{A59858EB-D903-4FEB-B251-902ACCAF225A}" type="datetimeFigureOut">
               <a:rPr lang="en-US"/>
               <a:pPr>
                 <a:defRPr/>
@@ -9169,7 +9169,7 @@
             <a:pPr>
               <a:defRPr/>
             </a:pPr>
-            <a:fld id="{F258762C-70ED-4EE3-959C-1F387E32C772}" type="slidenum">
+            <a:fld id="{0C507C2D-BAB4-41CF-B3E7-3F74F581F98E}" type="slidenum">
               <a:rPr lang="en-US"/>
               <a:pPr>
                 <a:defRPr/>
@@ -9279,7 +9279,7 @@
             <a:pPr>
               <a:defRPr/>
             </a:pPr>
-            <a:fld id="{C292211A-1C1C-4474-ADB3-06B35758A5FA}" type="datetimeFigureOut">
+            <a:fld id="{66DA8912-548D-45E5-906D-4B4A2060A4FB}" type="datetimeFigureOut">
               <a:rPr lang="en-US"/>
               <a:pPr>
                 <a:defRPr/>
@@ -9314,7 +9314,7 @@
             <a:pPr>
               <a:defRPr/>
             </a:pPr>
-            <a:fld id="{2A999403-0B88-4131-AB61-2482724EBA14}" type="slidenum">
+            <a:fld id="{77F957BC-15B0-4813-9ADB-DA3DD83D8B83}" type="slidenum">
               <a:rPr lang="en-US"/>
               <a:pPr>
                 <a:defRPr/>
@@ -9402,7 +9402,7 @@
             <a:pPr>
               <a:defRPr/>
             </a:pPr>
-            <a:fld id="{07786637-27C7-4A2F-96A2-AB8401880349}" type="datetimeFigureOut">
+            <a:fld id="{F2A9F3C8-9051-46DB-AE49-04712D337311}" type="datetimeFigureOut">
               <a:rPr lang="en-US"/>
               <a:pPr>
                 <a:defRPr/>
@@ -9437,7 +9437,7 @@
             <a:pPr>
               <a:defRPr/>
             </a:pPr>
-            <a:fld id="{701517CD-064E-4292-B846-269220939D49}" type="slidenum">
+            <a:fld id="{7A0CC46B-352B-4D4F-A62E-7816BD10E048}" type="slidenum">
               <a:rPr lang="en-US"/>
               <a:pPr>
                 <a:defRPr/>
@@ -9705,7 +9705,7 @@
             <a:pPr>
               <a:defRPr/>
             </a:pPr>
-            <a:fld id="{32C5429D-6A88-480B-B6C5-CCE84F523268}" type="datetimeFigureOut">
+            <a:fld id="{605DEDA4-64B5-4010-BDB9-99D891B64864}" type="datetimeFigureOut">
               <a:rPr lang="en-US"/>
               <a:pPr>
                 <a:defRPr/>
@@ -9740,7 +9740,7 @@
             <a:pPr>
               <a:defRPr/>
             </a:pPr>
-            <a:fld id="{682A6F40-E701-45D1-9D82-77D43BF24EA5}" type="slidenum">
+            <a:fld id="{7925679D-305A-4DFA-AC7C-0122D552EE9A}" type="slidenum">
               <a:rPr lang="en-US"/>
               <a:pPr>
                 <a:defRPr/>
@@ -9986,7 +9986,7 @@
             <a:pPr>
               <a:defRPr/>
             </a:pPr>
-            <a:fld id="{2186942C-FE51-468D-9D43-C7EC9EE50E0C}" type="datetimeFigureOut">
+            <a:fld id="{C16DC0ED-F7F9-4DCD-B308-2AEEC7F7D5F8}" type="datetimeFigureOut">
               <a:rPr lang="en-US"/>
               <a:pPr>
                 <a:defRPr/>
@@ -10021,7 +10021,7 @@
             <a:pPr>
               <a:defRPr/>
             </a:pPr>
-            <a:fld id="{4D71452F-89E7-4B7A-9C30-8F096E3AD376}" type="slidenum">
+            <a:fld id="{E9632FB4-DEB9-4524-9966-A542EDCF43B8}" type="slidenum">
               <a:rPr lang="en-US"/>
               <a:pPr>
                 <a:defRPr/>
@@ -10137,7 +10137,7 @@
             <a:pPr>
               <a:defRPr/>
             </a:pPr>
-            <a:fld id="{53DACE61-F8C4-42B3-A11E-B707FBBF34A5}" type="datetimeFigureOut">
+            <a:fld id="{E1C63BE3-B984-49CC-8ED9-7D79CDC41789}" type="datetimeFigureOut">
               <a:rPr lang="en-US"/>
               <a:pPr>
                 <a:defRPr/>
@@ -10192,7 +10192,7 @@
             <a:pPr>
               <a:defRPr/>
             </a:pPr>
-            <a:fld id="{62D2C365-140E-4AB6-B1D3-7F59FA36240D}" type="slidenum">
+            <a:fld id="{AAA16E23-79AF-430C-81FB-7EB7CDD364BD}" type="slidenum">
               <a:rPr lang="en-US"/>
               <a:pPr>
                 <a:defRPr/>
@@ -13096,16 +13096,16 @@
   <p:clrMap bg1="dk2" tx1="lt1" bg2="dk1" tx2="lt2" accent1="accent1" accent2="accent2" accent3="accent3" accent4="accent4" accent5="accent5" accent6="accent6" hlink="hlink" folHlink="folHlink"/>
   <p:sldLayoutIdLst>
     <p:sldLayoutId id="2147483669" r:id="rId1"/>
-    <p:sldLayoutId id="2147483668" r:id="rId2"/>
-    <p:sldLayoutId id="2147483667" r:id="rId3"/>
-    <p:sldLayoutId id="2147483666" r:id="rId4"/>
-    <p:sldLayoutId id="2147483665" r:id="rId5"/>
-    <p:sldLayoutId id="2147483664" r:id="rId6"/>
-    <p:sldLayoutId id="2147483663" r:id="rId7"/>
-    <p:sldLayoutId id="2147483662" r:id="rId8"/>
-    <p:sldLayoutId id="2147483661" r:id="rId9"/>
-    <p:sldLayoutId id="2147483660" r:id="rId10"/>
-    <p:sldLayoutId id="2147483659" r:id="rId11"/>
+    <p:sldLayoutId id="2147483659" r:id="rId2"/>
+    <p:sldLayoutId id="2147483660" r:id="rId3"/>
+    <p:sldLayoutId id="2147483661" r:id="rId4"/>
+    <p:sldLayoutId id="2147483662" r:id="rId5"/>
+    <p:sldLayoutId id="2147483663" r:id="rId6"/>
+    <p:sldLayoutId id="2147483664" r:id="rId7"/>
+    <p:sldLayoutId id="2147483665" r:id="rId8"/>
+    <p:sldLayoutId id="2147483666" r:id="rId9"/>
+    <p:sldLayoutId id="2147483667" r:id="rId10"/>
+    <p:sldLayoutId id="2147483668" r:id="rId11"/>
   </p:sldLayoutIdLst>
   <p:timing>
     <p:tnLst>
@@ -14231,7 +14231,7 @@
       </p:grpSpPr>
       <p:pic>
         <p:nvPicPr>
-          <p:cNvPr id="38913" name="Picture 2" descr="C:\Users\David.GREENTREE2004\Desktop\sports-score-tracker\Documents\useCaseDiagram.JPG"/>
+          <p:cNvPr id="35841" name="Picture 2" descr="C:\Users\David.GREENTREE2004\Desktop\sports-score-tracker\Documents\useCaseDiagram.JPG"/>
           <p:cNvPicPr>
             <a:picLocks noChangeAspect="1" noChangeArrowheads="1"/>
           </p:cNvPicPr>
@@ -14320,7 +14320,7 @@
       </p:sp>
       <p:sp>
         <p:nvSpPr>
-          <p:cNvPr id="40962" name="Rectangle 1"/>
+          <p:cNvPr id="37890" name="Rectangle 1"/>
           <p:cNvSpPr>
             <a:spLocks noChangeArrowheads="1"/>
           </p:cNvSpPr>
@@ -14357,7 +14357,7 @@
       </p:sp>
       <p:sp>
         <p:nvSpPr>
-          <p:cNvPr id="40963" name="Rectangle 1"/>
+          <p:cNvPr id="37891" name="Rectangle 1"/>
           <p:cNvSpPr>
             <a:spLocks noChangeArrowheads="1"/>
           </p:cNvSpPr>
@@ -31072,7 +31072,7 @@
       </p:grpSpPr>
       <p:pic>
         <p:nvPicPr>
-          <p:cNvPr id="45057" name="Picture 2" descr="registerUser.JPG"/>
+          <p:cNvPr id="41985" name="Picture 2" descr="registerUser.JPG"/>
           <p:cNvPicPr>
             <a:picLocks noChangeAspect="1"/>
           </p:cNvPicPr>
@@ -31136,7 +31136,7 @@
       </p:grpSpPr>
       <p:pic>
         <p:nvPicPr>
-          <p:cNvPr id="47105" name="Picture 1" descr="loginUser.JPG"/>
+          <p:cNvPr id="44033" name="Picture 1" descr="loginUser.JPG"/>
           <p:cNvPicPr>
             <a:picLocks noChangeAspect="1"/>
           </p:cNvPicPr>
@@ -31193,7 +31193,7 @@
       </p:grpSpPr>
       <p:pic>
         <p:nvPicPr>
-          <p:cNvPr id="49153" name="Picture 1" descr="logoutUser.JPG"/>
+          <p:cNvPr id="46081" name="Picture 1" descr="logoutUser.JPG"/>
           <p:cNvPicPr>
             <a:picLocks noChangeAspect="1"/>
           </p:cNvPicPr>
@@ -31250,7 +31250,7 @@
       </p:grpSpPr>
       <p:pic>
         <p:nvPicPr>
-          <p:cNvPr id="51201" name="Picture 1" descr="modifyPassword.JPG"/>
+          <p:cNvPr id="48129" name="Picture 1" descr="modifyPassword.JPG"/>
           <p:cNvPicPr>
             <a:picLocks noChangeAspect="1"/>
           </p:cNvPicPr>
@@ -31307,7 +31307,7 @@
       </p:grpSpPr>
       <p:pic>
         <p:nvPicPr>
-          <p:cNvPr id="53249" name="Picture 1" descr="resetPassword.JPG"/>
+          <p:cNvPr id="50177" name="Picture 1" descr="resetPassword.JPG"/>
           <p:cNvPicPr>
             <a:picLocks noChangeAspect="1"/>
           </p:cNvPicPr>
@@ -31364,7 +31364,7 @@
       </p:grpSpPr>
       <p:sp>
         <p:nvSpPr>
-          <p:cNvPr id="95234" name="Rectangle 2"/>
+          <p:cNvPr id="16385" name="Rectangle 2"/>
           <p:cNvSpPr>
             <a:spLocks noGrp="1" noRot="1" noChangeArrowheads="1"/>
           </p:cNvSpPr>
@@ -31372,10 +31372,7 @@
             <p:ph type="title"/>
           </p:nvPr>
         </p:nvSpPr>
-        <p:spPr>
-          <a:noFill/>
-          <a:ln/>
-        </p:spPr>
+        <p:spPr/>
         <p:txBody>
           <a:bodyPr/>
           <a:lstStyle/>
@@ -31391,7 +31388,7 @@
       </p:sp>
       <p:sp>
         <p:nvSpPr>
-          <p:cNvPr id="95235" name="Rectangle 3"/>
+          <p:cNvPr id="16386" name="Rectangle 3"/>
           <p:cNvSpPr>
             <a:spLocks noGrp="1" noChangeArrowheads="1"/>
           </p:cNvSpPr>
@@ -31399,10 +31396,7 @@
             <p:ph type="body" idx="1"/>
           </p:nvPr>
         </p:nvSpPr>
-        <p:spPr>
-          <a:noFill/>
-          <a:ln/>
-        </p:spPr>
+        <p:spPr/>
         <p:txBody>
           <a:bodyPr/>
           <a:lstStyle/>
@@ -31508,7 +31502,7 @@
       </p:grpSpPr>
       <p:pic>
         <p:nvPicPr>
-          <p:cNvPr id="55297" name="Picture 1" descr="viewScore.JPG"/>
+          <p:cNvPr id="52225" name="Picture 1" descr="viewScore.JPG"/>
           <p:cNvPicPr>
             <a:picLocks noChangeAspect="1"/>
           </p:cNvPicPr>
@@ -31565,7 +31559,7 @@
       </p:grpSpPr>
       <p:pic>
         <p:nvPicPr>
-          <p:cNvPr id="57345" name="Picture 1" descr="viewSchedule.JPG"/>
+          <p:cNvPr id="54273" name="Picture 1" descr="viewSchedule.JPG"/>
           <p:cNvPicPr>
             <a:picLocks noChangeAspect="1"/>
           </p:cNvPicPr>
@@ -31622,7 +31616,7 @@
       </p:grpSpPr>
       <p:pic>
         <p:nvPicPr>
-          <p:cNvPr id="59393" name="Picture 3" descr="C:\Users\David.GREENTREE2004\Desktop\sports-score-tracker\Documents\Sequence Diagrams\viewComments.JPG"/>
+          <p:cNvPr id="56321" name="Picture 3" descr="C:\Users\David.GREENTREE2004\Desktop\sports-score-tracker\Documents\Sequence Diagrams\viewComments.JPG"/>
           <p:cNvPicPr>
             <a:picLocks noChangeAspect="1" noChangeArrowheads="1"/>
           </p:cNvPicPr>
@@ -31686,7 +31680,7 @@
       </p:grpSpPr>
       <p:pic>
         <p:nvPicPr>
-          <p:cNvPr id="61441" name="Picture 1" descr="postComment.JPG"/>
+          <p:cNvPr id="58369" name="Picture 1" descr="postComment.JPG"/>
           <p:cNvPicPr>
             <a:picLocks noChangeAspect="1"/>
           </p:cNvPicPr>
@@ -31743,7 +31737,7 @@
       </p:grpSpPr>
       <p:pic>
         <p:nvPicPr>
-          <p:cNvPr id="63489" name="Picture 1" descr="viewPrediction.JPG"/>
+          <p:cNvPr id="60417" name="Picture 1" descr="viewPrediction.JPG"/>
           <p:cNvPicPr>
             <a:picLocks noChangeAspect="1"/>
           </p:cNvPicPr>
@@ -31800,7 +31794,7 @@
       </p:grpSpPr>
       <p:pic>
         <p:nvPicPr>
-          <p:cNvPr id="65537" name="Picture 2" descr="C:\Users\David.GREENTREE2004\Desktop\sports-score-tracker\Documents\Sequence Diagrams\publishVote.JPG"/>
+          <p:cNvPr id="62465" name="Picture 2" descr="C:\Users\David.GREENTREE2004\Desktop\sports-score-tracker\Documents\Sequence Diagrams\publishVote.JPG"/>
           <p:cNvPicPr>
             <a:picLocks noChangeAspect="1" noChangeArrowheads="1"/>
           </p:cNvPicPr>
@@ -31857,7 +31851,7 @@
       </p:grpSpPr>
       <p:pic>
         <p:nvPicPr>
-          <p:cNvPr id="67585" name="Picture 1" descr="createSport.JPG"/>
+          <p:cNvPr id="64513" name="Picture 1" descr="createSport.JPG"/>
           <p:cNvPicPr>
             <a:picLocks noChangeAspect="1"/>
           </p:cNvPicPr>
@@ -31914,7 +31908,7 @@
       </p:grpSpPr>
       <p:pic>
         <p:nvPicPr>
-          <p:cNvPr id="69633" name="Picture 3" descr="C:\Users\David.GREENTREE2004\Desktop\sports-score-tracker\Documents\Sequence Diagrams\modifySport.JPG"/>
+          <p:cNvPr id="66561" name="Picture 3" descr="C:\Users\David.GREENTREE2004\Desktop\sports-score-tracker\Documents\Sequence Diagrams\modifySport.JPG"/>
           <p:cNvPicPr>
             <a:picLocks noChangeAspect="1" noChangeArrowheads="1"/>
           </p:cNvPicPr>
@@ -31971,7 +31965,7 @@
       </p:grpSpPr>
       <p:pic>
         <p:nvPicPr>
-          <p:cNvPr id="71681" name="Picture 1" descr="createLeague.JPG"/>
+          <p:cNvPr id="68609" name="Picture 1" descr="createLeague.JPG"/>
           <p:cNvPicPr>
             <a:picLocks noChangeAspect="1"/>
           </p:cNvPicPr>
@@ -32028,7 +32022,7 @@
       </p:grpSpPr>
       <p:pic>
         <p:nvPicPr>
-          <p:cNvPr id="73729" name="Picture 1" descr="modifyLeague.JPG"/>
+          <p:cNvPr id="70657" name="Picture 1" descr="modifyLeague.JPG"/>
           <p:cNvPicPr>
             <a:picLocks noChangeAspect="1"/>
           </p:cNvPicPr>
@@ -32129,10 +32123,9 @@
               <a:lnSpc>
                 <a:spcPct val="80000"/>
               </a:lnSpc>
-              <a:defRPr/>
             </a:pPr>
             <a:r>
-              <a:rPr lang="en-US" sz="3000" dirty="0"/>
+              <a:rPr lang="en-US" sz="3000" smtClean="0"/>
               <a:t>Web-based</a:t>
             </a:r>
           </a:p>
@@ -32141,36 +32134,10 @@
               <a:lnSpc>
                 <a:spcPct val="80000"/>
               </a:lnSpc>
-              <a:defRPr/>
             </a:pPr>
             <a:r>
-              <a:rPr lang="en-US" sz="3000" dirty="0"/>
-              <a:t>Track </a:t>
-            </a:r>
-            <a:r>
-              <a:rPr lang="en-US" sz="3000" dirty="0" smtClean="0"/>
-              <a:t>schedules</a:t>
-            </a:r>
-            <a:r>
-              <a:rPr lang="en-US" sz="3000" dirty="0"/>
-              <a:t>, real-time scores and </a:t>
-            </a:r>
-            <a:r>
-              <a:rPr lang="en-US" sz="3000" dirty="0" smtClean="0"/>
-              <a:t>standings for user-created sports, leagues, and teams</a:t>
-            </a:r>
-            <a:endParaRPr lang="en-US" sz="3000" dirty="0"/>
-          </a:p>
-          <a:p>
-            <a:pPr eaLnBrk="1" hangingPunct="1">
-              <a:lnSpc>
-                <a:spcPct val="80000"/>
-              </a:lnSpc>
-              <a:defRPr/>
-            </a:pPr>
-            <a:r>
-              <a:rPr lang="en-US" sz="3000" dirty="0"/>
-              <a:t>Ability for users to vote on outcome of games</a:t>
+              <a:rPr lang="en-US" sz="3000" smtClean="0"/>
+              <a:t>Track schedules, scores and standings for user-created sports, leagues, and teams</a:t>
             </a:r>
           </a:p>
           <a:p>
@@ -32178,10 +32145,20 @@
               <a:lnSpc>
                 <a:spcPct val="80000"/>
               </a:lnSpc>
-              <a:defRPr/>
             </a:pPr>
             <a:r>
-              <a:rPr lang="en-US" sz="3000" dirty="0"/>
+              <a:rPr lang="en-US" sz="3000" smtClean="0"/>
+              <a:t>Users can vote on outcome of games</a:t>
+            </a:r>
+          </a:p>
+          <a:p>
+            <a:pPr eaLnBrk="1" hangingPunct="1">
+              <a:lnSpc>
+                <a:spcPct val="80000"/>
+              </a:lnSpc>
+            </a:pPr>
+            <a:r>
+              <a:rPr lang="en-US" sz="3000" smtClean="0"/>
               <a:t>Users can view and post comments on injuries, scores, or general info</a:t>
             </a:r>
           </a:p>
@@ -32190,17 +32167,11 @@
               <a:lnSpc>
                 <a:spcPct val="80000"/>
               </a:lnSpc>
-              <a:defRPr/>
             </a:pPr>
             <a:r>
-              <a:rPr lang="en-US" sz="3000" dirty="0"/>
-              <a:t>Smart Outcome Prediction System, which takes into account team’s win / loss </a:t>
+              <a:rPr lang="en-US" sz="3000" smtClean="0"/>
+              <a:t>Smart Outcome Prediction System, takes into account team’s win / loss record</a:t>
             </a:r>
-            <a:r>
-              <a:rPr lang="en-US" sz="3000" dirty="0" smtClean="0"/>
-              <a:t>record</a:t>
-            </a:r>
-            <a:endParaRPr lang="en-US" sz="3000" dirty="0"/>
           </a:p>
         </p:txBody>
       </p:sp>
@@ -32238,7 +32209,7 @@
       </p:grpSpPr>
       <p:pic>
         <p:nvPicPr>
-          <p:cNvPr id="75777" name="Picture 1" descr="createTeam.JPG"/>
+          <p:cNvPr id="72705" name="Picture 1" descr="createTeam.JPG"/>
           <p:cNvPicPr>
             <a:picLocks noChangeAspect="1"/>
           </p:cNvPicPr>
@@ -32295,7 +32266,7 @@
       </p:grpSpPr>
       <p:pic>
         <p:nvPicPr>
-          <p:cNvPr id="77825" name="Picture 1" descr="modifyTeam.JPG"/>
+          <p:cNvPr id="74753" name="Picture 1" descr="modifyTeam.JPG"/>
           <p:cNvPicPr>
             <a:picLocks noChangeAspect="1"/>
           </p:cNvPicPr>
@@ -32352,7 +32323,7 @@
       </p:grpSpPr>
       <p:pic>
         <p:nvPicPr>
-          <p:cNvPr id="79873" name="Picture 1" descr="createGame.JPG"/>
+          <p:cNvPr id="76801" name="Picture 1" descr="createGame.JPG"/>
           <p:cNvPicPr>
             <a:picLocks noChangeAspect="1"/>
           </p:cNvPicPr>
@@ -32409,7 +32380,7 @@
       </p:grpSpPr>
       <p:pic>
         <p:nvPicPr>
-          <p:cNvPr id="81921" name="Picture 1" descr="modifyGame.JPG"/>
+          <p:cNvPr id="78849" name="Picture 1" descr="modifyGame.JPG"/>
           <p:cNvPicPr>
             <a:picLocks noChangeAspect="1"/>
           </p:cNvPicPr>
@@ -32466,7 +32437,7 @@
       </p:grpSpPr>
       <p:pic>
         <p:nvPicPr>
-          <p:cNvPr id="83969" name="Picture 2" descr="C:\Users\David.GREENTREE2004\Desktop\sports-score-tracker\Documents\Sequence Diagrams\modifyUser.JPG"/>
+          <p:cNvPr id="80897" name="Picture 2" descr="C:\Users\David.GREENTREE2004\Desktop\sports-score-tracker\Documents\Sequence Diagrams\modifyUser.JPG"/>
           <p:cNvPicPr>
             <a:picLocks noChangeAspect="1" noChangeArrowheads="1"/>
           </p:cNvPicPr>
@@ -32523,7 +32494,7 @@
       </p:grpSpPr>
       <p:pic>
         <p:nvPicPr>
-          <p:cNvPr id="86017" name="Picture 1" descr="deleteComment.JPG"/>
+          <p:cNvPr id="82945" name="Picture 1" descr="deleteComment.JPG"/>
           <p:cNvPicPr>
             <a:picLocks noChangeAspect="1"/>
           </p:cNvPicPr>
@@ -32580,7 +32551,7 @@
       </p:grpSpPr>
       <p:pic>
         <p:nvPicPr>
-          <p:cNvPr id="88065" name="Picture 1" descr="stateDiagram.JPG"/>
+          <p:cNvPr id="84993" name="Picture 1" descr="stateDiagram.JPG"/>
           <p:cNvPicPr>
             <a:picLocks noChangeAspect="1"/>
           </p:cNvPicPr>
@@ -32644,7 +32615,7 @@
       </p:grpSpPr>
       <p:pic>
         <p:nvPicPr>
-          <p:cNvPr id="90113" name="Picture 1" descr="Table Layouts.png"/>
+          <p:cNvPr id="87041" name="Picture 1" descr="Table Layouts.png"/>
           <p:cNvPicPr>
             <a:picLocks noChangeAspect="1"/>
           </p:cNvPicPr>
@@ -32708,7 +32679,7 @@
       </p:grpSpPr>
       <p:pic>
         <p:nvPicPr>
-          <p:cNvPr id="92161" name="Picture 1" descr="ER Model.png"/>
+          <p:cNvPr id="89089" name="Picture 1" descr="ER Model.png"/>
           <p:cNvPicPr>
             <a:picLocks noChangeAspect="1"/>
           </p:cNvPicPr>
@@ -32848,119 +32819,79 @@
           <a:bodyPr/>
           <a:lstStyle/>
           <a:p>
-            <a:pPr eaLnBrk="1" hangingPunct="1">
-              <a:defRPr/>
-            </a:pPr>
+            <a:pPr eaLnBrk="1" hangingPunct="1"/>
             <a:r>
-              <a:rPr lang="en-US" sz="2000" dirty="0" smtClean="0"/>
+              <a:rPr lang="en-US" sz="2000" smtClean="0"/>
               <a:t>R1.  Register New Account</a:t>
             </a:r>
           </a:p>
           <a:p>
-            <a:pPr lvl="1" eaLnBrk="1" hangingPunct="1">
-              <a:defRPr/>
-            </a:pPr>
+            <a:pPr lvl="1" eaLnBrk="1" hangingPunct="1"/>
             <a:r>
-              <a:rPr lang="en-US" sz="2000" dirty="0" smtClean="0"/>
+              <a:rPr lang="en-US" sz="2000" smtClean="0"/>
               <a:t>Guest gives email, password, and first name</a:t>
             </a:r>
           </a:p>
           <a:p>
-            <a:pPr lvl="1" eaLnBrk="1" hangingPunct="1">
-              <a:defRPr/>
-            </a:pPr>
+            <a:pPr lvl="1" eaLnBrk="1" hangingPunct="1"/>
             <a:r>
-              <a:rPr lang="en-US" sz="2000" dirty="0" smtClean="0"/>
-              <a:t>Systems ensures validity of email</a:t>
+              <a:rPr lang="en-US" sz="2000" smtClean="0"/>
+              <a:t>System ensures validity of email</a:t>
             </a:r>
           </a:p>
           <a:p>
-            <a:pPr lvl="1" eaLnBrk="1" hangingPunct="1">
-              <a:defRPr/>
-            </a:pPr>
+            <a:pPr lvl="1" eaLnBrk="1" hangingPunct="1"/>
             <a:r>
-              <a:rPr lang="en-US" sz="2000" dirty="0" smtClean="0"/>
+              <a:rPr lang="en-US" sz="2000" smtClean="0"/>
               <a:t>User sent confirmation of registration</a:t>
             </a:r>
           </a:p>
           <a:p>
-            <a:pPr eaLnBrk="1" hangingPunct="1">
-              <a:defRPr/>
-            </a:pPr>
+            <a:pPr eaLnBrk="1" hangingPunct="1"/>
             <a:r>
-              <a:rPr lang="en-US" sz="2000" dirty="0" smtClean="0"/>
+              <a:rPr lang="en-US" sz="2000" smtClean="0"/>
               <a:t>R2.  Login / logout</a:t>
             </a:r>
           </a:p>
           <a:p>
-            <a:pPr lvl="1" eaLnBrk="1" hangingPunct="1">
-              <a:defRPr/>
-            </a:pPr>
+            <a:pPr lvl="1" eaLnBrk="1" hangingPunct="1"/>
             <a:r>
-              <a:rPr lang="en-US" sz="2000" dirty="0" smtClean="0"/>
-              <a:t>User can login via valid login ID and password</a:t>
+              <a:rPr lang="en-US" sz="2000" smtClean="0"/>
+              <a:t>User login via valid login ID and password</a:t>
             </a:r>
           </a:p>
           <a:p>
-            <a:pPr lvl="1" eaLnBrk="1" hangingPunct="1">
-              <a:defRPr/>
-            </a:pPr>
+            <a:pPr lvl="1" eaLnBrk="1" hangingPunct="1"/>
             <a:r>
-              <a:rPr lang="en-US" sz="2000" dirty="0" smtClean="0"/>
-              <a:t>Login confirmation shown</a:t>
-            </a:r>
-          </a:p>
-          <a:p>
-            <a:pPr lvl="1" eaLnBrk="1" hangingPunct="1">
-              <a:defRPr/>
-            </a:pPr>
-            <a:r>
-              <a:rPr lang="en-US" sz="2000" dirty="0" smtClean="0"/>
+              <a:rPr lang="en-US" sz="2000" smtClean="0"/>
               <a:t>User can logout after successful login</a:t>
             </a:r>
           </a:p>
           <a:p>
-            <a:pPr eaLnBrk="1" hangingPunct="1">
-              <a:defRPr/>
-            </a:pPr>
+            <a:pPr eaLnBrk="1" hangingPunct="1"/>
             <a:r>
-              <a:rPr lang="en-US" sz="2000" dirty="0" smtClean="0"/>
+              <a:rPr lang="en-US" sz="2000" smtClean="0"/>
               <a:t>R3.  Modify / Reset Password</a:t>
             </a:r>
           </a:p>
           <a:p>
-            <a:pPr lvl="1" eaLnBrk="1" hangingPunct="1">
-              <a:defRPr/>
-            </a:pPr>
+            <a:pPr lvl="1" eaLnBrk="1" hangingPunct="1"/>
             <a:r>
-              <a:rPr lang="en-US" sz="2000" dirty="0" smtClean="0"/>
-              <a:t>After successful login, user can change password by giving old password and new password</a:t>
+              <a:rPr lang="en-US" sz="2000" smtClean="0"/>
+              <a:t>After successful login, user changes password by giving old password and new password</a:t>
             </a:r>
           </a:p>
           <a:p>
-            <a:pPr lvl="1" eaLnBrk="1" hangingPunct="1">
-              <a:defRPr/>
-            </a:pPr>
+            <a:pPr lvl="1" eaLnBrk="1" hangingPunct="1"/>
             <a:r>
-              <a:rPr lang="en-US" sz="2000" dirty="0" smtClean="0"/>
-              <a:t>Change password confirmation shown</a:t>
+              <a:rPr lang="en-US" sz="2000" smtClean="0"/>
+              <a:t>User can reset password using their email address</a:t>
             </a:r>
           </a:p>
           <a:p>
-            <a:pPr lvl="1" eaLnBrk="1" hangingPunct="1">
-              <a:defRPr/>
-            </a:pPr>
+            <a:pPr lvl="1" eaLnBrk="1" hangingPunct="1"/>
             <a:r>
-              <a:rPr lang="en-US" sz="2000" dirty="0" smtClean="0"/>
-              <a:t>User can also reset password using their email address</a:t>
-            </a:r>
-          </a:p>
-          <a:p>
-            <a:pPr lvl="1" eaLnBrk="1" hangingPunct="1">
-              <a:defRPr/>
-            </a:pPr>
-            <a:r>
-              <a:rPr lang="en-US" sz="2000" dirty="0" smtClean="0"/>
+              <a:rPr lang="en-US" sz="2000" smtClean="0"/>
               <a:t>Temporary password sent to email on file</a:t>
             </a:r>
           </a:p>
@@ -33050,128 +32981,100 @@
           <a:bodyPr/>
           <a:lstStyle/>
           <a:p>
-            <a:pPr eaLnBrk="1" hangingPunct="1">
-              <a:defRPr/>
-            </a:pPr>
+            <a:pPr eaLnBrk="1" hangingPunct="1"/>
             <a:r>
-              <a:rPr lang="en-US" sz="1600" dirty="0" smtClean="0"/>
+              <a:rPr lang="en-US" sz="1600" smtClean="0"/>
               <a:t>R4.  View Games Scores</a:t>
             </a:r>
           </a:p>
           <a:p>
-            <a:pPr lvl="1" eaLnBrk="1" hangingPunct="1">
-              <a:defRPr/>
-            </a:pPr>
+            <a:pPr lvl="1" eaLnBrk="1" hangingPunct="1"/>
             <a:r>
-              <a:rPr lang="en-US" sz="1600" dirty="0" smtClean="0"/>
+              <a:rPr lang="en-US" sz="1600" smtClean="0"/>
               <a:t>Guests, registered users, and administrators can view game scores by league(s), sport(s) and/or teams</a:t>
             </a:r>
           </a:p>
           <a:p>
-            <a:pPr eaLnBrk="1" hangingPunct="1">
-              <a:defRPr/>
-            </a:pPr>
+            <a:pPr eaLnBrk="1" hangingPunct="1"/>
             <a:r>
-              <a:rPr lang="en-US" sz="1600" dirty="0" smtClean="0"/>
+              <a:rPr lang="en-US" sz="1600" smtClean="0"/>
               <a:t>R5.  View Game Schedules</a:t>
             </a:r>
           </a:p>
           <a:p>
-            <a:pPr lvl="1" eaLnBrk="1" hangingPunct="1">
-              <a:defRPr/>
-            </a:pPr>
+            <a:pPr lvl="1" eaLnBrk="1" hangingPunct="1"/>
             <a:r>
-              <a:rPr lang="en-US" sz="1600" dirty="0" smtClean="0"/>
-              <a:t>Guests, registered users, and administrators can view game schedules by league(s), sport(s) and/or teams</a:t>
+              <a:rPr lang="en-US" sz="1600" smtClean="0"/>
+              <a:t>Guests, RU's, and admins can view game schedules by league(s), sport(s) and/or teams</a:t>
             </a:r>
           </a:p>
           <a:p>
-            <a:pPr eaLnBrk="1" hangingPunct="1">
-              <a:defRPr/>
-            </a:pPr>
+            <a:pPr eaLnBrk="1" hangingPunct="1"/>
             <a:r>
-              <a:rPr lang="en-US" sz="1600" dirty="0" smtClean="0"/>
+              <a:rPr lang="en-US" sz="1600" smtClean="0"/>
               <a:t>R6.  View comments</a:t>
             </a:r>
           </a:p>
           <a:p>
-            <a:pPr lvl="1" eaLnBrk="1" hangingPunct="1">
-              <a:defRPr/>
-            </a:pPr>
+            <a:pPr lvl="1" eaLnBrk="1" hangingPunct="1"/>
             <a:r>
-              <a:rPr lang="en-US" sz="1600" dirty="0" smtClean="0"/>
-              <a:t>Guests, registered users, and administrators can view comments per game</a:t>
+              <a:rPr lang="en-US" sz="1600" smtClean="0"/>
+              <a:t>Guests, RU's, and admins can view comments per game</a:t>
             </a:r>
           </a:p>
           <a:p>
-            <a:pPr eaLnBrk="1" hangingPunct="1">
-              <a:defRPr/>
-            </a:pPr>
+            <a:pPr eaLnBrk="1" hangingPunct="1"/>
             <a:r>
-              <a:rPr lang="en-US" sz="1600" dirty="0" smtClean="0"/>
+              <a:rPr lang="en-US" sz="1600" smtClean="0"/>
               <a:t>R7.  Post comments</a:t>
             </a:r>
           </a:p>
           <a:p>
-            <a:pPr lvl="1" eaLnBrk="1" hangingPunct="1">
-              <a:defRPr/>
-            </a:pPr>
+            <a:pPr lvl="1" eaLnBrk="1" hangingPunct="1"/>
             <a:r>
-              <a:rPr lang="en-US" sz="1600" dirty="0" smtClean="0"/>
-              <a:t>After login, registered users and administrators can post comments</a:t>
+              <a:rPr lang="en-US" sz="1600" smtClean="0"/>
+              <a:t>After login, RU's and admins can post comments</a:t>
             </a:r>
           </a:p>
           <a:p>
-            <a:pPr eaLnBrk="1" hangingPunct="1">
-              <a:defRPr/>
-            </a:pPr>
+            <a:pPr eaLnBrk="1" hangingPunct="1"/>
             <a:r>
-              <a:rPr lang="en-US" sz="1600" dirty="0" smtClean="0"/>
+              <a:rPr lang="en-US" sz="1600" smtClean="0"/>
               <a:t>R8.  User winner prediction</a:t>
             </a:r>
           </a:p>
           <a:p>
-            <a:pPr lvl="1" eaLnBrk="1" hangingPunct="1">
-              <a:defRPr/>
-            </a:pPr>
+            <a:pPr lvl="1" eaLnBrk="1" hangingPunct="1"/>
             <a:r>
-              <a:rPr lang="en-US" sz="1600" dirty="0" smtClean="0"/>
-              <a:t>After login, registered users and administrators can vote for their predicted winner per game</a:t>
+              <a:rPr lang="en-US" sz="1600" smtClean="0"/>
+              <a:t>After login, RU's and admins can vote for their predicted winner per game</a:t>
             </a:r>
           </a:p>
           <a:p>
-            <a:pPr eaLnBrk="1" hangingPunct="1">
-              <a:defRPr/>
-            </a:pPr>
+            <a:pPr eaLnBrk="1" hangingPunct="1"/>
             <a:r>
-              <a:rPr lang="en-US" sz="1600" dirty="0" smtClean="0"/>
+              <a:rPr lang="en-US" sz="1600" smtClean="0"/>
               <a:t>R9.  View system winner prediction and user winner prediction</a:t>
             </a:r>
           </a:p>
           <a:p>
-            <a:pPr lvl="1" eaLnBrk="1" hangingPunct="1">
-              <a:defRPr/>
-            </a:pPr>
+            <a:pPr lvl="1" eaLnBrk="1" hangingPunct="1"/>
             <a:r>
-              <a:rPr lang="en-US" sz="1600" dirty="0" smtClean="0"/>
-              <a:t>Guests, registered users and administrators can view system winner prediction and percentage chart of user winner prediction</a:t>
+              <a:rPr lang="en-US" sz="1600" smtClean="0"/>
+              <a:t>Guests, RU's and admins can view system winner prediction and percentage chart of user winner prediction</a:t>
             </a:r>
           </a:p>
           <a:p>
-            <a:pPr lvl="1" eaLnBrk="1" hangingPunct="1">
-              <a:defRPr/>
-            </a:pPr>
+            <a:pPr lvl="1" eaLnBrk="1" hangingPunct="1"/>
             <a:r>
-              <a:rPr lang="en-US" sz="1600" dirty="0" smtClean="0"/>
+              <a:rPr lang="en-US" sz="1600" smtClean="0"/>
               <a:t>System prediction based on team’s win /loss percentages</a:t>
             </a:r>
           </a:p>
           <a:p>
-            <a:pPr lvl="1" eaLnBrk="1" hangingPunct="1">
-              <a:defRPr/>
-            </a:pPr>
+            <a:pPr lvl="1" eaLnBrk="1" hangingPunct="1"/>
             <a:r>
-              <a:rPr lang="en-US" sz="1600" dirty="0" smtClean="0"/>
+              <a:rPr lang="en-US" sz="1600" smtClean="0"/>
               <a:t>User winner prediction based on sums of user votes per game</a:t>
             </a:r>
           </a:p>
@@ -33257,160 +33160,81 @@
           <a:bodyPr/>
           <a:lstStyle/>
           <a:p>
-            <a:pPr eaLnBrk="1" hangingPunct="1">
-              <a:defRPr/>
-            </a:pPr>
+            <a:pPr eaLnBrk="1" hangingPunct="1"/>
             <a:r>
-              <a:rPr lang="en-US" sz="1700" dirty="0" smtClean="0"/>
+              <a:rPr lang="en-US" sz="1800" smtClean="0"/>
               <a:t>R10.  Create / modify custom sports</a:t>
             </a:r>
           </a:p>
           <a:p>
-            <a:pPr lvl="1" eaLnBrk="1" hangingPunct="1">
-              <a:defRPr/>
-            </a:pPr>
+            <a:pPr lvl="1" eaLnBrk="1" hangingPunct="1"/>
             <a:r>
-              <a:rPr lang="en-US" sz="1700" dirty="0" smtClean="0"/>
+              <a:rPr lang="en-US" sz="1800" smtClean="0"/>
               <a:t>After login, registered users and administrators can create custom sports by providing the sport name.</a:t>
             </a:r>
           </a:p>
           <a:p>
-            <a:pPr lvl="1" eaLnBrk="1" hangingPunct="1">
-              <a:defRPr/>
-            </a:pPr>
+            <a:pPr lvl="1" eaLnBrk="1" hangingPunct="1"/>
             <a:r>
-              <a:rPr lang="en-US" sz="1700" dirty="0" smtClean="0"/>
-              <a:t>Custom sport creation confirmation shown</a:t>
+              <a:rPr lang="en-US" sz="1800" smtClean="0"/>
+              <a:t>Admins can delete sports by selecting the sport name</a:t>
             </a:r>
           </a:p>
           <a:p>
-            <a:pPr lvl="1" eaLnBrk="1" hangingPunct="1">
-              <a:defRPr/>
-            </a:pPr>
+            <a:pPr lvl="1" eaLnBrk="1" hangingPunct="1"/>
             <a:r>
-              <a:rPr lang="en-US" sz="1700" dirty="0" smtClean="0"/>
-              <a:t>Administrators can delete sports by selecting the sport name</a:t>
-            </a:r>
-          </a:p>
-          <a:p>
-            <a:pPr lvl="1" eaLnBrk="1" hangingPunct="1">
-              <a:defRPr/>
-            </a:pPr>
-            <a:r>
-              <a:rPr lang="en-US" sz="1700" dirty="0" smtClean="0"/>
+              <a:rPr lang="en-US" sz="1800" smtClean="0"/>
               <a:t>All leagues, teams, games, and comments will be deleted along with sport deletion</a:t>
             </a:r>
           </a:p>
           <a:p>
-            <a:pPr lvl="1" eaLnBrk="1" hangingPunct="1">
-              <a:defRPr/>
-            </a:pPr>
+            <a:pPr lvl="1" eaLnBrk="1" hangingPunct="1"/>
             <a:r>
-              <a:rPr lang="en-US" sz="1700" dirty="0" smtClean="0"/>
-              <a:t>Sport deletion confirmation shown</a:t>
+              <a:rPr lang="en-US" sz="1800" smtClean="0"/>
+              <a:t>Confirmation shown</a:t>
             </a:r>
           </a:p>
           <a:p>
-            <a:pPr eaLnBrk="1" hangingPunct="1">
-              <a:defRPr/>
-            </a:pPr>
+            <a:pPr eaLnBrk="1" hangingPunct="1"/>
             <a:r>
-              <a:rPr lang="en-US" sz="1700" dirty="0" smtClean="0"/>
+              <a:rPr lang="en-US" sz="1800" smtClean="0"/>
               <a:t>R11.  Create / modify custom leagues</a:t>
             </a:r>
           </a:p>
           <a:p>
-            <a:pPr lvl="1" eaLnBrk="1" hangingPunct="1">
-              <a:defRPr/>
-            </a:pPr>
+            <a:pPr lvl="1" eaLnBrk="1" hangingPunct="1"/>
             <a:r>
-              <a:rPr lang="en-US" sz="1700" dirty="0" smtClean="0"/>
-              <a:t>After login, registered users and administrators can create custom sports by providing the league name.</a:t>
+              <a:rPr lang="en-US" sz="1800" smtClean="0"/>
+              <a:t>After login, RU's and admins can create custom sports by providing the league name.</a:t>
             </a:r>
           </a:p>
           <a:p>
-            <a:pPr lvl="1" eaLnBrk="1" hangingPunct="1">
-              <a:defRPr/>
-            </a:pPr>
+            <a:pPr lvl="1" eaLnBrk="1" hangingPunct="1"/>
             <a:r>
-              <a:rPr lang="en-US" sz="1700" dirty="0" smtClean="0"/>
-              <a:t>Custom league creation confirmation shown</a:t>
+              <a:rPr lang="en-US" sz="1800" smtClean="0"/>
+              <a:t>RU's and admins can update custom leagues by searching via league name and inputting a new league name.</a:t>
             </a:r>
           </a:p>
           <a:p>
-            <a:pPr lvl="1" eaLnBrk="1" hangingPunct="1">
-              <a:defRPr/>
-            </a:pPr>
+            <a:pPr lvl="1" eaLnBrk="1" hangingPunct="1"/>
             <a:r>
-              <a:rPr lang="en-US" sz="1700" dirty="0" smtClean="0"/>
-              <a:t>Registered users and administrators can update custom leagues by searching via league name and inputting a new league name.</a:t>
+              <a:rPr lang="en-US" sz="1800" smtClean="0"/>
+              <a:t>Confirmation shown</a:t>
             </a:r>
           </a:p>
           <a:p>
-            <a:pPr lvl="1" eaLnBrk="1" hangingPunct="1">
-              <a:defRPr/>
-            </a:pPr>
+            <a:pPr lvl="1" eaLnBrk="1" hangingPunct="1"/>
             <a:r>
-              <a:rPr lang="en-US" sz="1700" dirty="0" smtClean="0"/>
-              <a:t>Custom league update confirmation shown</a:t>
+              <a:rPr lang="en-US" sz="1800" smtClean="0"/>
+              <a:t>RU's and admins can delete leagues by selecting the league name</a:t>
             </a:r>
           </a:p>
           <a:p>
-            <a:pPr lvl="1" eaLnBrk="1" hangingPunct="1">
-              <a:defRPr/>
-            </a:pPr>
+            <a:pPr lvl="1" eaLnBrk="1" hangingPunct="1"/>
             <a:r>
-              <a:rPr lang="en-US" sz="1700" dirty="0" smtClean="0"/>
-              <a:t>Registered users and administrators can delete leagues by selecting the league name</a:t>
-            </a:r>
-          </a:p>
-          <a:p>
-            <a:pPr lvl="1" eaLnBrk="1" hangingPunct="1">
-              <a:defRPr/>
-            </a:pPr>
-            <a:r>
-              <a:rPr lang="en-US" sz="1700" dirty="0" smtClean="0"/>
+              <a:rPr lang="en-US" sz="1800" smtClean="0"/>
               <a:t>All teams, games, and comments will be deleted along with league deletion</a:t>
             </a:r>
-          </a:p>
-          <a:p>
-            <a:pPr lvl="1" eaLnBrk="1" hangingPunct="1">
-              <a:defRPr/>
-            </a:pPr>
-            <a:r>
-              <a:rPr lang="en-US" sz="1700" dirty="0" smtClean="0"/>
-              <a:t>League deletion confirmation shown</a:t>
-            </a:r>
-          </a:p>
-          <a:p>
-            <a:pPr lvl="1" eaLnBrk="1" hangingPunct="1">
-              <a:defRPr/>
-            </a:pPr>
-            <a:endParaRPr lang="en-US" dirty="0" smtClean="0"/>
-          </a:p>
-          <a:p>
-            <a:pPr lvl="1" eaLnBrk="1" hangingPunct="1">
-              <a:defRPr/>
-            </a:pPr>
-            <a:endParaRPr lang="en-US" dirty="0" smtClean="0"/>
-          </a:p>
-          <a:p>
-            <a:pPr lvl="1" eaLnBrk="1" hangingPunct="1">
-              <a:defRPr/>
-            </a:pPr>
-            <a:endParaRPr lang="en-US" dirty="0" smtClean="0"/>
-          </a:p>
-          <a:p>
-            <a:pPr lvl="1" eaLnBrk="1" hangingPunct="1">
-              <a:defRPr/>
-            </a:pPr>
-            <a:endParaRPr lang="en-US" dirty="0" smtClean="0"/>
-          </a:p>
-          <a:p>
-            <a:pPr lvl="1" eaLnBrk="1" hangingPunct="1">
-              <a:defRPr/>
-            </a:pPr>
-            <a:endParaRPr lang="en-US" dirty="0"/>
           </a:p>
         </p:txBody>
       </p:sp>
@@ -33498,75 +33322,38 @@
           <a:bodyPr/>
           <a:lstStyle/>
           <a:p>
-            <a:pPr eaLnBrk="1" hangingPunct="1">
-              <a:defRPr/>
-            </a:pPr>
+            <a:pPr eaLnBrk="1" hangingPunct="1"/>
             <a:r>
-              <a:rPr lang="en-US" sz="2200" dirty="0" smtClean="0"/>
+              <a:rPr lang="en-US" sz="2600" smtClean="0"/>
               <a:t>R12.  Create / modify custom teams</a:t>
             </a:r>
           </a:p>
           <a:p>
-            <a:pPr lvl="1" eaLnBrk="1" hangingPunct="1">
-              <a:defRPr/>
-            </a:pPr>
+            <a:pPr lvl="1" eaLnBrk="1" hangingPunct="1"/>
             <a:r>
-              <a:rPr lang="en-US" sz="2200" dirty="0" smtClean="0"/>
+              <a:rPr lang="en-US" sz="2600" smtClean="0"/>
               <a:t>After login, registered users and administrators can create custom teams by providing the team name, and then by joining the team in a league.</a:t>
             </a:r>
           </a:p>
           <a:p>
-            <a:pPr lvl="1" eaLnBrk="1" hangingPunct="1">
-              <a:defRPr/>
-            </a:pPr>
+            <a:pPr lvl="1" eaLnBrk="1" hangingPunct="1"/>
             <a:r>
-              <a:rPr lang="en-US" sz="2200" dirty="0" smtClean="0"/>
-              <a:t>Custom team creation confirmation shown</a:t>
+              <a:rPr lang="en-US" sz="2600" smtClean="0"/>
+              <a:t>RU's and admins can update custom teams by searching via team name and inputting a new team name, and modifying the league.</a:t>
             </a:r>
           </a:p>
           <a:p>
-            <a:pPr lvl="1" eaLnBrk="1" hangingPunct="1">
-              <a:defRPr/>
-            </a:pPr>
+            <a:pPr lvl="1" eaLnBrk="1" hangingPunct="1"/>
             <a:r>
-              <a:rPr lang="en-US" sz="2200" dirty="0" smtClean="0"/>
-              <a:t>Registered users and administrators can update custom teams by searching via team name and inputting a new team name, and modifying the league.</a:t>
+              <a:rPr lang="en-US" sz="2600" smtClean="0"/>
+              <a:t>RU's and admins can delete teams by selecting the team name</a:t>
             </a:r>
           </a:p>
           <a:p>
-            <a:pPr lvl="1" eaLnBrk="1" hangingPunct="1">
-              <a:defRPr/>
-            </a:pPr>
+            <a:pPr lvl="1" eaLnBrk="1" hangingPunct="1"/>
             <a:r>
-              <a:rPr lang="en-US" sz="2200" dirty="0" smtClean="0"/>
-              <a:t>Custom team update confirmation shown</a:t>
-            </a:r>
-          </a:p>
-          <a:p>
-            <a:pPr lvl="1" eaLnBrk="1" hangingPunct="1">
-              <a:defRPr/>
-            </a:pPr>
-            <a:r>
-              <a:rPr lang="en-US" sz="2200" dirty="0" smtClean="0"/>
-              <a:t>Registered users and administrators can delete teams by selecting the team name</a:t>
-            </a:r>
-          </a:p>
-          <a:p>
-            <a:pPr lvl="1" eaLnBrk="1" hangingPunct="1">
-              <a:defRPr/>
-            </a:pPr>
-            <a:r>
-              <a:rPr lang="en-US" sz="2200" dirty="0" smtClean="0"/>
+              <a:rPr lang="en-US" sz="2600" smtClean="0"/>
               <a:t>All games and comments will be deleted along with team deletion</a:t>
-            </a:r>
-          </a:p>
-          <a:p>
-            <a:pPr lvl="1" eaLnBrk="1" hangingPunct="1">
-              <a:defRPr/>
-            </a:pPr>
-            <a:r>
-              <a:rPr lang="en-US" sz="2200" dirty="0" smtClean="0"/>
-              <a:t>Team deletion confirmation shown</a:t>
             </a:r>
           </a:p>
         </p:txBody>
@@ -33655,82 +33442,39 @@
           <a:bodyPr/>
           <a:lstStyle/>
           <a:p>
-            <a:pPr eaLnBrk="1" hangingPunct="1">
-              <a:defRPr/>
-            </a:pPr>
+            <a:pPr eaLnBrk="1" hangingPunct="1"/>
             <a:r>
-              <a:rPr lang="en-US" sz="2200" dirty="0" smtClean="0"/>
+              <a:rPr lang="en-US" sz="2600" smtClean="0"/>
               <a:t>R13.  Create / modify custom games</a:t>
             </a:r>
           </a:p>
           <a:p>
-            <a:pPr lvl="1" eaLnBrk="1" hangingPunct="1">
-              <a:defRPr/>
-            </a:pPr>
+            <a:pPr lvl="1" eaLnBrk="1" hangingPunct="1"/>
             <a:r>
-              <a:rPr lang="en-US" sz="2200" dirty="0" smtClean="0"/>
+              <a:rPr lang="en-US" sz="2600" smtClean="0"/>
               <a:t>After login, registered users and administrators can create custom games by selecting the two team names, and then by inputting the game details of date, home score, and away score, if known.</a:t>
             </a:r>
           </a:p>
           <a:p>
-            <a:pPr lvl="1" eaLnBrk="1" hangingPunct="1">
-              <a:defRPr/>
-            </a:pPr>
+            <a:pPr lvl="1" eaLnBrk="1" hangingPunct="1"/>
             <a:r>
-              <a:rPr lang="en-US" sz="2200" dirty="0" smtClean="0"/>
-              <a:t>Custom game creation confirmation shown</a:t>
+              <a:rPr lang="en-US" sz="2600" smtClean="0"/>
+              <a:t>RU's and admins can update custom games by viewing the game and updating the date, home score, and/or the away score.</a:t>
             </a:r>
           </a:p>
           <a:p>
-            <a:pPr lvl="1" eaLnBrk="1" hangingPunct="1">
-              <a:defRPr/>
-            </a:pPr>
+            <a:pPr lvl="1" eaLnBrk="1" hangingPunct="1"/>
             <a:r>
-              <a:rPr lang="en-US" sz="2200" dirty="0" smtClean="0"/>
-              <a:t>Registered users and administrators can update custom games by viewing the game and updating the date, home score, and/or the away score.</a:t>
+              <a:rPr lang="en-US" sz="2600" smtClean="0"/>
+              <a:t>RU's and admins can delete games by selecting the game</a:t>
             </a:r>
           </a:p>
           <a:p>
-            <a:pPr lvl="1" eaLnBrk="1" hangingPunct="1">
-              <a:defRPr/>
-            </a:pPr>
+            <a:pPr lvl="1" eaLnBrk="1" hangingPunct="1"/>
             <a:r>
-              <a:rPr lang="en-US" sz="2200" dirty="0" smtClean="0"/>
-              <a:t>Custom game update confirmation shown</a:t>
-            </a:r>
-          </a:p>
-          <a:p>
-            <a:pPr lvl="1" eaLnBrk="1" hangingPunct="1">
-              <a:defRPr/>
-            </a:pPr>
-            <a:r>
-              <a:rPr lang="en-US" sz="2200" dirty="0" smtClean="0"/>
-              <a:t>Registered users and administrators can delete games by selecting the game</a:t>
-            </a:r>
-          </a:p>
-          <a:p>
-            <a:pPr lvl="1" eaLnBrk="1" hangingPunct="1">
-              <a:defRPr/>
-            </a:pPr>
-            <a:r>
-              <a:rPr lang="en-US" sz="2200" dirty="0" smtClean="0"/>
+              <a:rPr lang="en-US" sz="2600" smtClean="0"/>
               <a:t>All comments will be deleted along with game deletion</a:t>
             </a:r>
-          </a:p>
-          <a:p>
-            <a:pPr lvl="1" eaLnBrk="1" hangingPunct="1">
-              <a:defRPr/>
-            </a:pPr>
-            <a:r>
-              <a:rPr lang="en-US" sz="2200" dirty="0" smtClean="0"/>
-              <a:t>Game deletion confirmation shown</a:t>
-            </a:r>
-          </a:p>
-          <a:p>
-            <a:pPr eaLnBrk="1" hangingPunct="1">
-              <a:defRPr/>
-            </a:pPr>
-            <a:endParaRPr lang="en-US" dirty="0"/>
           </a:p>
         </p:txBody>
       </p:sp>
@@ -33818,75 +33562,45 @@
           <a:bodyPr/>
           <a:lstStyle/>
           <a:p>
-            <a:pPr eaLnBrk="1" hangingPunct="1">
-              <a:defRPr/>
-            </a:pPr>
+            <a:pPr eaLnBrk="1" hangingPunct="1"/>
             <a:r>
-              <a:rPr lang="en-US" sz="2400" dirty="0" smtClean="0"/>
+              <a:rPr lang="en-US" sz="2400" smtClean="0"/>
               <a:t>R14.  Delete comments</a:t>
             </a:r>
           </a:p>
           <a:p>
-            <a:pPr lvl="1" eaLnBrk="1" hangingPunct="1">
-              <a:defRPr/>
-            </a:pPr>
+            <a:pPr lvl="1" eaLnBrk="1" hangingPunct="1"/>
             <a:r>
-              <a:rPr lang="en-US" sz="2400" dirty="0" smtClean="0"/>
+              <a:rPr lang="en-US" sz="2400" smtClean="0"/>
               <a:t>After login, administrators can delete comments per game</a:t>
             </a:r>
           </a:p>
           <a:p>
-            <a:pPr eaLnBrk="1" hangingPunct="1">
-              <a:defRPr/>
-            </a:pPr>
+            <a:pPr eaLnBrk="1" hangingPunct="1"/>
             <a:r>
-              <a:rPr lang="en-US" sz="2400" dirty="0" smtClean="0"/>
+              <a:rPr lang="en-US" sz="2400" smtClean="0"/>
               <a:t>R15.  Modify users</a:t>
             </a:r>
           </a:p>
           <a:p>
-            <a:pPr lvl="1" eaLnBrk="1" hangingPunct="1">
-              <a:defRPr/>
-            </a:pPr>
+            <a:pPr lvl="1" eaLnBrk="1" hangingPunct="1"/>
             <a:r>
-              <a:rPr lang="en-US" sz="2400" dirty="0" smtClean="0"/>
-              <a:t>After login, administrators can modify users by selecting the user and changing the email address, login ID, and/or password.</a:t>
+              <a:rPr lang="en-US" sz="2400" smtClean="0"/>
+              <a:t>After login, admins can modify users by selecting the user and changing the email address, login ID, and/or password.</a:t>
             </a:r>
           </a:p>
           <a:p>
-            <a:pPr lvl="1" eaLnBrk="1" hangingPunct="1">
-              <a:defRPr/>
-            </a:pPr>
+            <a:pPr lvl="1" eaLnBrk="1" hangingPunct="1"/>
             <a:r>
-              <a:rPr lang="en-US" sz="2400" dirty="0" smtClean="0"/>
-              <a:t>User creation confirmation shown</a:t>
+              <a:rPr lang="en-US" sz="2400" smtClean="0"/>
+              <a:t>Admins can delete users by selecting the user</a:t>
             </a:r>
           </a:p>
           <a:p>
-            <a:pPr lvl="1" eaLnBrk="1" hangingPunct="1">
-              <a:defRPr/>
-            </a:pPr>
+            <a:pPr lvl="1" eaLnBrk="1" hangingPunct="1"/>
             <a:r>
-              <a:rPr lang="en-US" sz="2400" dirty="0" smtClean="0"/>
-              <a:t>Administrators can delete users by selecting the user</a:t>
-            </a:r>
-          </a:p>
-          <a:p>
-            <a:pPr lvl="1" eaLnBrk="1" hangingPunct="1">
-              <a:defRPr/>
-            </a:pPr>
-            <a:r>
-              <a:rPr lang="en-US" sz="2400" dirty="0" smtClean="0"/>
+              <a:rPr lang="en-US" sz="2400" smtClean="0"/>
               <a:t>All leagues, teams, games, and comments will be deleted along with user deletion</a:t>
-            </a:r>
-          </a:p>
-          <a:p>
-            <a:pPr lvl="1" eaLnBrk="1" hangingPunct="1">
-              <a:defRPr/>
-            </a:pPr>
-            <a:r>
-              <a:rPr lang="en-US" sz="2400" dirty="0" smtClean="0"/>
-              <a:t>User deletion confirmation shown</a:t>
             </a:r>
           </a:p>
         </p:txBody>

</xml_diff>